<commit_message>
Removed confidential footer from deck
</commit_message>
<xml_diff>
--- a/Designing and Managing Azure Subscriptions.pptx
+++ b/Designing and Managing Azure Subscriptions.pptx
@@ -10939,7 +10939,7 @@
           <a:p>
             <a:fld id="{23A5C127-CB05-47B6-8D1E-7BC74A68F508}" type="datetime8">
               <a:rPr lang="en-US" smtClean="0"/>
-              <a:t>5/27/2016 9:01 AM</a:t>
+              <a:t>5/27/2016 5:03 PM</a:t>
             </a:fld>
             <a:endParaRPr lang="en-US" dirty="0"/>
           </a:p>
@@ -11760,7 +11760,7 @@
           <a:p>
             <a:fld id="{38EEC551-8CDA-4EB6-89BB-2A86C9F091C8}" type="datetime8">
               <a:rPr lang="en-US" smtClean="0"/>
-              <a:t>5/27/2016 9:01 AM</a:t>
+              <a:t>5/27/2016 5:03 PM</a:t>
             </a:fld>
             <a:endParaRPr lang="en-US" dirty="0"/>
           </a:p>
@@ -11945,7 +11945,7 @@
           <a:p>
             <a:fld id="{38EEC551-8CDA-4EB6-89BB-2A86C9F091C8}" type="datetime8">
               <a:rPr lang="en-US" smtClean="0"/>
-              <a:t>5/27/2016 9:01 AM</a:t>
+              <a:t>5/27/2016 5:03 PM</a:t>
             </a:fld>
             <a:endParaRPr lang="en-US" dirty="0"/>
           </a:p>
@@ -12591,7 +12591,7 @@
           <a:p>
             <a:fld id="{7D10C09F-FCA1-48C8-B40D-42E1045D109E}" type="datetime8">
               <a:rPr lang="en-US" smtClean="0"/>
-              <a:t>5/27/2016 9:01 AM</a:t>
+              <a:t>5/27/2016 5:03 PM</a:t>
             </a:fld>
             <a:endParaRPr lang="en-US" dirty="0"/>
           </a:p>
@@ -12772,7 +12772,7 @@
           <a:p>
             <a:fld id="{38EEC551-8CDA-4EB6-89BB-2A86C9F091C8}" type="datetime8">
               <a:rPr lang="en-US" smtClean="0"/>
-              <a:t>5/27/2016 9:01 AM</a:t>
+              <a:t>5/27/2016 5:03 PM</a:t>
             </a:fld>
             <a:endParaRPr lang="en-US" dirty="0"/>
           </a:p>
@@ -13173,7 +13173,7 @@
           <a:p>
             <a:fld id="{38EEC551-8CDA-4EB6-89BB-2A86C9F091C8}" type="datetime8">
               <a:rPr lang="en-US" smtClean="0"/>
-              <a:t>5/27/2016 9:01 AM</a:t>
+              <a:t>5/27/2016 5:03 PM</a:t>
             </a:fld>
             <a:endParaRPr lang="en-US" dirty="0"/>
           </a:p>
@@ -13354,7 +13354,7 @@
           <a:p>
             <a:fld id="{38EEC551-8CDA-4EB6-89BB-2A86C9F091C8}" type="datetime8">
               <a:rPr lang="en-US" smtClean="0"/>
-              <a:t>5/27/2016 9:01 AM</a:t>
+              <a:t>5/27/2016 5:03 PM</a:t>
             </a:fld>
             <a:endParaRPr lang="en-US" dirty="0"/>
           </a:p>
@@ -13587,7 +13587,7 @@
           <a:p>
             <a:fld id="{38EEC551-8CDA-4EB6-89BB-2A86C9F091C8}" type="datetime8">
               <a:rPr lang="en-US" smtClean="0"/>
-              <a:t>5/27/2016 9:01 AM</a:t>
+              <a:t>5/27/2016 5:03 PM</a:t>
             </a:fld>
             <a:endParaRPr lang="en-US" dirty="0"/>
           </a:p>
@@ -13795,7 +13795,7 @@
           <a:p>
             <a:fld id="{38EEC551-8CDA-4EB6-89BB-2A86C9F091C8}" type="datetime8">
               <a:rPr lang="en-US" smtClean="0"/>
-              <a:t>5/27/2016 9:01 AM</a:t>
+              <a:t>5/27/2016 5:03 PM</a:t>
             </a:fld>
             <a:endParaRPr lang="en-US" dirty="0"/>
           </a:p>
@@ -14015,7 +14015,7 @@
           <a:p>
             <a:fld id="{38EEC551-8CDA-4EB6-89BB-2A86C9F091C8}" type="datetime8">
               <a:rPr lang="en-US" smtClean="0"/>
-              <a:t>5/27/2016 9:01 AM</a:t>
+              <a:t>5/27/2016 5:03 PM</a:t>
             </a:fld>
             <a:endParaRPr lang="en-US" dirty="0"/>
           </a:p>
@@ -14226,7 +14226,7 @@
           <a:p>
             <a:fld id="{38EEC551-8CDA-4EB6-89BB-2A86C9F091C8}" type="datetime8">
               <a:rPr lang="en-US" smtClean="0"/>
-              <a:t>5/27/2016 9:01 AM</a:t>
+              <a:t>5/27/2016 5:03 PM</a:t>
             </a:fld>
             <a:endParaRPr lang="en-US" dirty="0"/>
           </a:p>
@@ -14800,7 +14800,7 @@
           <a:p>
             <a:fld id="{38EEC551-8CDA-4EB6-89BB-2A86C9F091C8}" type="datetime8">
               <a:rPr lang="en-US" smtClean="0"/>
-              <a:t>5/27/2016 9:01 AM</a:t>
+              <a:t>5/27/2016 5:03 PM</a:t>
             </a:fld>
             <a:endParaRPr lang="en-US" dirty="0"/>
           </a:p>
@@ -15019,7 +15019,7 @@
           <a:p>
             <a:fld id="{38EEC551-8CDA-4EB6-89BB-2A86C9F091C8}" type="datetime8">
               <a:rPr lang="en-US" smtClean="0"/>
-              <a:t>5/27/2016 9:01 AM</a:t>
+              <a:t>5/27/2016 5:03 PM</a:t>
             </a:fld>
             <a:endParaRPr lang="en-US" dirty="0"/>
           </a:p>
@@ -15232,7 +15232,7 @@
           <a:p>
             <a:fld id="{38EEC551-8CDA-4EB6-89BB-2A86C9F091C8}" type="datetime8">
               <a:rPr lang="en-US" smtClean="0"/>
-              <a:t>5/27/2016 9:01 AM</a:t>
+              <a:t>5/27/2016 5:03 PM</a:t>
             </a:fld>
             <a:endParaRPr lang="en-US" dirty="0"/>
           </a:p>
@@ -15440,7 +15440,7 @@
           <a:p>
             <a:fld id="{38EEC551-8CDA-4EB6-89BB-2A86C9F091C8}" type="datetime8">
               <a:rPr lang="en-US" smtClean="0"/>
-              <a:t>5/27/2016 9:01 AM</a:t>
+              <a:t>5/27/2016 5:03 PM</a:t>
             </a:fld>
             <a:endParaRPr lang="en-US" dirty="0"/>
           </a:p>
@@ -15621,7 +15621,7 @@
           <a:p>
             <a:fld id="{38EEC551-8CDA-4EB6-89BB-2A86C9F091C8}" type="datetime8">
               <a:rPr lang="en-US" smtClean="0"/>
-              <a:t>5/27/2016 9:01 AM</a:t>
+              <a:t>5/27/2016 5:03 PM</a:t>
             </a:fld>
             <a:endParaRPr lang="en-US" dirty="0"/>
           </a:p>
@@ -15829,7 +15829,7 @@
           <a:p>
             <a:fld id="{38EEC551-8CDA-4EB6-89BB-2A86C9F091C8}" type="datetime8">
               <a:rPr lang="en-US" smtClean="0"/>
-              <a:t>5/27/2016 9:01 AM</a:t>
+              <a:t>5/27/2016 5:03 PM</a:t>
             </a:fld>
             <a:endParaRPr lang="en-US" dirty="0"/>
           </a:p>
@@ -16046,7 +16046,7 @@
           <a:p>
             <a:fld id="{38EEC551-8CDA-4EB6-89BB-2A86C9F091C8}" type="datetime8">
               <a:rPr lang="en-US" smtClean="0"/>
-              <a:t>5/27/2016 9:01 AM</a:t>
+              <a:t>5/27/2016 5:03 PM</a:t>
             </a:fld>
             <a:endParaRPr lang="en-US" dirty="0"/>
           </a:p>
@@ -16273,7 +16273,7 @@
           <a:p>
             <a:fld id="{38EEC551-8CDA-4EB6-89BB-2A86C9F091C8}" type="datetime8">
               <a:rPr lang="en-US" smtClean="0"/>
-              <a:t>5/27/2016 9:01 AM</a:t>
+              <a:t>5/27/2016 5:03 PM</a:t>
             </a:fld>
             <a:endParaRPr lang="en-US" dirty="0"/>
           </a:p>
@@ -16481,7 +16481,7 @@
           <a:p>
             <a:fld id="{38EEC551-8CDA-4EB6-89BB-2A86C9F091C8}" type="datetime8">
               <a:rPr lang="en-US" smtClean="0"/>
-              <a:t>5/27/2016 9:01 AM</a:t>
+              <a:t>5/27/2016 5:03 PM</a:t>
             </a:fld>
             <a:endParaRPr lang="en-US" dirty="0"/>
           </a:p>
@@ -16689,7 +16689,7 @@
           <a:p>
             <a:fld id="{38EEC551-8CDA-4EB6-89BB-2A86C9F091C8}" type="datetime8">
               <a:rPr lang="en-US" smtClean="0"/>
-              <a:t>5/27/2016 9:01 AM</a:t>
+              <a:t>5/27/2016 5:03 PM</a:t>
             </a:fld>
             <a:endParaRPr lang="en-US" dirty="0"/>
           </a:p>
@@ -17213,7 +17213,7 @@
           <a:p>
             <a:fld id="{38EEC551-8CDA-4EB6-89BB-2A86C9F091C8}" type="datetime8">
               <a:rPr lang="en-US" smtClean="0"/>
-              <a:t>5/27/2016 9:01 AM</a:t>
+              <a:t>5/27/2016 5:03 PM</a:t>
             </a:fld>
             <a:endParaRPr lang="en-US" dirty="0"/>
           </a:p>
@@ -17415,7 +17415,7 @@
           <a:p>
             <a:fld id="{38EEC551-8CDA-4EB6-89BB-2A86C9F091C8}" type="datetime8">
               <a:rPr lang="en-US" smtClean="0"/>
-              <a:t>5/27/2016 9:01 AM</a:t>
+              <a:t>5/27/2016 5:03 PM</a:t>
             </a:fld>
             <a:endParaRPr lang="en-US" dirty="0"/>
           </a:p>
@@ -17599,7 +17599,7 @@
           <a:p>
             <a:fld id="{38EEC551-8CDA-4EB6-89BB-2A86C9F091C8}" type="datetime8">
               <a:rPr lang="en-US" smtClean="0"/>
-              <a:t>5/27/2016 9:01 AM</a:t>
+              <a:t>5/27/2016 5:03 PM</a:t>
             </a:fld>
             <a:endParaRPr lang="en-US" dirty="0"/>
           </a:p>
@@ -17807,7 +17807,7 @@
           <a:p>
             <a:fld id="{38EEC551-8CDA-4EB6-89BB-2A86C9F091C8}" type="datetime8">
               <a:rPr lang="en-US" smtClean="0"/>
-              <a:t>5/27/2016 9:01 AM</a:t>
+              <a:t>5/27/2016 5:03 PM</a:t>
             </a:fld>
             <a:endParaRPr lang="en-US" dirty="0"/>
           </a:p>
@@ -18015,7 +18015,7 @@
           <a:p>
             <a:fld id="{38EEC551-8CDA-4EB6-89BB-2A86C9F091C8}" type="datetime8">
               <a:rPr lang="en-US" smtClean="0"/>
-              <a:t>5/27/2016 9:01 AM</a:t>
+              <a:t>5/27/2016 5:03 PM</a:t>
             </a:fld>
             <a:endParaRPr lang="en-US" dirty="0"/>
           </a:p>
@@ -18223,7 +18223,7 @@
           <a:p>
             <a:fld id="{38EEC551-8CDA-4EB6-89BB-2A86C9F091C8}" type="datetime8">
               <a:rPr lang="en-US" smtClean="0"/>
-              <a:t>5/27/2016 9:01 AM</a:t>
+              <a:t>5/27/2016 5:03 PM</a:t>
             </a:fld>
             <a:endParaRPr lang="en-US" dirty="0"/>
           </a:p>
@@ -18484,7 +18484,7 @@
           <a:p>
             <a:fld id="{38EEC551-8CDA-4EB6-89BB-2A86C9F091C8}" type="datetime8">
               <a:rPr lang="en-US" smtClean="0"/>
-              <a:t>5/27/2016 9:01 AM</a:t>
+              <a:t>5/27/2016 5:03 PM</a:t>
             </a:fld>
             <a:endParaRPr lang="en-US" dirty="0"/>
           </a:p>
@@ -18718,7 +18718,7 @@
           <a:p>
             <a:fld id="{38EEC551-8CDA-4EB6-89BB-2A86C9F091C8}" type="datetime8">
               <a:rPr lang="en-US" smtClean="0"/>
-              <a:t>5/27/2016 9:01 AM</a:t>
+              <a:t>5/27/2016 5:03 PM</a:t>
             </a:fld>
             <a:endParaRPr lang="en-US" dirty="0"/>
           </a:p>
@@ -20036,6 +20036,864 @@
 </file>
 
 <file path=ppt/slideLayouts/slideLayout10.xml><?xml version="1.0" encoding="utf-8"?>
+<p:sldLayout xmlns:a="http://schemas.openxmlformats.org/drawingml/2006/main" xmlns:r="http://schemas.openxmlformats.org/officeDocument/2006/relationships" xmlns:p="http://schemas.openxmlformats.org/presentationml/2006/main" userDrawn="1">
+  <p:cSld name="Two Column Bullet text 1st level color">
+    <p:spTree>
+      <p:nvGrpSpPr>
+        <p:cNvPr id="1" name=""/>
+        <p:cNvGrpSpPr/>
+        <p:nvPr/>
+      </p:nvGrpSpPr>
+      <p:grpSpPr>
+        <a:xfrm>
+          <a:off x="0" y="0"/>
+          <a:ext cx="0" cy="0"/>
+          <a:chOff x="0" y="0"/>
+          <a:chExt cx="0" cy="0"/>
+        </a:xfrm>
+      </p:grpSpPr>
+      <p:sp>
+        <p:nvSpPr>
+          <p:cNvPr id="2" name="Title 1"/>
+          <p:cNvSpPr>
+            <a:spLocks noGrp="1"/>
+          </p:cNvSpPr>
+          <p:nvPr>
+            <p:ph type="title"/>
+          </p:nvPr>
+        </p:nvSpPr>
+        <p:spPr/>
+        <p:txBody>
+          <a:bodyPr/>
+          <a:lstStyle/>
+          <a:p>
+            <a:r>
+              <a:rPr lang="en-US"/>
+              <a:t>Click to edit Master title style</a:t>
+            </a:r>
+            <a:endParaRPr lang="en-US" dirty="0"/>
+          </a:p>
+        </p:txBody>
+      </p:sp>
+      <p:sp>
+        <p:nvSpPr>
+          <p:cNvPr id="4" name="Text Placeholder 3"/>
+          <p:cNvSpPr>
+            <a:spLocks noGrp="1"/>
+          </p:cNvSpPr>
+          <p:nvPr>
+            <p:ph type="body" sz="quarter" idx="10"/>
+          </p:nvPr>
+        </p:nvSpPr>
+        <p:spPr>
+          <a:xfrm>
+            <a:off x="358456" y="1187644"/>
+            <a:ext cx="5498540" cy="3109184"/>
+          </a:xfrm>
+        </p:spPr>
+        <p:txBody>
+          <a:bodyPr wrap="square">
+            <a:spAutoFit/>
+          </a:bodyPr>
+          <a:lstStyle>
+            <a:lvl1pPr marL="281691" indent="-281691">
+              <a:spcBef>
+                <a:spcPts val="1200"/>
+              </a:spcBef>
+              <a:buClr>
+                <a:schemeClr val="tx2"/>
+              </a:buClr>
+              <a:buFont typeface="Arial" pitchFamily="34" charset="0"/>
+              <a:buChar char="•"/>
+              <a:defRPr sz="4184">
+                <a:gradFill>
+                  <a:gsLst>
+                    <a:gs pos="1250">
+                      <a:schemeClr val="tx2"/>
+                    </a:gs>
+                    <a:gs pos="99000">
+                      <a:schemeClr val="tx2"/>
+                    </a:gs>
+                  </a:gsLst>
+                  <a:lin ang="5400000" scaled="0"/>
+                </a:gradFill>
+              </a:defRPr>
+            </a:lvl1pPr>
+            <a:lvl2pPr marL="520725" indent="-228611">
+              <a:defRPr sz="2615"/>
+            </a:lvl2pPr>
+            <a:lvl3pPr marL="685835" indent="-165108">
+              <a:tabLst/>
+              <a:defRPr sz="2615"/>
+            </a:lvl3pPr>
+            <a:lvl4pPr marL="863642" indent="-177809">
+              <a:defRPr/>
+            </a:lvl4pPr>
+            <a:lvl5pPr marL="1028751" indent="-165108">
+              <a:tabLst/>
+              <a:defRPr/>
+            </a:lvl5pPr>
+          </a:lstStyle>
+          <a:p>
+            <a:pPr lvl="0"/>
+            <a:r>
+              <a:rPr lang="en-US"/>
+              <a:t>Click to edit Master text styles</a:t>
+            </a:r>
+          </a:p>
+          <a:p>
+            <a:pPr lvl="1"/>
+            <a:r>
+              <a:rPr lang="en-US"/>
+              <a:t>Second level</a:t>
+            </a:r>
+          </a:p>
+          <a:p>
+            <a:pPr lvl="2"/>
+            <a:r>
+              <a:rPr lang="en-US"/>
+              <a:t>Third level</a:t>
+            </a:r>
+          </a:p>
+          <a:p>
+            <a:pPr lvl="3"/>
+            <a:r>
+              <a:rPr lang="en-US"/>
+              <a:t>Fourth level</a:t>
+            </a:r>
+          </a:p>
+          <a:p>
+            <a:pPr lvl="4"/>
+            <a:r>
+              <a:rPr lang="en-US"/>
+              <a:t>Fifth level</a:t>
+            </a:r>
+            <a:endParaRPr lang="en-US" dirty="0"/>
+          </a:p>
+        </p:txBody>
+      </p:sp>
+      <p:sp>
+        <p:nvSpPr>
+          <p:cNvPr id="5" name="Text Placeholder 3"/>
+          <p:cNvSpPr>
+            <a:spLocks noGrp="1"/>
+          </p:cNvSpPr>
+          <p:nvPr>
+            <p:ph type="body" sz="quarter" idx="11"/>
+          </p:nvPr>
+        </p:nvSpPr>
+        <p:spPr>
+          <a:xfrm>
+            <a:off x="6335004" y="1187644"/>
+            <a:ext cx="5498540" cy="3109184"/>
+          </a:xfrm>
+        </p:spPr>
+        <p:txBody>
+          <a:bodyPr wrap="square">
+            <a:spAutoFit/>
+          </a:bodyPr>
+          <a:lstStyle>
+            <a:lvl1pPr marL="281691" indent="-281691">
+              <a:spcBef>
+                <a:spcPts val="1200"/>
+              </a:spcBef>
+              <a:buClr>
+                <a:schemeClr val="tx2"/>
+              </a:buClr>
+              <a:buFont typeface="Arial" pitchFamily="34" charset="0"/>
+              <a:buChar char="•"/>
+              <a:defRPr sz="4184">
+                <a:gradFill>
+                  <a:gsLst>
+                    <a:gs pos="1250">
+                      <a:schemeClr val="tx2"/>
+                    </a:gs>
+                    <a:gs pos="99000">
+                      <a:schemeClr val="tx2"/>
+                    </a:gs>
+                  </a:gsLst>
+                  <a:lin ang="5400000" scaled="0"/>
+                </a:gradFill>
+              </a:defRPr>
+            </a:lvl1pPr>
+            <a:lvl2pPr marL="520725" indent="-228611">
+              <a:defRPr sz="2615"/>
+            </a:lvl2pPr>
+            <a:lvl3pPr marL="685835" indent="-165108">
+              <a:tabLst/>
+              <a:defRPr sz="2615"/>
+            </a:lvl3pPr>
+            <a:lvl4pPr marL="863642" indent="-177809">
+              <a:defRPr/>
+            </a:lvl4pPr>
+            <a:lvl5pPr marL="1028751" indent="-165108">
+              <a:tabLst/>
+              <a:defRPr/>
+            </a:lvl5pPr>
+          </a:lstStyle>
+          <a:p>
+            <a:pPr lvl="0"/>
+            <a:r>
+              <a:rPr lang="en-US"/>
+              <a:t>Click to edit Master text styles</a:t>
+            </a:r>
+          </a:p>
+          <a:p>
+            <a:pPr lvl="1"/>
+            <a:r>
+              <a:rPr lang="en-US"/>
+              <a:t>Second level</a:t>
+            </a:r>
+          </a:p>
+          <a:p>
+            <a:pPr lvl="2"/>
+            <a:r>
+              <a:rPr lang="en-US"/>
+              <a:t>Third level</a:t>
+            </a:r>
+          </a:p>
+          <a:p>
+            <a:pPr lvl="3"/>
+            <a:r>
+              <a:rPr lang="en-US"/>
+              <a:t>Fourth level</a:t>
+            </a:r>
+          </a:p>
+          <a:p>
+            <a:pPr lvl="4"/>
+            <a:r>
+              <a:rPr lang="en-US"/>
+              <a:t>Fifth level</a:t>
+            </a:r>
+            <a:endParaRPr lang="en-US" dirty="0"/>
+          </a:p>
+        </p:txBody>
+      </p:sp>
+    </p:spTree>
+    <p:extLst>
+      <p:ext uri="{BB962C8B-B14F-4D97-AF65-F5344CB8AC3E}">
+        <p14:creationId xmlns:p14="http://schemas.microsoft.com/office/powerpoint/2010/main" val="1772857640"/>
+      </p:ext>
+    </p:extLst>
+  </p:cSld>
+  <p:clrMapOvr>
+    <a:masterClrMapping/>
+  </p:clrMapOvr>
+  <p:transition>
+    <p:fade/>
+  </p:transition>
+</p:sldLayout>
+</file>
+
+<file path=ppt/slideLayouts/slideLayout11.xml><?xml version="1.0" encoding="utf-8"?>
+<p:sldLayout xmlns:a="http://schemas.openxmlformats.org/drawingml/2006/main" xmlns:r="http://schemas.openxmlformats.org/officeDocument/2006/relationships" xmlns:p="http://schemas.openxmlformats.org/presentationml/2006/main" preserve="1">
+  <p:cSld name="Title and Compare">
+    <p:bg>
+      <p:bgPr>
+        <a:solidFill>
+          <a:srgbClr val="1574B8"/>
+        </a:solidFill>
+        <a:effectLst/>
+      </p:bgPr>
+    </p:bg>
+    <p:spTree>
+      <p:nvGrpSpPr>
+        <p:cNvPr id="1" name=""/>
+        <p:cNvGrpSpPr/>
+        <p:nvPr/>
+      </p:nvGrpSpPr>
+      <p:grpSpPr>
+        <a:xfrm>
+          <a:off x="0" y="0"/>
+          <a:ext cx="0" cy="0"/>
+          <a:chOff x="0" y="0"/>
+          <a:chExt cx="0" cy="0"/>
+        </a:xfrm>
+      </p:grpSpPr>
+      <p:sp>
+        <p:nvSpPr>
+          <p:cNvPr id="7" name="Content Placeholder 6"/>
+          <p:cNvSpPr>
+            <a:spLocks noGrp="1"/>
+          </p:cNvSpPr>
+          <p:nvPr>
+            <p:ph sz="quarter" idx="10"/>
+          </p:nvPr>
+        </p:nvSpPr>
+        <p:spPr>
+          <a:xfrm>
+            <a:off x="293121" y="2253750"/>
+            <a:ext cx="5378549" cy="1889748"/>
+          </a:xfrm>
+        </p:spPr>
+        <p:txBody>
+          <a:bodyPr/>
+          <a:lstStyle/>
+          <a:p>
+            <a:pPr lvl="0"/>
+            <a:r>
+              <a:rPr lang="en-US"/>
+              <a:t>Edit Master text styles</a:t>
+            </a:r>
+          </a:p>
+          <a:p>
+            <a:pPr lvl="1"/>
+            <a:r>
+              <a:rPr lang="en-US"/>
+              <a:t>Second level</a:t>
+            </a:r>
+          </a:p>
+          <a:p>
+            <a:pPr lvl="2"/>
+            <a:r>
+              <a:rPr lang="en-US"/>
+              <a:t>Third level</a:t>
+            </a:r>
+          </a:p>
+        </p:txBody>
+      </p:sp>
+      <p:sp>
+        <p:nvSpPr>
+          <p:cNvPr id="8" name="Content Placeholder 6"/>
+          <p:cNvSpPr>
+            <a:spLocks noGrp="1"/>
+          </p:cNvSpPr>
+          <p:nvPr>
+            <p:ph sz="quarter" idx="11"/>
+          </p:nvPr>
+        </p:nvSpPr>
+        <p:spPr>
+          <a:xfrm>
+            <a:off x="6457075" y="2253750"/>
+            <a:ext cx="5378549" cy="1889748"/>
+          </a:xfrm>
+        </p:spPr>
+        <p:txBody>
+          <a:bodyPr/>
+          <a:lstStyle/>
+          <a:p>
+            <a:pPr lvl="0"/>
+            <a:r>
+              <a:rPr lang="en-US"/>
+              <a:t>Edit Master text styles</a:t>
+            </a:r>
+          </a:p>
+          <a:p>
+            <a:pPr lvl="1"/>
+            <a:r>
+              <a:rPr lang="en-US"/>
+              <a:t>Second level</a:t>
+            </a:r>
+          </a:p>
+          <a:p>
+            <a:pPr lvl="2"/>
+            <a:r>
+              <a:rPr lang="en-US"/>
+              <a:t>Third level</a:t>
+            </a:r>
+          </a:p>
+        </p:txBody>
+      </p:sp>
+      <p:sp>
+        <p:nvSpPr>
+          <p:cNvPr id="9" name="Content Placeholder 6"/>
+          <p:cNvSpPr>
+            <a:spLocks noGrp="1"/>
+          </p:cNvSpPr>
+          <p:nvPr>
+            <p:ph sz="quarter" idx="12" hasCustomPrompt="1"/>
+          </p:nvPr>
+        </p:nvSpPr>
+        <p:spPr>
+          <a:xfrm>
+            <a:off x="293761" y="1367394"/>
+            <a:ext cx="5378549" cy="669927"/>
+          </a:xfrm>
+        </p:spPr>
+        <p:txBody>
+          <a:bodyPr/>
+          <a:lstStyle>
+            <a:lvl1pPr marL="0" indent="0">
+              <a:buNone/>
+              <a:defRPr sz="3529" b="1" baseline="0"/>
+            </a:lvl1pPr>
+          </a:lstStyle>
+          <a:p>
+            <a:pPr lvl="0"/>
+            <a:r>
+              <a:rPr lang="en-US" dirty="0"/>
+              <a:t>Comparison 1</a:t>
+            </a:r>
+          </a:p>
+        </p:txBody>
+      </p:sp>
+      <p:sp>
+        <p:nvSpPr>
+          <p:cNvPr id="10" name="Content Placeholder 6"/>
+          <p:cNvSpPr>
+            <a:spLocks noGrp="1"/>
+          </p:cNvSpPr>
+          <p:nvPr>
+            <p:ph sz="quarter" idx="13" hasCustomPrompt="1"/>
+          </p:nvPr>
+        </p:nvSpPr>
+        <p:spPr>
+          <a:xfrm>
+            <a:off x="6457715" y="1367394"/>
+            <a:ext cx="5378549" cy="669927"/>
+          </a:xfrm>
+        </p:spPr>
+        <p:txBody>
+          <a:bodyPr/>
+          <a:lstStyle>
+            <a:lvl1pPr marL="0" indent="0">
+              <a:buNone/>
+              <a:defRPr sz="3529" b="1"/>
+            </a:lvl1pPr>
+          </a:lstStyle>
+          <a:p>
+            <a:pPr lvl="0"/>
+            <a:r>
+              <a:rPr lang="en-US" dirty="0"/>
+              <a:t>Comparison 1</a:t>
+            </a:r>
+          </a:p>
+        </p:txBody>
+      </p:sp>
+      <p:sp>
+        <p:nvSpPr>
+          <p:cNvPr id="11" name="Title 1"/>
+          <p:cNvSpPr>
+            <a:spLocks noGrp="1"/>
+          </p:cNvSpPr>
+          <p:nvPr>
+            <p:ph type="title"/>
+          </p:nvPr>
+        </p:nvSpPr>
+        <p:spPr>
+          <a:xfrm>
+            <a:off x="268930" y="291068"/>
+            <a:ext cx="11653832" cy="899665"/>
+          </a:xfrm>
+        </p:spPr>
+        <p:txBody>
+          <a:bodyPr/>
+          <a:lstStyle/>
+          <a:p>
+            <a:r>
+              <a:rPr lang="en-US"/>
+              <a:t>Click to edit Master title style</a:t>
+            </a:r>
+            <a:endParaRPr lang="en-US" dirty="0"/>
+          </a:p>
+        </p:txBody>
+      </p:sp>
+    </p:spTree>
+    <p:extLst>
+      <p:ext uri="{BB962C8B-B14F-4D97-AF65-F5344CB8AC3E}">
+        <p14:creationId xmlns:p14="http://schemas.microsoft.com/office/powerpoint/2010/main" val="3272348533"/>
+      </p:ext>
+    </p:extLst>
+  </p:cSld>
+  <p:clrMapOvr>
+    <a:masterClrMapping/>
+  </p:clrMapOvr>
+  <p:transition>
+    <p:fade/>
+  </p:transition>
+</p:sldLayout>
+</file>
+
+<file path=ppt/slideLayouts/slideLayout12.xml><?xml version="1.0" encoding="utf-8"?>
+<p:sldLayout xmlns:a="http://schemas.openxmlformats.org/drawingml/2006/main" xmlns:r="http://schemas.openxmlformats.org/officeDocument/2006/relationships" xmlns:p="http://schemas.openxmlformats.org/presentationml/2006/main" preserve="1">
+  <p:cSld name="Demo">
+    <p:bg>
+      <p:bgPr>
+        <a:solidFill>
+          <a:srgbClr val="1574B8"/>
+        </a:solidFill>
+        <a:effectLst/>
+      </p:bgPr>
+    </p:bg>
+    <p:spTree>
+      <p:nvGrpSpPr>
+        <p:cNvPr id="1" name=""/>
+        <p:cNvGrpSpPr/>
+        <p:nvPr/>
+      </p:nvGrpSpPr>
+      <p:grpSpPr>
+        <a:xfrm>
+          <a:off x="0" y="0"/>
+          <a:ext cx="0" cy="0"/>
+          <a:chOff x="0" y="0"/>
+          <a:chExt cx="0" cy="0"/>
+        </a:xfrm>
+      </p:grpSpPr>
+      <p:sp>
+        <p:nvSpPr>
+          <p:cNvPr id="7" name="Text Placeholder 3"/>
+          <p:cNvSpPr>
+            <a:spLocks noGrp="1"/>
+          </p:cNvSpPr>
+          <p:nvPr>
+            <p:ph type="body" sz="quarter" idx="10" hasCustomPrompt="1"/>
+          </p:nvPr>
+        </p:nvSpPr>
+        <p:spPr>
+          <a:xfrm>
+            <a:off x="475025" y="4533945"/>
+            <a:ext cx="11240393" cy="683264"/>
+          </a:xfrm>
+        </p:spPr>
+        <p:txBody>
+          <a:bodyPr/>
+          <a:lstStyle>
+            <a:lvl1pPr marL="0" indent="0" algn="r">
+              <a:buNone/>
+              <a:defRPr sz="3600" i="0"/>
+            </a:lvl1pPr>
+            <a:lvl2pPr marL="336145" indent="0">
+              <a:buNone/>
+              <a:defRPr/>
+            </a:lvl2pPr>
+            <a:lvl3pPr marL="560241" indent="0">
+              <a:buNone/>
+              <a:defRPr/>
+            </a:lvl3pPr>
+            <a:lvl4pPr marL="784338" indent="0">
+              <a:buNone/>
+              <a:defRPr/>
+            </a:lvl4pPr>
+            <a:lvl5pPr marL="1008435" indent="0">
+              <a:buNone/>
+              <a:defRPr/>
+            </a:lvl5pPr>
+          </a:lstStyle>
+          <a:p>
+            <a:pPr lvl="0"/>
+            <a:r>
+              <a:rPr lang="en-US" dirty="0"/>
+              <a:t>Click to edit demo name</a:t>
+            </a:r>
+          </a:p>
+        </p:txBody>
+      </p:sp>
+      <p:sp>
+        <p:nvSpPr>
+          <p:cNvPr id="8" name="TextBox 7"/>
+          <p:cNvSpPr txBox="1"/>
+          <p:nvPr/>
+        </p:nvSpPr>
+        <p:spPr>
+          <a:xfrm>
+            <a:off x="7569411" y="2655027"/>
+            <a:ext cx="4146007" cy="1888209"/>
+          </a:xfrm>
+          <a:prstGeom prst="rect">
+            <a:avLst/>
+          </a:prstGeom>
+          <a:noFill/>
+        </p:spPr>
+        <p:txBody>
+          <a:bodyPr wrap="none" lIns="182880" tIns="146304" rIns="182880" bIns="146304" rtlCol="0">
+            <a:spAutoFit/>
+          </a:bodyPr>
+          <a:lstStyle/>
+          <a:p>
+            <a:pPr marL="0" marR="0" lvl="0" indent="0" algn="l" defTabSz="914400" rtl="0" eaLnBrk="1" fontAlgn="auto" latinLnBrk="0" hangingPunct="1">
+              <a:lnSpc>
+                <a:spcPct val="90000"/>
+              </a:lnSpc>
+              <a:spcBef>
+                <a:spcPts val="0"/>
+              </a:spcBef>
+              <a:spcAft>
+                <a:spcPts val="600"/>
+              </a:spcAft>
+              <a:buClrTx/>
+              <a:buSzTx/>
+              <a:buFontTx/>
+              <a:buNone/>
+              <a:tabLst/>
+              <a:defRPr/>
+            </a:pPr>
+            <a:r>
+              <a:rPr kumimoji="0" lang="en-US" sz="11500" b="0" i="0" u="none" strike="noStrike" kern="1200" cap="none" spc="0" normalizeH="0" baseline="0" noProof="0" dirty="0">
+                <a:ln>
+                  <a:noFill/>
+                </a:ln>
+                <a:gradFill>
+                  <a:gsLst>
+                    <a:gs pos="2917">
+                      <a:prstClr val="white"/>
+                    </a:gs>
+                    <a:gs pos="30000">
+                      <a:prstClr val="white"/>
+                    </a:gs>
+                  </a:gsLst>
+                  <a:lin ang="5400000" scaled="0"/>
+                </a:gradFill>
+                <a:effectLst/>
+                <a:uLnTx/>
+                <a:uFillTx/>
+                <a:latin typeface="Segoe UI Light"/>
+                <a:ea typeface="+mn-ea"/>
+                <a:cs typeface="+mn-cs"/>
+              </a:rPr>
+              <a:t>Demo</a:t>
+            </a:r>
+          </a:p>
+        </p:txBody>
+      </p:sp>
+      <p:pic>
+        <p:nvPicPr>
+          <p:cNvPr id="6" name="Picture 5"/>
+          <p:cNvPicPr>
+            <a:picLocks noChangeAspect="1"/>
+          </p:cNvPicPr>
+          <p:nvPr/>
+        </p:nvPicPr>
+        <p:blipFill>
+          <a:blip r:embed="rId2"/>
+          <a:stretch>
+            <a:fillRect/>
+          </a:stretch>
+        </p:blipFill>
+        <p:spPr>
+          <a:xfrm>
+            <a:off x="0" y="0"/>
+            <a:ext cx="12192000" cy="2858788"/>
+          </a:xfrm>
+          <a:prstGeom prst="rect">
+            <a:avLst/>
+          </a:prstGeom>
+        </p:spPr>
+      </p:pic>
+      <p:sp>
+        <p:nvSpPr>
+          <p:cNvPr id="9" name="TextBox 8"/>
+          <p:cNvSpPr txBox="1"/>
+          <p:nvPr/>
+        </p:nvSpPr>
+        <p:spPr>
+          <a:xfrm>
+            <a:off x="778469" y="1024876"/>
+            <a:ext cx="3740504" cy="1321387"/>
+          </a:xfrm>
+          <a:prstGeom prst="rect">
+            <a:avLst/>
+          </a:prstGeom>
+          <a:noFill/>
+        </p:spPr>
+        <p:txBody>
+          <a:bodyPr wrap="square" lIns="182880" tIns="146304" rIns="182880" bIns="146304" rtlCol="0">
+            <a:spAutoFit/>
+          </a:bodyPr>
+          <a:lstStyle/>
+          <a:p>
+            <a:pPr marL="0" marR="0" lvl="0" indent="0" algn="ctr" defTabSz="914400" rtl="0" eaLnBrk="1" fontAlgn="auto" latinLnBrk="0" hangingPunct="1">
+              <a:lnSpc>
+                <a:spcPts val="4000"/>
+              </a:lnSpc>
+              <a:spcBef>
+                <a:spcPts val="0"/>
+              </a:spcBef>
+              <a:spcAft>
+                <a:spcPts val="0"/>
+              </a:spcAft>
+              <a:buClrTx/>
+              <a:buSzTx/>
+              <a:buFontTx/>
+              <a:buNone/>
+              <a:tabLst/>
+              <a:defRPr/>
+            </a:pPr>
+            <a:r>
+              <a:rPr kumimoji="0" lang="en-US" sz="3600" b="0" i="0" u="none" strike="noStrike" kern="1200" cap="none" spc="0" normalizeH="0" baseline="0" noProof="0" dirty="0">
+                <a:ln>
+                  <a:noFill/>
+                </a:ln>
+                <a:solidFill>
+                  <a:srgbClr val="0070C0"/>
+                </a:solidFill>
+                <a:effectLst/>
+                <a:uLnTx/>
+                <a:uFillTx/>
+                <a:latin typeface="Segoe UI Light"/>
+                <a:ea typeface="+mn-ea"/>
+                <a:cs typeface="+mn-cs"/>
+              </a:rPr>
+              <a:t>Engineer to Engineer</a:t>
+            </a:r>
+          </a:p>
+        </p:txBody>
+      </p:sp>
+      <p:sp>
+        <p:nvSpPr>
+          <p:cNvPr id="10" name="TextBox 9"/>
+          <p:cNvSpPr txBox="1"/>
+          <p:nvPr userDrawn="1"/>
+        </p:nvSpPr>
+        <p:spPr>
+          <a:xfrm>
+            <a:off x="7569411" y="2655027"/>
+            <a:ext cx="4146007" cy="1888209"/>
+          </a:xfrm>
+          <a:prstGeom prst="rect">
+            <a:avLst/>
+          </a:prstGeom>
+          <a:noFill/>
+        </p:spPr>
+        <p:txBody>
+          <a:bodyPr wrap="none" lIns="182880" tIns="146304" rIns="182880" bIns="146304" rtlCol="0">
+            <a:spAutoFit/>
+          </a:bodyPr>
+          <a:lstStyle/>
+          <a:p>
+            <a:pPr>
+              <a:lnSpc>
+                <a:spcPct val="90000"/>
+              </a:lnSpc>
+              <a:spcAft>
+                <a:spcPts val="600"/>
+              </a:spcAft>
+            </a:pPr>
+            <a:r>
+              <a:rPr lang="en-US" sz="11500" dirty="0">
+                <a:gradFill>
+                  <a:gsLst>
+                    <a:gs pos="2917">
+                      <a:schemeClr val="tx1"/>
+                    </a:gs>
+                    <a:gs pos="30000">
+                      <a:schemeClr val="tx1"/>
+                    </a:gs>
+                  </a:gsLst>
+                  <a:lin ang="5400000" scaled="0"/>
+                </a:gradFill>
+                <a:latin typeface="+mj-lt"/>
+              </a:rPr>
+              <a:t>Demo</a:t>
+            </a:r>
+          </a:p>
+        </p:txBody>
+      </p:sp>
+      <p:pic>
+        <p:nvPicPr>
+          <p:cNvPr id="11" name="Picture 10"/>
+          <p:cNvPicPr>
+            <a:picLocks noChangeAspect="1"/>
+          </p:cNvPicPr>
+          <p:nvPr userDrawn="1"/>
+        </p:nvPicPr>
+        <p:blipFill>
+          <a:blip r:embed="rId2"/>
+          <a:stretch>
+            <a:fillRect/>
+          </a:stretch>
+        </p:blipFill>
+        <p:spPr>
+          <a:xfrm>
+            <a:off x="0" y="0"/>
+            <a:ext cx="12192000" cy="2858788"/>
+          </a:xfrm>
+          <a:prstGeom prst="rect">
+            <a:avLst/>
+          </a:prstGeom>
+        </p:spPr>
+      </p:pic>
+      <p:sp>
+        <p:nvSpPr>
+          <p:cNvPr id="12" name="TextBox 11"/>
+          <p:cNvSpPr txBox="1"/>
+          <p:nvPr userDrawn="1"/>
+        </p:nvSpPr>
+        <p:spPr>
+          <a:xfrm>
+            <a:off x="778469" y="1024876"/>
+            <a:ext cx="3740504" cy="1321387"/>
+          </a:xfrm>
+          <a:prstGeom prst="rect">
+            <a:avLst/>
+          </a:prstGeom>
+          <a:noFill/>
+        </p:spPr>
+        <p:txBody>
+          <a:bodyPr wrap="square" lIns="182880" tIns="146304" rIns="182880" bIns="146304" rtlCol="0">
+            <a:spAutoFit/>
+          </a:bodyPr>
+          <a:lstStyle/>
+          <a:p>
+            <a:pPr algn="ctr">
+              <a:lnSpc>
+                <a:spcPts val="4000"/>
+              </a:lnSpc>
+            </a:pPr>
+            <a:r>
+              <a:rPr lang="en-US" sz="3600" dirty="0">
+                <a:solidFill>
+                  <a:srgbClr val="0070C0"/>
+                </a:solidFill>
+                <a:latin typeface="+mj-lt"/>
+              </a:rPr>
+              <a:t>Engineer</a:t>
+            </a:r>
+            <a:r>
+              <a:rPr lang="en-US" sz="3600" baseline="0" dirty="0">
+                <a:solidFill>
+                  <a:srgbClr val="0070C0"/>
+                </a:solidFill>
+                <a:latin typeface="+mj-lt"/>
+              </a:rPr>
+              <a:t> </a:t>
+            </a:r>
+            <a:r>
+              <a:rPr lang="en-US" sz="3600" dirty="0">
+                <a:solidFill>
+                  <a:srgbClr val="0070C0"/>
+                </a:solidFill>
+                <a:latin typeface="+mj-lt"/>
+              </a:rPr>
+              <a:t>to</a:t>
+            </a:r>
+            <a:r>
+              <a:rPr lang="en-US" sz="3600" baseline="0" dirty="0">
+                <a:solidFill>
+                  <a:srgbClr val="0070C0"/>
+                </a:solidFill>
+                <a:latin typeface="+mj-lt"/>
+              </a:rPr>
+              <a:t> </a:t>
+            </a:r>
+            <a:r>
+              <a:rPr lang="en-US" sz="3600" dirty="0">
+                <a:solidFill>
+                  <a:srgbClr val="0070C0"/>
+                </a:solidFill>
+                <a:latin typeface="+mj-lt"/>
+              </a:rPr>
+              <a:t>Engineer</a:t>
+            </a:r>
+          </a:p>
+        </p:txBody>
+      </p:sp>
+    </p:spTree>
+    <p:extLst>
+      <p:ext uri="{BB962C8B-B14F-4D97-AF65-F5344CB8AC3E}">
+        <p14:creationId xmlns:p14="http://schemas.microsoft.com/office/powerpoint/2010/main" val="3786015623"/>
+      </p:ext>
+    </p:extLst>
+  </p:cSld>
+  <p:clrMapOvr>
+    <a:masterClrMapping/>
+  </p:clrMapOvr>
+  <p:transition>
+    <p:fade/>
+  </p:transition>
+</p:sldLayout>
+</file>
+
+<file path=ppt/slideLayouts/slideLayout13.xml><?xml version="1.0" encoding="utf-8"?>
 <p:sldLayout xmlns:a="http://schemas.openxmlformats.org/drawingml/2006/main" xmlns:r="http://schemas.openxmlformats.org/officeDocument/2006/relationships" xmlns:p="http://schemas.openxmlformats.org/presentationml/2006/main" preserve="1">
   <p:cSld name="Survey Ask">
     <p:spTree>
@@ -20335,7 +21193,7 @@
 </p:sldLayout>
 </file>
 
-<file path=ppt/slideLayouts/slideLayout11.xml><?xml version="1.0" encoding="utf-8"?>
+<file path=ppt/slideLayouts/slideLayout14.xml><?xml version="1.0" encoding="utf-8"?>
 <p:sldLayout xmlns:a="http://schemas.openxmlformats.org/drawingml/2006/main" xmlns:r="http://schemas.openxmlformats.org/officeDocument/2006/relationships" xmlns:p="http://schemas.openxmlformats.org/presentationml/2006/main" userDrawn="1">
   <p:cSld name="Ending Slide">
     <p:bg>
@@ -20481,1382 +21339,7 @@
 </p:sldLayout>
 </file>
 
-<file path=ppt/slideLayouts/slideLayout12.xml><?xml version="1.0" encoding="utf-8"?>
-<p:sldLayout xmlns:a="http://schemas.openxmlformats.org/drawingml/2006/main" xmlns:r="http://schemas.openxmlformats.org/officeDocument/2006/relationships" xmlns:p="http://schemas.openxmlformats.org/presentationml/2006/main" userDrawn="1">
-  <p:cSld name="Title &amp; 2-color Non-bulleted text">
-    <p:spTree>
-      <p:nvGrpSpPr>
-        <p:cNvPr id="1" name=""/>
-        <p:cNvGrpSpPr/>
-        <p:nvPr/>
-      </p:nvGrpSpPr>
-      <p:grpSpPr>
-        <a:xfrm>
-          <a:off x="0" y="0"/>
-          <a:ext cx="0" cy="0"/>
-          <a:chOff x="0" y="0"/>
-          <a:chExt cx="0" cy="0"/>
-        </a:xfrm>
-      </p:grpSpPr>
-      <p:sp>
-        <p:nvSpPr>
-          <p:cNvPr id="2" name="Title 1"/>
-          <p:cNvSpPr>
-            <a:spLocks noGrp="1"/>
-          </p:cNvSpPr>
-          <p:nvPr>
-            <p:ph type="title"/>
-          </p:nvPr>
-        </p:nvSpPr>
-        <p:spPr/>
-        <p:txBody>
-          <a:bodyPr/>
-          <a:lstStyle/>
-          <a:p>
-            <a:r>
-              <a:rPr lang="en-US" dirty="0"/>
-              <a:t>Click to edit Master title style</a:t>
-            </a:r>
-          </a:p>
-        </p:txBody>
-      </p:sp>
-      <p:sp>
-        <p:nvSpPr>
-          <p:cNvPr id="6" name="Text Placeholder 5"/>
-          <p:cNvSpPr>
-            <a:spLocks noGrp="1"/>
-          </p:cNvSpPr>
-          <p:nvPr>
-            <p:ph type="body" sz="quarter" idx="10"/>
-          </p:nvPr>
-        </p:nvSpPr>
-        <p:spPr>
-          <a:xfrm>
-            <a:off x="269239" y="1189177"/>
-            <a:ext cx="11653523" cy="2492477"/>
-          </a:xfrm>
-        </p:spPr>
-        <p:txBody>
-          <a:bodyPr/>
-          <a:lstStyle>
-            <a:lvl1pPr marL="0" indent="0">
-              <a:buNone/>
-              <a:defRPr>
-                <a:gradFill>
-                  <a:gsLst>
-                    <a:gs pos="1250">
-                      <a:schemeClr val="tx2"/>
-                    </a:gs>
-                    <a:gs pos="99000">
-                      <a:schemeClr val="tx2"/>
-                    </a:gs>
-                  </a:gsLst>
-                  <a:lin ang="5400000" scaled="0"/>
-                </a:gradFill>
-              </a:defRPr>
-            </a:lvl1pPr>
-            <a:lvl2pPr marL="0" indent="0">
-              <a:buFontTx/>
-              <a:buNone/>
-              <a:defRPr sz="1961"/>
-            </a:lvl2pPr>
-            <a:lvl3pPr marL="224097" indent="0">
-              <a:buNone/>
-              <a:defRPr/>
-            </a:lvl3pPr>
-            <a:lvl4pPr marL="448193" indent="0">
-              <a:buNone/>
-              <a:defRPr/>
-            </a:lvl4pPr>
-            <a:lvl5pPr marL="672290" indent="0">
-              <a:buNone/>
-              <a:defRPr/>
-            </a:lvl5pPr>
-          </a:lstStyle>
-          <a:p>
-            <a:pPr lvl="0"/>
-            <a:r>
-              <a:rPr lang="en-US" dirty="0"/>
-              <a:t>Click to edit Master text styles</a:t>
-            </a:r>
-          </a:p>
-          <a:p>
-            <a:pPr lvl="1"/>
-            <a:r>
-              <a:rPr lang="en-US" dirty="0"/>
-              <a:t>Second level</a:t>
-            </a:r>
-          </a:p>
-          <a:p>
-            <a:pPr lvl="2"/>
-            <a:r>
-              <a:rPr lang="en-US" dirty="0"/>
-              <a:t>Third level</a:t>
-            </a:r>
-          </a:p>
-          <a:p>
-            <a:pPr lvl="3"/>
-            <a:r>
-              <a:rPr lang="en-US" dirty="0"/>
-              <a:t>Fourth level</a:t>
-            </a:r>
-          </a:p>
-          <a:p>
-            <a:pPr lvl="4"/>
-            <a:r>
-              <a:rPr lang="en-US" dirty="0"/>
-              <a:t>Fifth level</a:t>
-            </a:r>
-          </a:p>
-        </p:txBody>
-      </p:sp>
-    </p:spTree>
-    <p:extLst>
-      <p:ext uri="{BB962C8B-B14F-4D97-AF65-F5344CB8AC3E}">
-        <p14:creationId xmlns:p14="http://schemas.microsoft.com/office/powerpoint/2010/main" val="2850564267"/>
-      </p:ext>
-    </p:extLst>
-  </p:cSld>
-  <p:clrMapOvr>
-    <a:masterClrMapping/>
-  </p:clrMapOvr>
-  <p:transition>
-    <p:fade/>
-  </p:transition>
-</p:sldLayout>
-</file>
-
-<file path=ppt/slideLayouts/slideLayout13.xml><?xml version="1.0" encoding="utf-8"?>
-<p:sldLayout xmlns:a="http://schemas.openxmlformats.org/drawingml/2006/main" xmlns:r="http://schemas.openxmlformats.org/officeDocument/2006/relationships" xmlns:p="http://schemas.openxmlformats.org/presentationml/2006/main" userDrawn="1">
-  <p:cSld name="Title and Content 1st level color text">
-    <p:spTree>
-      <p:nvGrpSpPr>
-        <p:cNvPr id="1" name=""/>
-        <p:cNvGrpSpPr/>
-        <p:nvPr/>
-      </p:nvGrpSpPr>
-      <p:grpSpPr>
-        <a:xfrm>
-          <a:off x="0" y="0"/>
-          <a:ext cx="0" cy="0"/>
-          <a:chOff x="0" y="0"/>
-          <a:chExt cx="0" cy="0"/>
-        </a:xfrm>
-      </p:grpSpPr>
-      <p:sp>
-        <p:nvSpPr>
-          <p:cNvPr id="4" name="Text Placeholder 3"/>
-          <p:cNvSpPr>
-            <a:spLocks noGrp="1"/>
-          </p:cNvSpPr>
-          <p:nvPr>
-            <p:ph type="body" sz="quarter" idx="10"/>
-          </p:nvPr>
-        </p:nvSpPr>
-        <p:spPr>
-          <a:xfrm>
-            <a:off x="359016" y="1189177"/>
-            <a:ext cx="11473970" cy="2867773"/>
-          </a:xfrm>
-        </p:spPr>
-        <p:txBody>
-          <a:bodyPr wrap="square">
-            <a:spAutoFit/>
-          </a:bodyPr>
-          <a:lstStyle>
-            <a:lvl1pPr>
-              <a:defRPr sz="4706">
-                <a:gradFill>
-                  <a:gsLst>
-                    <a:gs pos="1250">
-                      <a:schemeClr val="tx2"/>
-                    </a:gs>
-                    <a:gs pos="99000">
-                      <a:schemeClr val="tx2"/>
-                    </a:gs>
-                  </a:gsLst>
-                  <a:lin ang="5400000" scaled="0"/>
-                </a:gradFill>
-              </a:defRPr>
-            </a:lvl1pPr>
-          </a:lstStyle>
-          <a:p>
-            <a:pPr lvl="0"/>
-            <a:r>
-              <a:rPr lang="en-US"/>
-              <a:t>Click to edit Master text styles</a:t>
-            </a:r>
-          </a:p>
-          <a:p>
-            <a:pPr lvl="1"/>
-            <a:r>
-              <a:rPr lang="en-US"/>
-              <a:t>Second level</a:t>
-            </a:r>
-          </a:p>
-          <a:p>
-            <a:pPr lvl="2"/>
-            <a:r>
-              <a:rPr lang="en-US"/>
-              <a:t>Third level</a:t>
-            </a:r>
-          </a:p>
-          <a:p>
-            <a:pPr lvl="3"/>
-            <a:r>
-              <a:rPr lang="en-US"/>
-              <a:t>Fourth level</a:t>
-            </a:r>
-          </a:p>
-          <a:p>
-            <a:pPr lvl="4"/>
-            <a:r>
-              <a:rPr lang="en-US"/>
-              <a:t>Fifth level</a:t>
-            </a:r>
-            <a:endParaRPr lang="en-US" dirty="0"/>
-          </a:p>
-        </p:txBody>
-      </p:sp>
-      <p:sp>
-        <p:nvSpPr>
-          <p:cNvPr id="6" name="Title 5"/>
-          <p:cNvSpPr>
-            <a:spLocks noGrp="1"/>
-          </p:cNvSpPr>
-          <p:nvPr>
-            <p:ph type="title"/>
-          </p:nvPr>
-        </p:nvSpPr>
-        <p:spPr/>
-        <p:txBody>
-          <a:bodyPr/>
-          <a:lstStyle/>
-          <a:p>
-            <a:r>
-              <a:rPr lang="en-US"/>
-              <a:t>Click to edit Master title style</a:t>
-            </a:r>
-          </a:p>
-        </p:txBody>
-      </p:sp>
-    </p:spTree>
-    <p:extLst>
-      <p:ext uri="{BB962C8B-B14F-4D97-AF65-F5344CB8AC3E}">
-        <p14:creationId xmlns:p14="http://schemas.microsoft.com/office/powerpoint/2010/main" val="214408555"/>
-      </p:ext>
-    </p:extLst>
-  </p:cSld>
-  <p:clrMapOvr>
-    <a:masterClrMapping/>
-  </p:clrMapOvr>
-  <p:transition>
-    <p:fade/>
-  </p:transition>
-</p:sldLayout>
-</file>
-
-<file path=ppt/slideLayouts/slideLayout14.xml><?xml version="1.0" encoding="utf-8"?>
-<p:sldLayout xmlns:a="http://schemas.openxmlformats.org/drawingml/2006/main" xmlns:r="http://schemas.openxmlformats.org/officeDocument/2006/relationships" xmlns:p="http://schemas.openxmlformats.org/presentationml/2006/main" userDrawn="1">
-  <p:cSld name="50-50 Right Photo Layout">
-    <p:bg>
-      <p:bgPr>
-        <a:solidFill>
-          <a:schemeClr val="bg1"/>
-        </a:solidFill>
-        <a:effectLst/>
-      </p:bgPr>
-    </p:bg>
-    <p:spTree>
-      <p:nvGrpSpPr>
-        <p:cNvPr id="1" name=""/>
-        <p:cNvGrpSpPr/>
-        <p:nvPr/>
-      </p:nvGrpSpPr>
-      <p:grpSpPr>
-        <a:xfrm>
-          <a:off x="0" y="0"/>
-          <a:ext cx="0" cy="0"/>
-          <a:chOff x="0" y="0"/>
-          <a:chExt cx="0" cy="0"/>
-        </a:xfrm>
-      </p:grpSpPr>
-      <p:sp>
-        <p:nvSpPr>
-          <p:cNvPr id="2" name="Title 1"/>
-          <p:cNvSpPr>
-            <a:spLocks noGrp="1"/>
-          </p:cNvSpPr>
-          <p:nvPr>
-            <p:ph type="title" hasCustomPrompt="1"/>
-          </p:nvPr>
-        </p:nvSpPr>
-        <p:spPr>
-          <a:xfrm>
-            <a:off x="359015" y="1217198"/>
-            <a:ext cx="5498540" cy="1973318"/>
-          </a:xfrm>
-        </p:spPr>
-        <p:txBody>
-          <a:bodyPr wrap="square">
-            <a:spAutoFit/>
-          </a:bodyPr>
-          <a:lstStyle>
-            <a:lvl1pPr>
-              <a:defRPr sz="6470" baseline="0">
-                <a:gradFill>
-                  <a:gsLst>
-                    <a:gs pos="1250">
-                      <a:schemeClr val="tx1"/>
-                    </a:gs>
-                    <a:gs pos="100000">
-                      <a:schemeClr val="tx1"/>
-                    </a:gs>
-                  </a:gsLst>
-                  <a:lin ang="5400000" scaled="0"/>
-                </a:gradFill>
-              </a:defRPr>
-            </a:lvl1pPr>
-          </a:lstStyle>
-          <a:p>
-            <a:r>
-              <a:rPr lang="en-US" dirty="0"/>
-              <a:t>50/50 photo layout</a:t>
-            </a:r>
-          </a:p>
-        </p:txBody>
-      </p:sp>
-      <p:sp>
-        <p:nvSpPr>
-          <p:cNvPr id="4" name="Picture Placeholder 3"/>
-          <p:cNvSpPr>
-            <a:spLocks noGrp="1"/>
-          </p:cNvSpPr>
-          <p:nvPr>
-            <p:ph type="pic" sz="quarter" idx="10" hasCustomPrompt="1"/>
-          </p:nvPr>
-        </p:nvSpPr>
-        <p:spPr>
-          <a:xfrm>
-            <a:off x="6097037" y="1"/>
-            <a:ext cx="6094963" cy="6858000"/>
-          </a:xfrm>
-          <a:blipFill>
-            <a:blip r:embed="rId2"/>
-            <a:stretch>
-              <a:fillRect/>
-            </a:stretch>
-          </a:blipFill>
-        </p:spPr>
-        <p:txBody>
-          <a:bodyPr lIns="0" tIns="0" rIns="0" bIns="0" anchor="ctr">
-            <a:noAutofit/>
-          </a:bodyPr>
-          <a:lstStyle>
-            <a:lvl1pPr marL="0" indent="0" algn="ctr">
-              <a:lnSpc>
-                <a:spcPct val="150000"/>
-              </a:lnSpc>
-              <a:spcBef>
-                <a:spcPts val="0"/>
-              </a:spcBef>
-              <a:buNone/>
-              <a:defRPr sz="3660" baseline="0">
-                <a:solidFill>
-                  <a:srgbClr val="FFFFFF"/>
-                </a:solidFill>
-              </a:defRPr>
-            </a:lvl1pPr>
-          </a:lstStyle>
-          <a:p>
-            <a:r>
-              <a:rPr lang="en-US" dirty="0"/>
-              <a:t>Click on icon below</a:t>
-            </a:r>
-            <a:br>
-              <a:rPr lang="en-US" dirty="0"/>
-            </a:br>
-            <a:r>
-              <a:rPr lang="en-US" dirty="0"/>
-              <a:t>to insert a new photo</a:t>
-            </a:r>
-          </a:p>
-        </p:txBody>
-      </p:sp>
-    </p:spTree>
-    <p:extLst>
-      <p:ext uri="{BB962C8B-B14F-4D97-AF65-F5344CB8AC3E}">
-        <p14:creationId xmlns:p14="http://schemas.microsoft.com/office/powerpoint/2010/main" val="1539617638"/>
-      </p:ext>
-    </p:extLst>
-  </p:cSld>
-  <p:clrMapOvr>
-    <a:masterClrMapping/>
-  </p:clrMapOvr>
-  <p:transition>
-    <p:fade/>
-  </p:transition>
-  <p:extLst mod="1">
-    <p:ext uri="{DCECCB84-F9BA-43D5-87BE-67443E8EF086}">
-      <p15:sldGuideLst xmlns:p15="http://schemas.microsoft.com/office/powerpoint/2012/main">
-        <p15:guide id="1" pos="3916">
-          <p15:clr>
-            <a:srgbClr val="FBAE40"/>
-          </p15:clr>
-        </p15:guide>
-      </p15:sldGuideLst>
-    </p:ext>
-  </p:extLst>
-</p:sldLayout>
-</file>
-
 <file path=ppt/slideLayouts/slideLayout15.xml><?xml version="1.0" encoding="utf-8"?>
-<p:sldLayout xmlns:a="http://schemas.openxmlformats.org/drawingml/2006/main" xmlns:r="http://schemas.openxmlformats.org/officeDocument/2006/relationships" xmlns:p="http://schemas.openxmlformats.org/presentationml/2006/main" type="secHead">
-  <p:cSld name="Section Header">
-    <p:spTree>
-      <p:nvGrpSpPr>
-        <p:cNvPr id="1" name=""/>
-        <p:cNvGrpSpPr/>
-        <p:nvPr/>
-      </p:nvGrpSpPr>
-      <p:grpSpPr>
-        <a:xfrm>
-          <a:off x="0" y="0"/>
-          <a:ext cx="0" cy="0"/>
-          <a:chOff x="0" y="0"/>
-          <a:chExt cx="0" cy="0"/>
-        </a:xfrm>
-      </p:grpSpPr>
-      <p:sp>
-        <p:nvSpPr>
-          <p:cNvPr id="2" name="Title 1"/>
-          <p:cNvSpPr>
-            <a:spLocks noGrp="1"/>
-          </p:cNvSpPr>
-          <p:nvPr>
-            <p:ph type="title"/>
-          </p:nvPr>
-        </p:nvSpPr>
-        <p:spPr>
-          <a:xfrm>
-            <a:off x="831850" y="1709738"/>
-            <a:ext cx="10515600" cy="2852737"/>
-          </a:xfrm>
-        </p:spPr>
-        <p:txBody>
-          <a:bodyPr anchor="b"/>
-          <a:lstStyle>
-            <a:lvl1pPr>
-              <a:defRPr sz="6000"/>
-            </a:lvl1pPr>
-          </a:lstStyle>
-          <a:p>
-            <a:r>
-              <a:rPr lang="en-US"/>
-              <a:t>Click to edit Master title style</a:t>
-            </a:r>
-          </a:p>
-        </p:txBody>
-      </p:sp>
-      <p:sp>
-        <p:nvSpPr>
-          <p:cNvPr id="3" name="Text Placeholder 2"/>
-          <p:cNvSpPr>
-            <a:spLocks noGrp="1"/>
-          </p:cNvSpPr>
-          <p:nvPr>
-            <p:ph type="body" idx="1"/>
-          </p:nvPr>
-        </p:nvSpPr>
-        <p:spPr>
-          <a:xfrm>
-            <a:off x="831850" y="4589463"/>
-            <a:ext cx="10515600" cy="1500187"/>
-          </a:xfrm>
-        </p:spPr>
-        <p:txBody>
-          <a:bodyPr/>
-          <a:lstStyle>
-            <a:lvl1pPr marL="0" indent="0">
-              <a:buNone/>
-              <a:defRPr sz="2400">
-                <a:solidFill>
-                  <a:schemeClr val="tx1">
-                    <a:tint val="75000"/>
-                  </a:schemeClr>
-                </a:solidFill>
-              </a:defRPr>
-            </a:lvl1pPr>
-            <a:lvl2pPr marL="457200" indent="0">
-              <a:buNone/>
-              <a:defRPr sz="2000">
-                <a:solidFill>
-                  <a:schemeClr val="tx1">
-                    <a:tint val="75000"/>
-                  </a:schemeClr>
-                </a:solidFill>
-              </a:defRPr>
-            </a:lvl2pPr>
-            <a:lvl3pPr marL="914400" indent="0">
-              <a:buNone/>
-              <a:defRPr sz="1800">
-                <a:solidFill>
-                  <a:schemeClr val="tx1">
-                    <a:tint val="75000"/>
-                  </a:schemeClr>
-                </a:solidFill>
-              </a:defRPr>
-            </a:lvl3pPr>
-            <a:lvl4pPr marL="1371600" indent="0">
-              <a:buNone/>
-              <a:defRPr sz="1600">
-                <a:solidFill>
-                  <a:schemeClr val="tx1">
-                    <a:tint val="75000"/>
-                  </a:schemeClr>
-                </a:solidFill>
-              </a:defRPr>
-            </a:lvl4pPr>
-            <a:lvl5pPr marL="1828800" indent="0">
-              <a:buNone/>
-              <a:defRPr sz="1600">
-                <a:solidFill>
-                  <a:schemeClr val="tx1">
-                    <a:tint val="75000"/>
-                  </a:schemeClr>
-                </a:solidFill>
-              </a:defRPr>
-            </a:lvl5pPr>
-            <a:lvl6pPr marL="2286000" indent="0">
-              <a:buNone/>
-              <a:defRPr sz="1600">
-                <a:solidFill>
-                  <a:schemeClr val="tx1">
-                    <a:tint val="75000"/>
-                  </a:schemeClr>
-                </a:solidFill>
-              </a:defRPr>
-            </a:lvl6pPr>
-            <a:lvl7pPr marL="2743200" indent="0">
-              <a:buNone/>
-              <a:defRPr sz="1600">
-                <a:solidFill>
-                  <a:schemeClr val="tx1">
-                    <a:tint val="75000"/>
-                  </a:schemeClr>
-                </a:solidFill>
-              </a:defRPr>
-            </a:lvl7pPr>
-            <a:lvl8pPr marL="3200400" indent="0">
-              <a:buNone/>
-              <a:defRPr sz="1600">
-                <a:solidFill>
-                  <a:schemeClr val="tx1">
-                    <a:tint val="75000"/>
-                  </a:schemeClr>
-                </a:solidFill>
-              </a:defRPr>
-            </a:lvl8pPr>
-            <a:lvl9pPr marL="3657600" indent="0">
-              <a:buNone/>
-              <a:defRPr sz="1600">
-                <a:solidFill>
-                  <a:schemeClr val="tx1">
-                    <a:tint val="75000"/>
-                  </a:schemeClr>
-                </a:solidFill>
-              </a:defRPr>
-            </a:lvl9pPr>
-          </a:lstStyle>
-          <a:p>
-            <a:pPr lvl="0"/>
-            <a:r>
-              <a:rPr lang="en-US"/>
-              <a:t>Edit Master text styles</a:t>
-            </a:r>
-          </a:p>
-        </p:txBody>
-      </p:sp>
-      <p:sp>
-        <p:nvSpPr>
-          <p:cNvPr id="4" name="Date Placeholder 3"/>
-          <p:cNvSpPr>
-            <a:spLocks noGrp="1"/>
-          </p:cNvSpPr>
-          <p:nvPr>
-            <p:ph type="dt" sz="half" idx="10"/>
-          </p:nvPr>
-        </p:nvSpPr>
-        <p:spPr/>
-        <p:txBody>
-          <a:bodyPr/>
-          <a:lstStyle/>
-          <a:p>
-            <a:fld id="{436F7765-B892-4603-BFCE-AECCCB66285B}" type="datetimeFigureOut">
-              <a:rPr lang="en-US" smtClean="0"/>
-              <a:t>5/27/2016</a:t>
-            </a:fld>
-            <a:endParaRPr lang="en-US"/>
-          </a:p>
-        </p:txBody>
-      </p:sp>
-      <p:sp>
-        <p:nvSpPr>
-          <p:cNvPr id="5" name="Footer Placeholder 4"/>
-          <p:cNvSpPr>
-            <a:spLocks noGrp="1"/>
-          </p:cNvSpPr>
-          <p:nvPr>
-            <p:ph type="ftr" sz="quarter" idx="11"/>
-          </p:nvPr>
-        </p:nvSpPr>
-        <p:spPr/>
-        <p:txBody>
-          <a:bodyPr/>
-          <a:lstStyle/>
-          <a:p>
-            <a:endParaRPr lang="en-US"/>
-          </a:p>
-        </p:txBody>
-      </p:sp>
-      <p:sp>
-        <p:nvSpPr>
-          <p:cNvPr id="6" name="Slide Number Placeholder 5"/>
-          <p:cNvSpPr>
-            <a:spLocks noGrp="1"/>
-          </p:cNvSpPr>
-          <p:nvPr>
-            <p:ph type="sldNum" sz="quarter" idx="12"/>
-          </p:nvPr>
-        </p:nvSpPr>
-        <p:spPr/>
-        <p:txBody>
-          <a:bodyPr/>
-          <a:lstStyle/>
-          <a:p>
-            <a:fld id="{577BCB4E-20B5-495A-B517-CE9027E0B8DF}" type="slidenum">
-              <a:rPr lang="en-US" smtClean="0"/>
-              <a:t>‹#›</a:t>
-            </a:fld>
-            <a:endParaRPr lang="en-US"/>
-          </a:p>
-        </p:txBody>
-      </p:sp>
-    </p:spTree>
-    <p:extLst>
-      <p:ext uri="{BB962C8B-B14F-4D97-AF65-F5344CB8AC3E}">
-        <p14:creationId xmlns:p14="http://schemas.microsoft.com/office/powerpoint/2010/main" val="1639436305"/>
-      </p:ext>
-    </p:extLst>
-  </p:cSld>
-  <p:clrMapOvr>
-    <a:masterClrMapping/>
-  </p:clrMapOvr>
-</p:sldLayout>
-</file>
-
-<file path=ppt/slideLayouts/slideLayout16.xml><?xml version="1.0" encoding="utf-8"?>
-<p:sldLayout xmlns:a="http://schemas.openxmlformats.org/drawingml/2006/main" xmlns:r="http://schemas.openxmlformats.org/officeDocument/2006/relationships" xmlns:p="http://schemas.openxmlformats.org/presentationml/2006/main" userDrawn="1">
-  <p:cSld name="Section Title Accent Color 1">
-    <p:bg>
-      <p:bgPr>
-        <a:solidFill>
-          <a:schemeClr val="accent1"/>
-        </a:solidFill>
-        <a:effectLst/>
-      </p:bgPr>
-    </p:bg>
-    <p:spTree>
-      <p:nvGrpSpPr>
-        <p:cNvPr id="1" name=""/>
-        <p:cNvGrpSpPr/>
-        <p:nvPr/>
-      </p:nvGrpSpPr>
-      <p:grpSpPr>
-        <a:xfrm>
-          <a:off x="0" y="0"/>
-          <a:ext cx="0" cy="0"/>
-          <a:chOff x="0" y="0"/>
-          <a:chExt cx="0" cy="0"/>
-        </a:xfrm>
-      </p:grpSpPr>
-      <p:sp>
-        <p:nvSpPr>
-          <p:cNvPr id="2" name="Title 1"/>
-          <p:cNvSpPr>
-            <a:spLocks noGrp="1"/>
-          </p:cNvSpPr>
-          <p:nvPr>
-            <p:ph type="title" hasCustomPrompt="1"/>
-          </p:nvPr>
-        </p:nvSpPr>
-        <p:spPr>
-          <a:xfrm>
-            <a:off x="359016" y="2931082"/>
-            <a:ext cx="11473970" cy="1267431"/>
-          </a:xfrm>
-          <a:noFill/>
-        </p:spPr>
-        <p:txBody>
-          <a:bodyPr wrap="square" tIns="91440" bIns="91440" anchor="t" anchorCtr="0">
-            <a:spAutoFit/>
-          </a:bodyPr>
-          <a:lstStyle>
-            <a:lvl1pPr>
-              <a:defRPr sz="7844" spc="-98" baseline="0">
-                <a:gradFill>
-                  <a:gsLst>
-                    <a:gs pos="100000">
-                      <a:schemeClr val="tx1"/>
-                    </a:gs>
-                    <a:gs pos="0">
-                      <a:schemeClr val="tx1"/>
-                    </a:gs>
-                  </a:gsLst>
-                  <a:lin ang="5400000" scaled="0"/>
-                </a:gradFill>
-              </a:defRPr>
-            </a:lvl1pPr>
-          </a:lstStyle>
-          <a:p>
-            <a:r>
-              <a:rPr lang="en-US" dirty="0"/>
-              <a:t>Section title</a:t>
-            </a:r>
-          </a:p>
-        </p:txBody>
-      </p:sp>
-    </p:spTree>
-    <p:extLst>
-      <p:ext uri="{BB962C8B-B14F-4D97-AF65-F5344CB8AC3E}">
-        <p14:creationId xmlns:p14="http://schemas.microsoft.com/office/powerpoint/2010/main" val="1136883320"/>
-      </p:ext>
-    </p:extLst>
-  </p:cSld>
-  <p:clrMapOvr>
-    <a:overrideClrMapping bg1="dk1" tx1="lt1" bg2="dk2" tx2="lt2" accent1="accent1" accent2="accent2" accent3="accent3" accent4="accent4" accent5="accent5" accent6="accent6" hlink="hlink" folHlink="folHlink"/>
-  </p:clrMapOvr>
-  <p:transition>
-    <p:fade/>
-  </p:transition>
-</p:sldLayout>
-</file>
-
-<file path=ppt/slideLayouts/slideLayout17.xml><?xml version="1.0" encoding="utf-8"?>
-<p:sldLayout xmlns:a="http://schemas.openxmlformats.org/drawingml/2006/main" xmlns:r="http://schemas.openxmlformats.org/officeDocument/2006/relationships" xmlns:p="http://schemas.openxmlformats.org/presentationml/2006/main" userDrawn="1">
-  <p:cSld name="Two Column Bullet text 1st level color">
-    <p:spTree>
-      <p:nvGrpSpPr>
-        <p:cNvPr id="1" name=""/>
-        <p:cNvGrpSpPr/>
-        <p:nvPr/>
-      </p:nvGrpSpPr>
-      <p:grpSpPr>
-        <a:xfrm>
-          <a:off x="0" y="0"/>
-          <a:ext cx="0" cy="0"/>
-          <a:chOff x="0" y="0"/>
-          <a:chExt cx="0" cy="0"/>
-        </a:xfrm>
-      </p:grpSpPr>
-      <p:sp>
-        <p:nvSpPr>
-          <p:cNvPr id="2" name="Title 1"/>
-          <p:cNvSpPr>
-            <a:spLocks noGrp="1"/>
-          </p:cNvSpPr>
-          <p:nvPr>
-            <p:ph type="title"/>
-          </p:nvPr>
-        </p:nvSpPr>
-        <p:spPr/>
-        <p:txBody>
-          <a:bodyPr/>
-          <a:lstStyle/>
-          <a:p>
-            <a:r>
-              <a:rPr lang="en-US"/>
-              <a:t>Click to edit Master title style</a:t>
-            </a:r>
-            <a:endParaRPr lang="en-US" dirty="0"/>
-          </a:p>
-        </p:txBody>
-      </p:sp>
-      <p:sp>
-        <p:nvSpPr>
-          <p:cNvPr id="4" name="Text Placeholder 3"/>
-          <p:cNvSpPr>
-            <a:spLocks noGrp="1"/>
-          </p:cNvSpPr>
-          <p:nvPr>
-            <p:ph type="body" sz="quarter" idx="10"/>
-          </p:nvPr>
-        </p:nvSpPr>
-        <p:spPr>
-          <a:xfrm>
-            <a:off x="358456" y="1187644"/>
-            <a:ext cx="5498540" cy="3109184"/>
-          </a:xfrm>
-        </p:spPr>
-        <p:txBody>
-          <a:bodyPr wrap="square">
-            <a:spAutoFit/>
-          </a:bodyPr>
-          <a:lstStyle>
-            <a:lvl1pPr marL="281691" indent="-281691">
-              <a:spcBef>
-                <a:spcPts val="1200"/>
-              </a:spcBef>
-              <a:buClr>
-                <a:schemeClr val="tx2"/>
-              </a:buClr>
-              <a:buFont typeface="Arial" pitchFamily="34" charset="0"/>
-              <a:buChar char="•"/>
-              <a:defRPr sz="4184">
-                <a:gradFill>
-                  <a:gsLst>
-                    <a:gs pos="1250">
-                      <a:schemeClr val="tx2"/>
-                    </a:gs>
-                    <a:gs pos="99000">
-                      <a:schemeClr val="tx2"/>
-                    </a:gs>
-                  </a:gsLst>
-                  <a:lin ang="5400000" scaled="0"/>
-                </a:gradFill>
-              </a:defRPr>
-            </a:lvl1pPr>
-            <a:lvl2pPr marL="520725" indent="-228611">
-              <a:defRPr sz="2615"/>
-            </a:lvl2pPr>
-            <a:lvl3pPr marL="685835" indent="-165108">
-              <a:tabLst/>
-              <a:defRPr sz="2615"/>
-            </a:lvl3pPr>
-            <a:lvl4pPr marL="863642" indent="-177809">
-              <a:defRPr/>
-            </a:lvl4pPr>
-            <a:lvl5pPr marL="1028751" indent="-165108">
-              <a:tabLst/>
-              <a:defRPr/>
-            </a:lvl5pPr>
-          </a:lstStyle>
-          <a:p>
-            <a:pPr lvl="0"/>
-            <a:r>
-              <a:rPr lang="en-US"/>
-              <a:t>Click to edit Master text styles</a:t>
-            </a:r>
-          </a:p>
-          <a:p>
-            <a:pPr lvl="1"/>
-            <a:r>
-              <a:rPr lang="en-US"/>
-              <a:t>Second level</a:t>
-            </a:r>
-          </a:p>
-          <a:p>
-            <a:pPr lvl="2"/>
-            <a:r>
-              <a:rPr lang="en-US"/>
-              <a:t>Third level</a:t>
-            </a:r>
-          </a:p>
-          <a:p>
-            <a:pPr lvl="3"/>
-            <a:r>
-              <a:rPr lang="en-US"/>
-              <a:t>Fourth level</a:t>
-            </a:r>
-          </a:p>
-          <a:p>
-            <a:pPr lvl="4"/>
-            <a:r>
-              <a:rPr lang="en-US"/>
-              <a:t>Fifth level</a:t>
-            </a:r>
-            <a:endParaRPr lang="en-US" dirty="0"/>
-          </a:p>
-        </p:txBody>
-      </p:sp>
-      <p:sp>
-        <p:nvSpPr>
-          <p:cNvPr id="5" name="Text Placeholder 3"/>
-          <p:cNvSpPr>
-            <a:spLocks noGrp="1"/>
-          </p:cNvSpPr>
-          <p:nvPr>
-            <p:ph type="body" sz="quarter" idx="11"/>
-          </p:nvPr>
-        </p:nvSpPr>
-        <p:spPr>
-          <a:xfrm>
-            <a:off x="6335004" y="1187644"/>
-            <a:ext cx="5498540" cy="3109184"/>
-          </a:xfrm>
-        </p:spPr>
-        <p:txBody>
-          <a:bodyPr wrap="square">
-            <a:spAutoFit/>
-          </a:bodyPr>
-          <a:lstStyle>
-            <a:lvl1pPr marL="281691" indent="-281691">
-              <a:spcBef>
-                <a:spcPts val="1200"/>
-              </a:spcBef>
-              <a:buClr>
-                <a:schemeClr val="tx2"/>
-              </a:buClr>
-              <a:buFont typeface="Arial" pitchFamily="34" charset="0"/>
-              <a:buChar char="•"/>
-              <a:defRPr sz="4184">
-                <a:gradFill>
-                  <a:gsLst>
-                    <a:gs pos="1250">
-                      <a:schemeClr val="tx2"/>
-                    </a:gs>
-                    <a:gs pos="99000">
-                      <a:schemeClr val="tx2"/>
-                    </a:gs>
-                  </a:gsLst>
-                  <a:lin ang="5400000" scaled="0"/>
-                </a:gradFill>
-              </a:defRPr>
-            </a:lvl1pPr>
-            <a:lvl2pPr marL="520725" indent="-228611">
-              <a:defRPr sz="2615"/>
-            </a:lvl2pPr>
-            <a:lvl3pPr marL="685835" indent="-165108">
-              <a:tabLst/>
-              <a:defRPr sz="2615"/>
-            </a:lvl3pPr>
-            <a:lvl4pPr marL="863642" indent="-177809">
-              <a:defRPr/>
-            </a:lvl4pPr>
-            <a:lvl5pPr marL="1028751" indent="-165108">
-              <a:tabLst/>
-              <a:defRPr/>
-            </a:lvl5pPr>
-          </a:lstStyle>
-          <a:p>
-            <a:pPr lvl="0"/>
-            <a:r>
-              <a:rPr lang="en-US"/>
-              <a:t>Click to edit Master text styles</a:t>
-            </a:r>
-          </a:p>
-          <a:p>
-            <a:pPr lvl="1"/>
-            <a:r>
-              <a:rPr lang="en-US"/>
-              <a:t>Second level</a:t>
-            </a:r>
-          </a:p>
-          <a:p>
-            <a:pPr lvl="2"/>
-            <a:r>
-              <a:rPr lang="en-US"/>
-              <a:t>Third level</a:t>
-            </a:r>
-          </a:p>
-          <a:p>
-            <a:pPr lvl="3"/>
-            <a:r>
-              <a:rPr lang="en-US"/>
-              <a:t>Fourth level</a:t>
-            </a:r>
-          </a:p>
-          <a:p>
-            <a:pPr lvl="4"/>
-            <a:r>
-              <a:rPr lang="en-US"/>
-              <a:t>Fifth level</a:t>
-            </a:r>
-            <a:endParaRPr lang="en-US" dirty="0"/>
-          </a:p>
-        </p:txBody>
-      </p:sp>
-    </p:spTree>
-    <p:extLst>
-      <p:ext uri="{BB962C8B-B14F-4D97-AF65-F5344CB8AC3E}">
-        <p14:creationId xmlns:p14="http://schemas.microsoft.com/office/powerpoint/2010/main" val="1772857640"/>
-      </p:ext>
-    </p:extLst>
-  </p:cSld>
-  <p:clrMapOvr>
-    <a:masterClrMapping/>
-  </p:clrMapOvr>
-  <p:transition>
-    <p:fade/>
-  </p:transition>
-</p:sldLayout>
-</file>
-
-<file path=ppt/slideLayouts/slideLayout18.xml><?xml version="1.0" encoding="utf-8"?>
-<p:sldLayout xmlns:a="http://schemas.openxmlformats.org/drawingml/2006/main" xmlns:r="http://schemas.openxmlformats.org/officeDocument/2006/relationships" xmlns:p="http://schemas.openxmlformats.org/presentationml/2006/main" type="twoTxTwoObj">
-  <p:cSld name="Comparison">
-    <p:spTree>
-      <p:nvGrpSpPr>
-        <p:cNvPr id="1" name=""/>
-        <p:cNvGrpSpPr/>
-        <p:nvPr/>
-      </p:nvGrpSpPr>
-      <p:grpSpPr>
-        <a:xfrm>
-          <a:off x="0" y="0"/>
-          <a:ext cx="0" cy="0"/>
-          <a:chOff x="0" y="0"/>
-          <a:chExt cx="0" cy="0"/>
-        </a:xfrm>
-      </p:grpSpPr>
-      <p:sp>
-        <p:nvSpPr>
-          <p:cNvPr id="2" name="Title 1"/>
-          <p:cNvSpPr>
-            <a:spLocks noGrp="1"/>
-          </p:cNvSpPr>
-          <p:nvPr>
-            <p:ph type="title"/>
-          </p:nvPr>
-        </p:nvSpPr>
-        <p:spPr>
-          <a:xfrm>
-            <a:off x="839788" y="365126"/>
-            <a:ext cx="10515600" cy="1325563"/>
-          </a:xfrm>
-        </p:spPr>
-        <p:txBody>
-          <a:bodyPr/>
-          <a:lstStyle/>
-          <a:p>
-            <a:r>
-              <a:rPr lang="en-US"/>
-              <a:t>Click to edit Master title style</a:t>
-            </a:r>
-          </a:p>
-        </p:txBody>
-      </p:sp>
-      <p:sp>
-        <p:nvSpPr>
-          <p:cNvPr id="3" name="Text Placeholder 2"/>
-          <p:cNvSpPr>
-            <a:spLocks noGrp="1"/>
-          </p:cNvSpPr>
-          <p:nvPr>
-            <p:ph type="body" idx="1"/>
-          </p:nvPr>
-        </p:nvSpPr>
-        <p:spPr>
-          <a:xfrm>
-            <a:off x="839789" y="1991566"/>
-            <a:ext cx="5157787" cy="513510"/>
-          </a:xfrm>
-        </p:spPr>
-        <p:txBody>
-          <a:bodyPr anchor="b"/>
-          <a:lstStyle>
-            <a:lvl1pPr marL="0" indent="0">
-              <a:buNone/>
-              <a:defRPr sz="2400" b="1"/>
-            </a:lvl1pPr>
-            <a:lvl2pPr marL="457205" indent="0">
-              <a:buNone/>
-              <a:defRPr sz="2000" b="1"/>
-            </a:lvl2pPr>
-            <a:lvl3pPr marL="914411" indent="0">
-              <a:buNone/>
-              <a:defRPr sz="1800" b="1"/>
-            </a:lvl3pPr>
-            <a:lvl4pPr marL="1371617" indent="0">
-              <a:buNone/>
-              <a:defRPr sz="1600" b="1"/>
-            </a:lvl4pPr>
-            <a:lvl5pPr marL="1828822" indent="0">
-              <a:buNone/>
-              <a:defRPr sz="1600" b="1"/>
-            </a:lvl5pPr>
-            <a:lvl6pPr marL="2286027" indent="0">
-              <a:buNone/>
-              <a:defRPr sz="1600" b="1"/>
-            </a:lvl6pPr>
-            <a:lvl7pPr marL="2743233" indent="0">
-              <a:buNone/>
-              <a:defRPr sz="1600" b="1"/>
-            </a:lvl7pPr>
-            <a:lvl8pPr marL="3200438" indent="0">
-              <a:buNone/>
-              <a:defRPr sz="1600" b="1"/>
-            </a:lvl8pPr>
-            <a:lvl9pPr marL="3657643" indent="0">
-              <a:buNone/>
-              <a:defRPr sz="1600" b="1"/>
-            </a:lvl9pPr>
-          </a:lstStyle>
-          <a:p>
-            <a:pPr lvl="0"/>
-            <a:r>
-              <a:rPr lang="en-US"/>
-              <a:t>Click to edit Master text styles</a:t>
-            </a:r>
-          </a:p>
-        </p:txBody>
-      </p:sp>
-      <p:sp>
-        <p:nvSpPr>
-          <p:cNvPr id="4" name="Content Placeholder 3"/>
-          <p:cNvSpPr>
-            <a:spLocks noGrp="1"/>
-          </p:cNvSpPr>
-          <p:nvPr>
-            <p:ph sz="half" idx="2"/>
-          </p:nvPr>
-        </p:nvSpPr>
-        <p:spPr>
-          <a:xfrm>
-            <a:off x="839789" y="2505075"/>
-            <a:ext cx="5157787" cy="3323987"/>
-          </a:xfrm>
-        </p:spPr>
-        <p:txBody>
-          <a:bodyPr/>
-          <a:lstStyle/>
-          <a:p>
-            <a:pPr lvl="0"/>
-            <a:r>
-              <a:rPr lang="en-US"/>
-              <a:t>Click to edit Master text styles</a:t>
-            </a:r>
-          </a:p>
-          <a:p>
-            <a:pPr lvl="1"/>
-            <a:r>
-              <a:rPr lang="en-US"/>
-              <a:t>Second level</a:t>
-            </a:r>
-          </a:p>
-          <a:p>
-            <a:pPr lvl="2"/>
-            <a:r>
-              <a:rPr lang="en-US"/>
-              <a:t>Third level</a:t>
-            </a:r>
-          </a:p>
-          <a:p>
-            <a:pPr lvl="3"/>
-            <a:r>
-              <a:rPr lang="en-US"/>
-              <a:t>Fourth level</a:t>
-            </a:r>
-          </a:p>
-          <a:p>
-            <a:pPr lvl="4"/>
-            <a:r>
-              <a:rPr lang="en-US"/>
-              <a:t>Fifth level</a:t>
-            </a:r>
-          </a:p>
-        </p:txBody>
-      </p:sp>
-      <p:sp>
-        <p:nvSpPr>
-          <p:cNvPr id="5" name="Text Placeholder 4"/>
-          <p:cNvSpPr>
-            <a:spLocks noGrp="1"/>
-          </p:cNvSpPr>
-          <p:nvPr>
-            <p:ph type="body" sz="quarter" idx="3"/>
-          </p:nvPr>
-        </p:nvSpPr>
-        <p:spPr>
-          <a:xfrm>
-            <a:off x="6172200" y="1991566"/>
-            <a:ext cx="5183188" cy="513510"/>
-          </a:xfrm>
-        </p:spPr>
-        <p:txBody>
-          <a:bodyPr anchor="b"/>
-          <a:lstStyle>
-            <a:lvl1pPr marL="0" indent="0">
-              <a:buNone/>
-              <a:defRPr sz="2400" b="1"/>
-            </a:lvl1pPr>
-            <a:lvl2pPr marL="457205" indent="0">
-              <a:buNone/>
-              <a:defRPr sz="2000" b="1"/>
-            </a:lvl2pPr>
-            <a:lvl3pPr marL="914411" indent="0">
-              <a:buNone/>
-              <a:defRPr sz="1800" b="1"/>
-            </a:lvl3pPr>
-            <a:lvl4pPr marL="1371617" indent="0">
-              <a:buNone/>
-              <a:defRPr sz="1600" b="1"/>
-            </a:lvl4pPr>
-            <a:lvl5pPr marL="1828822" indent="0">
-              <a:buNone/>
-              <a:defRPr sz="1600" b="1"/>
-            </a:lvl5pPr>
-            <a:lvl6pPr marL="2286027" indent="0">
-              <a:buNone/>
-              <a:defRPr sz="1600" b="1"/>
-            </a:lvl6pPr>
-            <a:lvl7pPr marL="2743233" indent="0">
-              <a:buNone/>
-              <a:defRPr sz="1600" b="1"/>
-            </a:lvl7pPr>
-            <a:lvl8pPr marL="3200438" indent="0">
-              <a:buNone/>
-              <a:defRPr sz="1600" b="1"/>
-            </a:lvl8pPr>
-            <a:lvl9pPr marL="3657643" indent="0">
-              <a:buNone/>
-              <a:defRPr sz="1600" b="1"/>
-            </a:lvl9pPr>
-          </a:lstStyle>
-          <a:p>
-            <a:pPr lvl="0"/>
-            <a:r>
-              <a:rPr lang="en-US"/>
-              <a:t>Click to edit Master text styles</a:t>
-            </a:r>
-          </a:p>
-        </p:txBody>
-      </p:sp>
-      <p:sp>
-        <p:nvSpPr>
-          <p:cNvPr id="6" name="Content Placeholder 5"/>
-          <p:cNvSpPr>
-            <a:spLocks noGrp="1"/>
-          </p:cNvSpPr>
-          <p:nvPr>
-            <p:ph sz="quarter" idx="4"/>
-          </p:nvPr>
-        </p:nvSpPr>
-        <p:spPr>
-          <a:xfrm>
-            <a:off x="6172200" y="2505075"/>
-            <a:ext cx="5183188" cy="3323987"/>
-          </a:xfrm>
-        </p:spPr>
-        <p:txBody>
-          <a:bodyPr/>
-          <a:lstStyle/>
-          <a:p>
-            <a:pPr lvl="0"/>
-            <a:r>
-              <a:rPr lang="en-US"/>
-              <a:t>Click to edit Master text styles</a:t>
-            </a:r>
-          </a:p>
-          <a:p>
-            <a:pPr lvl="1"/>
-            <a:r>
-              <a:rPr lang="en-US"/>
-              <a:t>Second level</a:t>
-            </a:r>
-          </a:p>
-          <a:p>
-            <a:pPr lvl="2"/>
-            <a:r>
-              <a:rPr lang="en-US"/>
-              <a:t>Third level</a:t>
-            </a:r>
-          </a:p>
-          <a:p>
-            <a:pPr lvl="3"/>
-            <a:r>
-              <a:rPr lang="en-US"/>
-              <a:t>Fourth level</a:t>
-            </a:r>
-          </a:p>
-          <a:p>
-            <a:pPr lvl="4"/>
-            <a:r>
-              <a:rPr lang="en-US"/>
-              <a:t>Fifth level</a:t>
-            </a:r>
-          </a:p>
-        </p:txBody>
-      </p:sp>
-      <p:sp>
-        <p:nvSpPr>
-          <p:cNvPr id="7" name="Date Placeholder 6"/>
-          <p:cNvSpPr>
-            <a:spLocks noGrp="1"/>
-          </p:cNvSpPr>
-          <p:nvPr>
-            <p:ph type="dt" sz="half" idx="10"/>
-          </p:nvPr>
-        </p:nvSpPr>
-        <p:spPr/>
-        <p:txBody>
-          <a:bodyPr/>
-          <a:lstStyle/>
-          <a:p>
-            <a:fld id="{2471549E-5B03-41EF-9F4A-E5DF55A325B9}" type="datetime1">
-              <a:rPr lang="en-US" smtClean="0"/>
-              <a:t>5/27/2016</a:t>
-            </a:fld>
-            <a:endParaRPr lang="en-US"/>
-          </a:p>
-        </p:txBody>
-      </p:sp>
-      <p:sp>
-        <p:nvSpPr>
-          <p:cNvPr id="8" name="Footer Placeholder 7"/>
-          <p:cNvSpPr>
-            <a:spLocks noGrp="1"/>
-          </p:cNvSpPr>
-          <p:nvPr>
-            <p:ph type="ftr" sz="quarter" idx="11"/>
-          </p:nvPr>
-        </p:nvSpPr>
-        <p:spPr/>
-        <p:txBody>
-          <a:bodyPr/>
-          <a:lstStyle/>
-          <a:p>
-            <a:endParaRPr lang="en-US"/>
-          </a:p>
-        </p:txBody>
-      </p:sp>
-      <p:sp>
-        <p:nvSpPr>
-          <p:cNvPr id="9" name="Slide Number Placeholder 8"/>
-          <p:cNvSpPr>
-            <a:spLocks noGrp="1"/>
-          </p:cNvSpPr>
-          <p:nvPr>
-            <p:ph type="sldNum" sz="quarter" idx="12"/>
-          </p:nvPr>
-        </p:nvSpPr>
-        <p:spPr/>
-        <p:txBody>
-          <a:bodyPr/>
-          <a:lstStyle/>
-          <a:p>
-            <a:fld id="{7C4F2301-FC36-4ED9-A5EB-E8FBDA7A1302}" type="slidenum">
-              <a:rPr lang="en-US" smtClean="0"/>
-              <a:t>‹#›</a:t>
-            </a:fld>
-            <a:endParaRPr lang="en-US"/>
-          </a:p>
-        </p:txBody>
-      </p:sp>
-    </p:spTree>
-    <p:extLst>
-      <p:ext uri="{BB962C8B-B14F-4D97-AF65-F5344CB8AC3E}">
-        <p14:creationId xmlns:p14="http://schemas.microsoft.com/office/powerpoint/2010/main" val="139087895"/>
-      </p:ext>
-    </p:extLst>
-  </p:cSld>
-  <p:clrMapOvr>
-    <a:masterClrMapping/>
-  </p:clrMapOvr>
-</p:sldLayout>
-</file>
-
-<file path=ppt/slideLayouts/slideLayout19.xml><?xml version="1.0" encoding="utf-8"?>
 <p:sldLayout xmlns:a="http://schemas.openxmlformats.org/drawingml/2006/main" xmlns:r="http://schemas.openxmlformats.org/officeDocument/2006/relationships" xmlns:p="http://schemas.openxmlformats.org/presentationml/2006/main">
   <p:cSld name="Black Notes slide Layout">
     <p:bg bwMode="black">
@@ -22752,6 +22235,281 @@
 </file>
 
 <file path=ppt/slideLayouts/slideLayout7.xml><?xml version="1.0" encoding="utf-8"?>
+<p:sldLayout xmlns:a="http://schemas.openxmlformats.org/drawingml/2006/main" xmlns:r="http://schemas.openxmlformats.org/officeDocument/2006/relationships" xmlns:p="http://schemas.openxmlformats.org/presentationml/2006/main" userDrawn="1">
+  <p:cSld name="Title &amp; 2-color Non-bulleted text">
+    <p:spTree>
+      <p:nvGrpSpPr>
+        <p:cNvPr id="1" name=""/>
+        <p:cNvGrpSpPr/>
+        <p:nvPr/>
+      </p:nvGrpSpPr>
+      <p:grpSpPr>
+        <a:xfrm>
+          <a:off x="0" y="0"/>
+          <a:ext cx="0" cy="0"/>
+          <a:chOff x="0" y="0"/>
+          <a:chExt cx="0" cy="0"/>
+        </a:xfrm>
+      </p:grpSpPr>
+      <p:sp>
+        <p:nvSpPr>
+          <p:cNvPr id="2" name="Title 1"/>
+          <p:cNvSpPr>
+            <a:spLocks noGrp="1"/>
+          </p:cNvSpPr>
+          <p:nvPr>
+            <p:ph type="title"/>
+          </p:nvPr>
+        </p:nvSpPr>
+        <p:spPr/>
+        <p:txBody>
+          <a:bodyPr/>
+          <a:lstStyle/>
+          <a:p>
+            <a:r>
+              <a:rPr lang="en-US" dirty="0"/>
+              <a:t>Click to edit Master title style</a:t>
+            </a:r>
+          </a:p>
+        </p:txBody>
+      </p:sp>
+      <p:sp>
+        <p:nvSpPr>
+          <p:cNvPr id="6" name="Text Placeholder 5"/>
+          <p:cNvSpPr>
+            <a:spLocks noGrp="1"/>
+          </p:cNvSpPr>
+          <p:nvPr>
+            <p:ph type="body" sz="quarter" idx="10"/>
+          </p:nvPr>
+        </p:nvSpPr>
+        <p:spPr>
+          <a:xfrm>
+            <a:off x="269239" y="1189177"/>
+            <a:ext cx="11653523" cy="2492477"/>
+          </a:xfrm>
+        </p:spPr>
+        <p:txBody>
+          <a:bodyPr/>
+          <a:lstStyle>
+            <a:lvl1pPr marL="0" indent="0">
+              <a:buNone/>
+              <a:defRPr>
+                <a:gradFill>
+                  <a:gsLst>
+                    <a:gs pos="1250">
+                      <a:schemeClr val="tx2"/>
+                    </a:gs>
+                    <a:gs pos="99000">
+                      <a:schemeClr val="tx2"/>
+                    </a:gs>
+                  </a:gsLst>
+                  <a:lin ang="5400000" scaled="0"/>
+                </a:gradFill>
+              </a:defRPr>
+            </a:lvl1pPr>
+            <a:lvl2pPr marL="0" indent="0">
+              <a:buFontTx/>
+              <a:buNone/>
+              <a:defRPr sz="1961"/>
+            </a:lvl2pPr>
+            <a:lvl3pPr marL="224097" indent="0">
+              <a:buNone/>
+              <a:defRPr/>
+            </a:lvl3pPr>
+            <a:lvl4pPr marL="448193" indent="0">
+              <a:buNone/>
+              <a:defRPr/>
+            </a:lvl4pPr>
+            <a:lvl5pPr marL="672290" indent="0">
+              <a:buNone/>
+              <a:defRPr/>
+            </a:lvl5pPr>
+          </a:lstStyle>
+          <a:p>
+            <a:pPr lvl="0"/>
+            <a:r>
+              <a:rPr lang="en-US" dirty="0"/>
+              <a:t>Click to edit Master text styles</a:t>
+            </a:r>
+          </a:p>
+          <a:p>
+            <a:pPr lvl="1"/>
+            <a:r>
+              <a:rPr lang="en-US" dirty="0"/>
+              <a:t>Second level</a:t>
+            </a:r>
+          </a:p>
+          <a:p>
+            <a:pPr lvl="2"/>
+            <a:r>
+              <a:rPr lang="en-US" dirty="0"/>
+              <a:t>Third level</a:t>
+            </a:r>
+          </a:p>
+          <a:p>
+            <a:pPr lvl="3"/>
+            <a:r>
+              <a:rPr lang="en-US" dirty="0"/>
+              <a:t>Fourth level</a:t>
+            </a:r>
+          </a:p>
+          <a:p>
+            <a:pPr lvl="4"/>
+            <a:r>
+              <a:rPr lang="en-US" dirty="0"/>
+              <a:t>Fifth level</a:t>
+            </a:r>
+          </a:p>
+        </p:txBody>
+      </p:sp>
+    </p:spTree>
+    <p:extLst>
+      <p:ext uri="{BB962C8B-B14F-4D97-AF65-F5344CB8AC3E}">
+        <p14:creationId xmlns:p14="http://schemas.microsoft.com/office/powerpoint/2010/main" val="2850564267"/>
+      </p:ext>
+    </p:extLst>
+  </p:cSld>
+  <p:clrMapOvr>
+    <a:masterClrMapping/>
+  </p:clrMapOvr>
+  <p:transition>
+    <p:fade/>
+  </p:transition>
+</p:sldLayout>
+</file>
+
+<file path=ppt/slideLayouts/slideLayout8.xml><?xml version="1.0" encoding="utf-8"?>
+<p:sldLayout xmlns:a="http://schemas.openxmlformats.org/drawingml/2006/main" xmlns:r="http://schemas.openxmlformats.org/officeDocument/2006/relationships" xmlns:p="http://schemas.openxmlformats.org/presentationml/2006/main" userDrawn="1">
+  <p:cSld name="Title and Content 1st level color text">
+    <p:spTree>
+      <p:nvGrpSpPr>
+        <p:cNvPr id="1" name=""/>
+        <p:cNvGrpSpPr/>
+        <p:nvPr/>
+      </p:nvGrpSpPr>
+      <p:grpSpPr>
+        <a:xfrm>
+          <a:off x="0" y="0"/>
+          <a:ext cx="0" cy="0"/>
+          <a:chOff x="0" y="0"/>
+          <a:chExt cx="0" cy="0"/>
+        </a:xfrm>
+      </p:grpSpPr>
+      <p:sp>
+        <p:nvSpPr>
+          <p:cNvPr id="4" name="Text Placeholder 3"/>
+          <p:cNvSpPr>
+            <a:spLocks noGrp="1"/>
+          </p:cNvSpPr>
+          <p:nvPr>
+            <p:ph type="body" sz="quarter" idx="10"/>
+          </p:nvPr>
+        </p:nvSpPr>
+        <p:spPr>
+          <a:xfrm>
+            <a:off x="359016" y="1189177"/>
+            <a:ext cx="11473970" cy="2867773"/>
+          </a:xfrm>
+        </p:spPr>
+        <p:txBody>
+          <a:bodyPr wrap="square">
+            <a:spAutoFit/>
+          </a:bodyPr>
+          <a:lstStyle>
+            <a:lvl1pPr>
+              <a:defRPr sz="4706">
+                <a:gradFill>
+                  <a:gsLst>
+                    <a:gs pos="1250">
+                      <a:schemeClr val="tx2"/>
+                    </a:gs>
+                    <a:gs pos="99000">
+                      <a:schemeClr val="tx2"/>
+                    </a:gs>
+                  </a:gsLst>
+                  <a:lin ang="5400000" scaled="0"/>
+                </a:gradFill>
+              </a:defRPr>
+            </a:lvl1pPr>
+          </a:lstStyle>
+          <a:p>
+            <a:pPr lvl="0"/>
+            <a:r>
+              <a:rPr lang="en-US"/>
+              <a:t>Click to edit Master text styles</a:t>
+            </a:r>
+          </a:p>
+          <a:p>
+            <a:pPr lvl="1"/>
+            <a:r>
+              <a:rPr lang="en-US"/>
+              <a:t>Second level</a:t>
+            </a:r>
+          </a:p>
+          <a:p>
+            <a:pPr lvl="2"/>
+            <a:r>
+              <a:rPr lang="en-US"/>
+              <a:t>Third level</a:t>
+            </a:r>
+          </a:p>
+          <a:p>
+            <a:pPr lvl="3"/>
+            <a:r>
+              <a:rPr lang="en-US"/>
+              <a:t>Fourth level</a:t>
+            </a:r>
+          </a:p>
+          <a:p>
+            <a:pPr lvl="4"/>
+            <a:r>
+              <a:rPr lang="en-US"/>
+              <a:t>Fifth level</a:t>
+            </a:r>
+            <a:endParaRPr lang="en-US" dirty="0"/>
+          </a:p>
+        </p:txBody>
+      </p:sp>
+      <p:sp>
+        <p:nvSpPr>
+          <p:cNvPr id="6" name="Title 5"/>
+          <p:cNvSpPr>
+            <a:spLocks noGrp="1"/>
+          </p:cNvSpPr>
+          <p:nvPr>
+            <p:ph type="title"/>
+          </p:nvPr>
+        </p:nvSpPr>
+        <p:spPr/>
+        <p:txBody>
+          <a:bodyPr/>
+          <a:lstStyle/>
+          <a:p>
+            <a:r>
+              <a:rPr lang="en-US"/>
+              <a:t>Click to edit Master title style</a:t>
+            </a:r>
+          </a:p>
+        </p:txBody>
+      </p:sp>
+    </p:spTree>
+    <p:extLst>
+      <p:ext uri="{BB962C8B-B14F-4D97-AF65-F5344CB8AC3E}">
+        <p14:creationId xmlns:p14="http://schemas.microsoft.com/office/powerpoint/2010/main" val="214408555"/>
+      </p:ext>
+    </p:extLst>
+  </p:cSld>
+  <p:clrMapOvr>
+    <a:masterClrMapping/>
+  </p:clrMapOvr>
+  <p:transition>
+    <p:fade/>
+  </p:transition>
+</p:sldLayout>
+</file>
+
+<file path=ppt/slideLayouts/slideLayout9.xml><?xml version="1.0" encoding="utf-8"?>
 <p:sldLayout xmlns:a="http://schemas.openxmlformats.org/drawingml/2006/main" xmlns:r="http://schemas.openxmlformats.org/officeDocument/2006/relationships" xmlns:p="http://schemas.openxmlformats.org/presentationml/2006/main" preserve="1">
   <p:cSld name="Title and Content - 2 Column">
     <p:bg>
@@ -22892,614 +22650,6 @@
     <p:extLst>
       <p:ext uri="{BB962C8B-B14F-4D97-AF65-F5344CB8AC3E}">
         <p14:creationId xmlns:p14="http://schemas.microsoft.com/office/powerpoint/2010/main" val="2912206317"/>
-      </p:ext>
-    </p:extLst>
-  </p:cSld>
-  <p:clrMapOvr>
-    <a:masterClrMapping/>
-  </p:clrMapOvr>
-  <p:transition>
-    <p:fade/>
-  </p:transition>
-</p:sldLayout>
-</file>
-
-<file path=ppt/slideLayouts/slideLayout8.xml><?xml version="1.0" encoding="utf-8"?>
-<p:sldLayout xmlns:a="http://schemas.openxmlformats.org/drawingml/2006/main" xmlns:r="http://schemas.openxmlformats.org/officeDocument/2006/relationships" xmlns:p="http://schemas.openxmlformats.org/presentationml/2006/main" preserve="1">
-  <p:cSld name="Title and Compare">
-    <p:bg>
-      <p:bgPr>
-        <a:solidFill>
-          <a:srgbClr val="1574B8"/>
-        </a:solidFill>
-        <a:effectLst/>
-      </p:bgPr>
-    </p:bg>
-    <p:spTree>
-      <p:nvGrpSpPr>
-        <p:cNvPr id="1" name=""/>
-        <p:cNvGrpSpPr/>
-        <p:nvPr/>
-      </p:nvGrpSpPr>
-      <p:grpSpPr>
-        <a:xfrm>
-          <a:off x="0" y="0"/>
-          <a:ext cx="0" cy="0"/>
-          <a:chOff x="0" y="0"/>
-          <a:chExt cx="0" cy="0"/>
-        </a:xfrm>
-      </p:grpSpPr>
-      <p:sp>
-        <p:nvSpPr>
-          <p:cNvPr id="7" name="Content Placeholder 6"/>
-          <p:cNvSpPr>
-            <a:spLocks noGrp="1"/>
-          </p:cNvSpPr>
-          <p:nvPr>
-            <p:ph sz="quarter" idx="10"/>
-          </p:nvPr>
-        </p:nvSpPr>
-        <p:spPr>
-          <a:xfrm>
-            <a:off x="293121" y="2253750"/>
-            <a:ext cx="5378549" cy="1889748"/>
-          </a:xfrm>
-        </p:spPr>
-        <p:txBody>
-          <a:bodyPr/>
-          <a:lstStyle/>
-          <a:p>
-            <a:pPr lvl="0"/>
-            <a:r>
-              <a:rPr lang="en-US"/>
-              <a:t>Edit Master text styles</a:t>
-            </a:r>
-          </a:p>
-          <a:p>
-            <a:pPr lvl="1"/>
-            <a:r>
-              <a:rPr lang="en-US"/>
-              <a:t>Second level</a:t>
-            </a:r>
-          </a:p>
-          <a:p>
-            <a:pPr lvl="2"/>
-            <a:r>
-              <a:rPr lang="en-US"/>
-              <a:t>Third level</a:t>
-            </a:r>
-          </a:p>
-        </p:txBody>
-      </p:sp>
-      <p:sp>
-        <p:nvSpPr>
-          <p:cNvPr id="8" name="Content Placeholder 6"/>
-          <p:cNvSpPr>
-            <a:spLocks noGrp="1"/>
-          </p:cNvSpPr>
-          <p:nvPr>
-            <p:ph sz="quarter" idx="11"/>
-          </p:nvPr>
-        </p:nvSpPr>
-        <p:spPr>
-          <a:xfrm>
-            <a:off x="6457075" y="2253750"/>
-            <a:ext cx="5378549" cy="1889748"/>
-          </a:xfrm>
-        </p:spPr>
-        <p:txBody>
-          <a:bodyPr/>
-          <a:lstStyle/>
-          <a:p>
-            <a:pPr lvl="0"/>
-            <a:r>
-              <a:rPr lang="en-US"/>
-              <a:t>Edit Master text styles</a:t>
-            </a:r>
-          </a:p>
-          <a:p>
-            <a:pPr lvl="1"/>
-            <a:r>
-              <a:rPr lang="en-US"/>
-              <a:t>Second level</a:t>
-            </a:r>
-          </a:p>
-          <a:p>
-            <a:pPr lvl="2"/>
-            <a:r>
-              <a:rPr lang="en-US"/>
-              <a:t>Third level</a:t>
-            </a:r>
-          </a:p>
-        </p:txBody>
-      </p:sp>
-      <p:sp>
-        <p:nvSpPr>
-          <p:cNvPr id="9" name="Content Placeholder 6"/>
-          <p:cNvSpPr>
-            <a:spLocks noGrp="1"/>
-          </p:cNvSpPr>
-          <p:nvPr>
-            <p:ph sz="quarter" idx="12" hasCustomPrompt="1"/>
-          </p:nvPr>
-        </p:nvSpPr>
-        <p:spPr>
-          <a:xfrm>
-            <a:off x="293761" y="1367394"/>
-            <a:ext cx="5378549" cy="669927"/>
-          </a:xfrm>
-        </p:spPr>
-        <p:txBody>
-          <a:bodyPr/>
-          <a:lstStyle>
-            <a:lvl1pPr marL="0" indent="0">
-              <a:buNone/>
-              <a:defRPr sz="3529" b="1" baseline="0"/>
-            </a:lvl1pPr>
-          </a:lstStyle>
-          <a:p>
-            <a:pPr lvl="0"/>
-            <a:r>
-              <a:rPr lang="en-US" dirty="0"/>
-              <a:t>Comparison 1</a:t>
-            </a:r>
-          </a:p>
-        </p:txBody>
-      </p:sp>
-      <p:sp>
-        <p:nvSpPr>
-          <p:cNvPr id="10" name="Content Placeholder 6"/>
-          <p:cNvSpPr>
-            <a:spLocks noGrp="1"/>
-          </p:cNvSpPr>
-          <p:nvPr>
-            <p:ph sz="quarter" idx="13" hasCustomPrompt="1"/>
-          </p:nvPr>
-        </p:nvSpPr>
-        <p:spPr>
-          <a:xfrm>
-            <a:off x="6457715" y="1367394"/>
-            <a:ext cx="5378549" cy="669927"/>
-          </a:xfrm>
-        </p:spPr>
-        <p:txBody>
-          <a:bodyPr/>
-          <a:lstStyle>
-            <a:lvl1pPr marL="0" indent="0">
-              <a:buNone/>
-              <a:defRPr sz="3529" b="1"/>
-            </a:lvl1pPr>
-          </a:lstStyle>
-          <a:p>
-            <a:pPr lvl="0"/>
-            <a:r>
-              <a:rPr lang="en-US" dirty="0"/>
-              <a:t>Comparison 1</a:t>
-            </a:r>
-          </a:p>
-        </p:txBody>
-      </p:sp>
-      <p:sp>
-        <p:nvSpPr>
-          <p:cNvPr id="11" name="Title 1"/>
-          <p:cNvSpPr>
-            <a:spLocks noGrp="1"/>
-          </p:cNvSpPr>
-          <p:nvPr>
-            <p:ph type="title"/>
-          </p:nvPr>
-        </p:nvSpPr>
-        <p:spPr>
-          <a:xfrm>
-            <a:off x="268930" y="291068"/>
-            <a:ext cx="11653832" cy="899665"/>
-          </a:xfrm>
-        </p:spPr>
-        <p:txBody>
-          <a:bodyPr/>
-          <a:lstStyle/>
-          <a:p>
-            <a:r>
-              <a:rPr lang="en-US"/>
-              <a:t>Click to edit Master title style</a:t>
-            </a:r>
-            <a:endParaRPr lang="en-US" dirty="0"/>
-          </a:p>
-        </p:txBody>
-      </p:sp>
-    </p:spTree>
-    <p:extLst>
-      <p:ext uri="{BB962C8B-B14F-4D97-AF65-F5344CB8AC3E}">
-        <p14:creationId xmlns:p14="http://schemas.microsoft.com/office/powerpoint/2010/main" val="3272348533"/>
-      </p:ext>
-    </p:extLst>
-  </p:cSld>
-  <p:clrMapOvr>
-    <a:masterClrMapping/>
-  </p:clrMapOvr>
-  <p:transition>
-    <p:fade/>
-  </p:transition>
-</p:sldLayout>
-</file>
-
-<file path=ppt/slideLayouts/slideLayout9.xml><?xml version="1.0" encoding="utf-8"?>
-<p:sldLayout xmlns:a="http://schemas.openxmlformats.org/drawingml/2006/main" xmlns:r="http://schemas.openxmlformats.org/officeDocument/2006/relationships" xmlns:p="http://schemas.openxmlformats.org/presentationml/2006/main" preserve="1">
-  <p:cSld name="Demo">
-    <p:bg>
-      <p:bgPr>
-        <a:solidFill>
-          <a:srgbClr val="1574B8"/>
-        </a:solidFill>
-        <a:effectLst/>
-      </p:bgPr>
-    </p:bg>
-    <p:spTree>
-      <p:nvGrpSpPr>
-        <p:cNvPr id="1" name=""/>
-        <p:cNvGrpSpPr/>
-        <p:nvPr/>
-      </p:nvGrpSpPr>
-      <p:grpSpPr>
-        <a:xfrm>
-          <a:off x="0" y="0"/>
-          <a:ext cx="0" cy="0"/>
-          <a:chOff x="0" y="0"/>
-          <a:chExt cx="0" cy="0"/>
-        </a:xfrm>
-      </p:grpSpPr>
-      <p:sp>
-        <p:nvSpPr>
-          <p:cNvPr id="7" name="Text Placeholder 3"/>
-          <p:cNvSpPr>
-            <a:spLocks noGrp="1"/>
-          </p:cNvSpPr>
-          <p:nvPr>
-            <p:ph type="body" sz="quarter" idx="10" hasCustomPrompt="1"/>
-          </p:nvPr>
-        </p:nvSpPr>
-        <p:spPr>
-          <a:xfrm>
-            <a:off x="475025" y="4533945"/>
-            <a:ext cx="11240393" cy="683264"/>
-          </a:xfrm>
-        </p:spPr>
-        <p:txBody>
-          <a:bodyPr/>
-          <a:lstStyle>
-            <a:lvl1pPr marL="0" indent="0" algn="r">
-              <a:buNone/>
-              <a:defRPr sz="3600" i="0"/>
-            </a:lvl1pPr>
-            <a:lvl2pPr marL="336145" indent="0">
-              <a:buNone/>
-              <a:defRPr/>
-            </a:lvl2pPr>
-            <a:lvl3pPr marL="560241" indent="0">
-              <a:buNone/>
-              <a:defRPr/>
-            </a:lvl3pPr>
-            <a:lvl4pPr marL="784338" indent="0">
-              <a:buNone/>
-              <a:defRPr/>
-            </a:lvl4pPr>
-            <a:lvl5pPr marL="1008435" indent="0">
-              <a:buNone/>
-              <a:defRPr/>
-            </a:lvl5pPr>
-          </a:lstStyle>
-          <a:p>
-            <a:pPr lvl="0"/>
-            <a:r>
-              <a:rPr lang="en-US" dirty="0"/>
-              <a:t>Click to edit demo name</a:t>
-            </a:r>
-          </a:p>
-        </p:txBody>
-      </p:sp>
-      <p:sp>
-        <p:nvSpPr>
-          <p:cNvPr id="8" name="TextBox 7"/>
-          <p:cNvSpPr txBox="1"/>
-          <p:nvPr/>
-        </p:nvSpPr>
-        <p:spPr>
-          <a:xfrm>
-            <a:off x="7569411" y="2655027"/>
-            <a:ext cx="4146007" cy="1888209"/>
-          </a:xfrm>
-          <a:prstGeom prst="rect">
-            <a:avLst/>
-          </a:prstGeom>
-          <a:noFill/>
-        </p:spPr>
-        <p:txBody>
-          <a:bodyPr wrap="none" lIns="182880" tIns="146304" rIns="182880" bIns="146304" rtlCol="0">
-            <a:spAutoFit/>
-          </a:bodyPr>
-          <a:lstStyle/>
-          <a:p>
-            <a:pPr marL="0" marR="0" lvl="0" indent="0" algn="l" defTabSz="914400" rtl="0" eaLnBrk="1" fontAlgn="auto" latinLnBrk="0" hangingPunct="1">
-              <a:lnSpc>
-                <a:spcPct val="90000"/>
-              </a:lnSpc>
-              <a:spcBef>
-                <a:spcPts val="0"/>
-              </a:spcBef>
-              <a:spcAft>
-                <a:spcPts val="600"/>
-              </a:spcAft>
-              <a:buClrTx/>
-              <a:buSzTx/>
-              <a:buFontTx/>
-              <a:buNone/>
-              <a:tabLst/>
-              <a:defRPr/>
-            </a:pPr>
-            <a:r>
-              <a:rPr kumimoji="0" lang="en-US" sz="11500" b="0" i="0" u="none" strike="noStrike" kern="1200" cap="none" spc="0" normalizeH="0" baseline="0" noProof="0" dirty="0">
-                <a:ln>
-                  <a:noFill/>
-                </a:ln>
-                <a:gradFill>
-                  <a:gsLst>
-                    <a:gs pos="2917">
-                      <a:prstClr val="white"/>
-                    </a:gs>
-                    <a:gs pos="30000">
-                      <a:prstClr val="white"/>
-                    </a:gs>
-                  </a:gsLst>
-                  <a:lin ang="5400000" scaled="0"/>
-                </a:gradFill>
-                <a:effectLst/>
-                <a:uLnTx/>
-                <a:uFillTx/>
-                <a:latin typeface="Segoe UI Light"/>
-                <a:ea typeface="+mn-ea"/>
-                <a:cs typeface="+mn-cs"/>
-              </a:rPr>
-              <a:t>Demo</a:t>
-            </a:r>
-          </a:p>
-        </p:txBody>
-      </p:sp>
-      <p:pic>
-        <p:nvPicPr>
-          <p:cNvPr id="6" name="Picture 5"/>
-          <p:cNvPicPr>
-            <a:picLocks noChangeAspect="1"/>
-          </p:cNvPicPr>
-          <p:nvPr/>
-        </p:nvPicPr>
-        <p:blipFill>
-          <a:blip r:embed="rId2"/>
-          <a:stretch>
-            <a:fillRect/>
-          </a:stretch>
-        </p:blipFill>
-        <p:spPr>
-          <a:xfrm>
-            <a:off x="0" y="0"/>
-            <a:ext cx="12192000" cy="2858788"/>
-          </a:xfrm>
-          <a:prstGeom prst="rect">
-            <a:avLst/>
-          </a:prstGeom>
-        </p:spPr>
-      </p:pic>
-      <p:sp>
-        <p:nvSpPr>
-          <p:cNvPr id="9" name="TextBox 8"/>
-          <p:cNvSpPr txBox="1"/>
-          <p:nvPr/>
-        </p:nvSpPr>
-        <p:spPr>
-          <a:xfrm>
-            <a:off x="778469" y="1024876"/>
-            <a:ext cx="3740504" cy="1321387"/>
-          </a:xfrm>
-          <a:prstGeom prst="rect">
-            <a:avLst/>
-          </a:prstGeom>
-          <a:noFill/>
-        </p:spPr>
-        <p:txBody>
-          <a:bodyPr wrap="square" lIns="182880" tIns="146304" rIns="182880" bIns="146304" rtlCol="0">
-            <a:spAutoFit/>
-          </a:bodyPr>
-          <a:lstStyle/>
-          <a:p>
-            <a:pPr marL="0" marR="0" lvl="0" indent="0" algn="ctr" defTabSz="914400" rtl="0" eaLnBrk="1" fontAlgn="auto" latinLnBrk="0" hangingPunct="1">
-              <a:lnSpc>
-                <a:spcPts val="4000"/>
-              </a:lnSpc>
-              <a:spcBef>
-                <a:spcPts val="0"/>
-              </a:spcBef>
-              <a:spcAft>
-                <a:spcPts val="0"/>
-              </a:spcAft>
-              <a:buClrTx/>
-              <a:buSzTx/>
-              <a:buFontTx/>
-              <a:buNone/>
-              <a:tabLst/>
-              <a:defRPr/>
-            </a:pPr>
-            <a:r>
-              <a:rPr kumimoji="0" lang="en-US" sz="3600" b="0" i="0" u="none" strike="noStrike" kern="1200" cap="none" spc="0" normalizeH="0" baseline="0" noProof="0" dirty="0">
-                <a:ln>
-                  <a:noFill/>
-                </a:ln>
-                <a:solidFill>
-                  <a:srgbClr val="0070C0"/>
-                </a:solidFill>
-                <a:effectLst/>
-                <a:uLnTx/>
-                <a:uFillTx/>
-                <a:latin typeface="Segoe UI Light"/>
-                <a:ea typeface="+mn-ea"/>
-                <a:cs typeface="+mn-cs"/>
-              </a:rPr>
-              <a:t>Engineer to Engineer</a:t>
-            </a:r>
-          </a:p>
-        </p:txBody>
-      </p:sp>
-      <p:sp>
-        <p:nvSpPr>
-          <p:cNvPr id="10" name="TextBox 9"/>
-          <p:cNvSpPr txBox="1"/>
-          <p:nvPr userDrawn="1"/>
-        </p:nvSpPr>
-        <p:spPr>
-          <a:xfrm>
-            <a:off x="7569411" y="2655027"/>
-            <a:ext cx="4146007" cy="1888209"/>
-          </a:xfrm>
-          <a:prstGeom prst="rect">
-            <a:avLst/>
-          </a:prstGeom>
-          <a:noFill/>
-        </p:spPr>
-        <p:txBody>
-          <a:bodyPr wrap="none" lIns="182880" tIns="146304" rIns="182880" bIns="146304" rtlCol="0">
-            <a:spAutoFit/>
-          </a:bodyPr>
-          <a:lstStyle/>
-          <a:p>
-            <a:pPr>
-              <a:lnSpc>
-                <a:spcPct val="90000"/>
-              </a:lnSpc>
-              <a:spcAft>
-                <a:spcPts val="600"/>
-              </a:spcAft>
-            </a:pPr>
-            <a:r>
-              <a:rPr lang="en-US" sz="11500" dirty="0">
-                <a:gradFill>
-                  <a:gsLst>
-                    <a:gs pos="2917">
-                      <a:schemeClr val="tx1"/>
-                    </a:gs>
-                    <a:gs pos="30000">
-                      <a:schemeClr val="tx1"/>
-                    </a:gs>
-                  </a:gsLst>
-                  <a:lin ang="5400000" scaled="0"/>
-                </a:gradFill>
-                <a:latin typeface="+mj-lt"/>
-              </a:rPr>
-              <a:t>Demo</a:t>
-            </a:r>
-          </a:p>
-        </p:txBody>
-      </p:sp>
-      <p:pic>
-        <p:nvPicPr>
-          <p:cNvPr id="11" name="Picture 10"/>
-          <p:cNvPicPr>
-            <a:picLocks noChangeAspect="1"/>
-          </p:cNvPicPr>
-          <p:nvPr userDrawn="1"/>
-        </p:nvPicPr>
-        <p:blipFill>
-          <a:blip r:embed="rId2"/>
-          <a:stretch>
-            <a:fillRect/>
-          </a:stretch>
-        </p:blipFill>
-        <p:spPr>
-          <a:xfrm>
-            <a:off x="0" y="0"/>
-            <a:ext cx="12192000" cy="2858788"/>
-          </a:xfrm>
-          <a:prstGeom prst="rect">
-            <a:avLst/>
-          </a:prstGeom>
-        </p:spPr>
-      </p:pic>
-      <p:sp>
-        <p:nvSpPr>
-          <p:cNvPr id="12" name="TextBox 11"/>
-          <p:cNvSpPr txBox="1"/>
-          <p:nvPr userDrawn="1"/>
-        </p:nvSpPr>
-        <p:spPr>
-          <a:xfrm>
-            <a:off x="778469" y="1024876"/>
-            <a:ext cx="3740504" cy="1321387"/>
-          </a:xfrm>
-          <a:prstGeom prst="rect">
-            <a:avLst/>
-          </a:prstGeom>
-          <a:noFill/>
-        </p:spPr>
-        <p:txBody>
-          <a:bodyPr wrap="square" lIns="182880" tIns="146304" rIns="182880" bIns="146304" rtlCol="0">
-            <a:spAutoFit/>
-          </a:bodyPr>
-          <a:lstStyle/>
-          <a:p>
-            <a:pPr algn="ctr">
-              <a:lnSpc>
-                <a:spcPts val="4000"/>
-              </a:lnSpc>
-            </a:pPr>
-            <a:r>
-              <a:rPr lang="en-US" sz="3600" dirty="0">
-                <a:solidFill>
-                  <a:srgbClr val="0070C0"/>
-                </a:solidFill>
-                <a:latin typeface="+mj-lt"/>
-              </a:rPr>
-              <a:t>Engineer</a:t>
-            </a:r>
-            <a:r>
-              <a:rPr lang="en-US" sz="3600" baseline="0" dirty="0">
-                <a:solidFill>
-                  <a:srgbClr val="0070C0"/>
-                </a:solidFill>
-                <a:latin typeface="+mj-lt"/>
-              </a:rPr>
-              <a:t> </a:t>
-            </a:r>
-            <a:r>
-              <a:rPr lang="en-US" sz="3600" dirty="0">
-                <a:solidFill>
-                  <a:srgbClr val="0070C0"/>
-                </a:solidFill>
-                <a:latin typeface="+mj-lt"/>
-              </a:rPr>
-              <a:t>to</a:t>
-            </a:r>
-            <a:r>
-              <a:rPr lang="en-US" sz="3600" baseline="0" dirty="0">
-                <a:solidFill>
-                  <a:srgbClr val="0070C0"/>
-                </a:solidFill>
-                <a:latin typeface="+mj-lt"/>
-              </a:rPr>
-              <a:t> </a:t>
-            </a:r>
-            <a:r>
-              <a:rPr lang="en-US" sz="3600" dirty="0">
-                <a:solidFill>
-                  <a:srgbClr val="0070C0"/>
-                </a:solidFill>
-                <a:latin typeface="+mj-lt"/>
-              </a:rPr>
-              <a:t>Engineer</a:t>
-            </a:r>
-          </a:p>
-        </p:txBody>
-      </p:sp>
-    </p:spTree>
-    <p:extLst>
-      <p:ext uri="{BB962C8B-B14F-4D97-AF65-F5344CB8AC3E}">
-        <p14:creationId xmlns:p14="http://schemas.microsoft.com/office/powerpoint/2010/main" val="3786015623"/>
       </p:ext>
     </p:extLst>
   </p:cSld>
@@ -23632,65 +22782,6 @@
           </a:p>
         </p:txBody>
       </p:sp>
-      <p:sp>
-        <p:nvSpPr>
-          <p:cNvPr id="7" name="TextBox 6"/>
-          <p:cNvSpPr txBox="1"/>
-          <p:nvPr/>
-        </p:nvSpPr>
-        <p:spPr>
-          <a:xfrm>
-            <a:off x="5038145" y="6439306"/>
-            <a:ext cx="2114154" cy="442007"/>
-          </a:xfrm>
-          <a:prstGeom prst="rect">
-            <a:avLst/>
-          </a:prstGeom>
-          <a:noFill/>
-        </p:spPr>
-        <p:txBody>
-          <a:bodyPr wrap="none" lIns="179285" tIns="143428" rIns="179285" bIns="143428" rtlCol="0" anchor="ctr">
-            <a:spAutoFit/>
-          </a:bodyPr>
-          <a:lstStyle/>
-          <a:p>
-            <a:pPr marL="0" marR="0" lvl="0" indent="0" algn="ctr" defTabSz="914400" rtl="0" eaLnBrk="1" fontAlgn="auto" latinLnBrk="0" hangingPunct="1">
-              <a:lnSpc>
-                <a:spcPct val="90000"/>
-              </a:lnSpc>
-              <a:spcBef>
-                <a:spcPts val="0"/>
-              </a:spcBef>
-              <a:spcAft>
-                <a:spcPts val="588"/>
-              </a:spcAft>
-              <a:buClrTx/>
-              <a:buSzTx/>
-              <a:buFontTx/>
-              <a:buNone/>
-              <a:tabLst/>
-              <a:defRPr/>
-            </a:pPr>
-            <a:r>
-              <a:rPr kumimoji="0" lang="en-US" sz="1100" b="0" i="0" u="none" strike="noStrike" kern="1200" cap="none" spc="0" normalizeH="0" baseline="0" noProof="0" dirty="0">
-                <a:ln>
-                  <a:noFill/>
-                </a:ln>
-                <a:solidFill>
-                  <a:prstClr val="white"/>
-                </a:solidFill>
-                <a:effectLst/>
-                <a:uLnTx/>
-                <a:uFillTx/>
-                <a:latin typeface="Segoe UI"/>
-                <a:ea typeface="+mn-ea"/>
-                <a:cs typeface="+mn-cs"/>
-              </a:rPr>
-              <a:t>MICROSOFT CONFIDENTIAL</a:t>
-            </a:r>
-          </a:p>
-        </p:txBody>
-      </p:sp>
       <p:pic>
         <p:nvPicPr>
           <p:cNvPr id="8" name="Picture 7"/>
@@ -23700,7 +22791,7 @@
           <p:nvPr/>
         </p:nvPicPr>
         <p:blipFill>
-          <a:blip r:embed="rId21" cstate="screen">
+          <a:blip r:embed="rId17" cstate="screen">
             <a:extLst>
               <a:ext uri="{28A0092B-C50C-407E-A947-70E740481C1C}">
                 <a14:useLocalDpi xmlns:a14="http://schemas.microsoft.com/office/drawing/2010/main" val="0"/>
@@ -23736,19 +22827,15 @@
     <p:sldLayoutId id="2147483708" r:id="rId4"/>
     <p:sldLayoutId id="2147483709" r:id="rId5"/>
     <p:sldLayoutId id="2147483710" r:id="rId6"/>
-    <p:sldLayoutId id="2147483711" r:id="rId7"/>
-    <p:sldLayoutId id="2147483712" r:id="rId8"/>
-    <p:sldLayoutId id="2147483713" r:id="rId9"/>
-    <p:sldLayoutId id="2147483714" r:id="rId10"/>
-    <p:sldLayoutId id="2147483727" r:id="rId11"/>
-    <p:sldLayoutId id="2147483729" r:id="rId12"/>
-    <p:sldLayoutId id="2147483730" r:id="rId13"/>
-    <p:sldLayoutId id="2147483731" r:id="rId14"/>
-    <p:sldLayoutId id="2147483732" r:id="rId15"/>
-    <p:sldLayoutId id="2147483733" r:id="rId16"/>
-    <p:sldLayoutId id="2147483734" r:id="rId17"/>
-    <p:sldLayoutId id="2147483735" r:id="rId18"/>
-    <p:sldLayoutId id="2147483736" r:id="rId19"/>
+    <p:sldLayoutId id="2147483729" r:id="rId7"/>
+    <p:sldLayoutId id="2147483730" r:id="rId8"/>
+    <p:sldLayoutId id="2147483711" r:id="rId9"/>
+    <p:sldLayoutId id="2147483734" r:id="rId10"/>
+    <p:sldLayoutId id="2147483712" r:id="rId11"/>
+    <p:sldLayoutId id="2147483713" r:id="rId12"/>
+    <p:sldLayoutId id="2147483714" r:id="rId13"/>
+    <p:sldLayoutId id="2147483727" r:id="rId14"/>
+    <p:sldLayoutId id="2147483736" r:id="rId15"/>
   </p:sldLayoutIdLst>
   <p:transition>
     <p:fade/>
@@ -52710,6 +51797,15 @@
 </file>
 
 <file path=customXml/item1.xml><?xml version="1.0" encoding="utf-8"?>
+<?mso-contentType ?>
+<FormTemplates xmlns="http://schemas.microsoft.com/sharepoint/v3/contenttype/forms">
+  <Display>DocumentLibraryForm</Display>
+  <Edit>DocumentLibraryForm</Edit>
+  <New>DocumentLibraryForm</New>
+</FormTemplates>
+</file>
+
+<file path=customXml/item2.xml><?xml version="1.0" encoding="utf-8"?>
 <ct:contentTypeSchema xmlns:ct="http://schemas.microsoft.com/office/2006/metadata/contentType" xmlns:ma="http://schemas.microsoft.com/office/2006/metadata/properties/metaAttributes" ct:_="" ma:_="" ma:contentTypeName="Document" ma:contentTypeID="0x010100C08F381963C77D44A6A91469D5845EE5" ma:contentTypeVersion="2" ma:contentTypeDescription="Create a new document." ma:contentTypeScope="" ma:versionID="66290b1f7725e443aa19cdb7b89371b7">
   <xsd:schema xmlns:xsd="http://www.w3.org/2001/XMLSchema" xmlns:xs="http://www.w3.org/2001/XMLSchema" xmlns:p="http://schemas.microsoft.com/office/2006/metadata/properties" xmlns:ns2="c58f79d2-8dd2-43f0-9a03-e1b9f874d667" targetNamespace="http://schemas.microsoft.com/office/2006/metadata/properties" ma:root="true" ma:fieldsID="27a8e9c299bda407fa38b12f0db042eb" ns2:_="">
     <xsd:import namespace="c58f79d2-8dd2-43f0-9a03-e1b9f874d667"/>
@@ -52857,22 +51953,21 @@
 </ct:contentTypeSchema>
 </file>
 
-<file path=customXml/item2.xml><?xml version="1.0" encoding="utf-8"?>
+<file path=customXml/item3.xml><?xml version="1.0" encoding="utf-8"?>
 <p:properties xmlns:p="http://schemas.microsoft.com/office/2006/metadata/properties" xmlns:xsi="http://www.w3.org/2001/XMLSchema-instance" xmlns:pc="http://schemas.microsoft.com/office/infopath/2007/PartnerControls">
   <documentManagement/>
 </p:properties>
 </file>
 
-<file path=customXml/item3.xml><?xml version="1.0" encoding="utf-8"?>
-<?mso-contentType ?>
-<FormTemplates xmlns="http://schemas.microsoft.com/sharepoint/v3/contenttype/forms">
-  <Display>DocumentLibraryForm</Display>
-  <Edit>DocumentLibraryForm</Edit>
-  <New>DocumentLibraryForm</New>
-</FormTemplates>
+<file path=customXml/itemProps1.xml><?xml version="1.0" encoding="utf-8"?>
+<ds:datastoreItem xmlns:ds="http://schemas.openxmlformats.org/officeDocument/2006/customXml" ds:itemID="{D98B8685-CAA3-4A1A-8397-DF9971695697}">
+  <ds:schemaRefs>
+    <ds:schemaRef ds:uri="http://schemas.microsoft.com/sharepoint/v3/contenttype/forms"/>
+  </ds:schemaRefs>
+</ds:datastoreItem>
 </file>
 
-<file path=customXml/itemProps1.xml><?xml version="1.0" encoding="utf-8"?>
+<file path=customXml/itemProps2.xml><?xml version="1.0" encoding="utf-8"?>
 <ds:datastoreItem xmlns:ds="http://schemas.openxmlformats.org/officeDocument/2006/customXml" ds:itemID="{AE30008B-22D1-4C3E-A0BE-5BCAFBE11F82}">
   <ds:schemaRefs>
     <ds:schemaRef ds:uri="http://schemas.microsoft.com/office/2006/metadata/contentType"/>
@@ -52890,7 +51985,7 @@
 </ds:datastoreItem>
 </file>
 
-<file path=customXml/itemProps2.xml><?xml version="1.0" encoding="utf-8"?>
+<file path=customXml/itemProps3.xml><?xml version="1.0" encoding="utf-8"?>
 <ds:datastoreItem xmlns:ds="http://schemas.openxmlformats.org/officeDocument/2006/customXml" ds:itemID="{89254BEE-C2AB-4E68-AA3E-3E2702671367}">
   <ds:schemaRefs>
     <ds:schemaRef ds:uri="http://purl.org/dc/terms/"/>
@@ -52904,12 +51999,4 @@
     <ds:schemaRef ds:uri="http://purl.org/dc/dcmitype/"/>
   </ds:schemaRefs>
 </ds:datastoreItem>
-</file>
-
-<file path=customXml/itemProps3.xml><?xml version="1.0" encoding="utf-8"?>
-<ds:datastoreItem xmlns:ds="http://schemas.openxmlformats.org/officeDocument/2006/customXml" ds:itemID="{D98B8685-CAA3-4A1A-8397-DF9971695697}">
-  <ds:schemaRefs>
-    <ds:schemaRef ds:uri="http://schemas.microsoft.com/sharepoint/v3/contenttype/forms"/>
-  </ds:schemaRefs>
-</ds:datastoreItem>
 </file>
</xml_diff>

<commit_message>
#8 Updated subscription limits to fix storage account hard limits
#8 Updated subscription limits to fix storage account hard limits
</commit_message>
<xml_diff>
--- a/Designing and Managing Azure Subscriptions.pptx
+++ b/Designing and Managing Azure Subscriptions.pptx
@@ -4158,37 +4158,37 @@
     </dgm:pt>
   </dgm:ptLst>
   <dgm:cxnLst>
+    <dgm:cxn modelId="{1025A1CF-99C2-4AE8-BF6D-BACAE26C31CC}" type="presOf" srcId="{3C7C24DB-8124-4600-8124-82CB97C612DE}" destId="{870B1C01-2E98-4DA0-9D60-E3C620B6847E}" srcOrd="0" destOrd="1" presId="urn:diagrams.loki3.com/BracketList"/>
+    <dgm:cxn modelId="{6FF6D501-62E3-40F5-BB3C-38F777FC14B1}" srcId="{DCE76B8C-5454-45A8-B5E9-423DFD182833}" destId="{3500C572-DD82-4555-ADC2-C4110D6F9389}" srcOrd="0" destOrd="0" parTransId="{E25CBC09-1C1F-4D90-B932-C14146B0320B}" sibTransId="{21282713-A18B-4999-93C4-622D0DA067B1}"/>
+    <dgm:cxn modelId="{CC49C1F6-B80F-4087-911B-96CDE0661CB5}" type="presOf" srcId="{4C481E89-086A-4261-B1F5-09C8E85D0696}" destId="{593322B1-E75B-421B-A055-49C1E6D19777}" srcOrd="0" destOrd="0" presId="urn:diagrams.loki3.com/BracketList"/>
+    <dgm:cxn modelId="{ADFEE7E1-B777-4084-A3FF-6E33305E6ECD}" srcId="{F9A02CB7-7A96-40AB-86C7-04C8CF8EEAAD}" destId="{E2571387-F975-43E2-9DE2-A659C0867851}" srcOrd="0" destOrd="0" parTransId="{3FB9E31A-1A8E-4118-B745-D82295154280}" sibTransId="{6DA5E375-D837-488B-87E0-66A0425E4CFD}"/>
+    <dgm:cxn modelId="{BAEDBC5E-5082-4F1E-BDE5-5F2C956E46C6}" srcId="{4C481E89-086A-4261-B1F5-09C8E85D0696}" destId="{E9CE404D-B099-47FC-9420-86F7267F1588}" srcOrd="0" destOrd="0" parTransId="{4D701FCA-7E99-403B-8E1E-B434B208549C}" sibTransId="{B3E36B45-F682-4C4C-AAD8-8B9402F9F44E}"/>
+    <dgm:cxn modelId="{3B0CFA4A-E8EE-43CA-AC69-FDA57EA198E8}" type="presOf" srcId="{E2571387-F975-43E2-9DE2-A659C0867851}" destId="{1D443035-A535-49B1-9726-960626182737}" srcOrd="0" destOrd="0" presId="urn:diagrams.loki3.com/BracketList"/>
     <dgm:cxn modelId="{52E0EEB8-26DB-4208-9B57-223645D2A730}" srcId="{4C481E89-086A-4261-B1F5-09C8E85D0696}" destId="{8ACC8EE1-4822-412A-96F3-79B1141A9535}" srcOrd="1" destOrd="0" parTransId="{22F78713-DD1C-4F2D-B8B0-32EFBE3DB4A0}" sibTransId="{ADF9F0D8-C8DB-4374-9DF2-90BA5FC622CE}"/>
+    <dgm:cxn modelId="{ABB41559-6349-4AFE-A904-F36D35B5C6FB}" type="presOf" srcId="{13A66C28-B839-41A7-AC98-407323095BE5}" destId="{5F680636-8480-41FD-9846-F5F149D0E5F0}" srcOrd="0" destOrd="1" presId="urn:diagrams.loki3.com/BracketList"/>
+    <dgm:cxn modelId="{402E4C06-C26E-4F51-B9C3-AE683F3B42D9}" type="presOf" srcId="{F9A02CB7-7A96-40AB-86C7-04C8CF8EEAAD}" destId="{A53C0C4F-9D7A-46B1-9C64-1ACCCC9615B2}" srcOrd="0" destOrd="0" presId="urn:diagrams.loki3.com/BracketList"/>
+    <dgm:cxn modelId="{D4E42D5E-C163-4CDE-95CC-9E2B9D9D0650}" type="presOf" srcId="{076B833C-B004-4196-AF88-CFBFF0C777F4}" destId="{39BF825C-954A-4B6A-BC31-26853ADF10B8}" srcOrd="0" destOrd="0" presId="urn:diagrams.loki3.com/BracketList"/>
+    <dgm:cxn modelId="{C10279A9-079D-4ED2-912B-920DB3ECD3AE}" srcId="{481DD059-24EF-4EFD-A631-347D856782B6}" destId="{4C481E89-086A-4261-B1F5-09C8E85D0696}" srcOrd="3" destOrd="0" parTransId="{08D1C900-8BFD-4B4C-A4D8-DD804518155C}" sibTransId="{70A0D149-3CBF-4C52-8C75-D76D85BF3F2D}"/>
+    <dgm:cxn modelId="{F1061146-9BE3-493E-BA75-064656325D88}" srcId="{410A5818-4180-4CC3-AC21-BE0D02F20C2F}" destId="{C88FF542-7C95-4901-99D5-1BA014949587}" srcOrd="2" destOrd="0" parTransId="{FD5D5EA4-FDD6-4F2B-AE58-5C84EA7CB630}" sibTransId="{E164D379-477E-4D2F-9EEC-B3C65BB9F40D}"/>
+    <dgm:cxn modelId="{4F6CD4D4-2CEB-4EEF-98BD-BDCF30861741}" srcId="{481DD059-24EF-4EFD-A631-347D856782B6}" destId="{A7F76270-4ED8-4413-8607-0E71BD2ECC2A}" srcOrd="1" destOrd="0" parTransId="{48C019F4-0F29-486F-A310-88815FA75023}" sibTransId="{C8C10789-B529-4864-9D92-7019C0A20B02}"/>
+    <dgm:cxn modelId="{9CF2E979-5CDD-46F1-9DA8-1DC6233F0C2C}" srcId="{DCE76B8C-5454-45A8-B5E9-423DFD182833}" destId="{3C7C24DB-8124-4600-8124-82CB97C612DE}" srcOrd="1" destOrd="0" parTransId="{6DE15085-69C1-4A66-A1A2-3636F1F7081B}" sibTransId="{ABA8AB70-87E5-4CB4-A544-82577476AF29}"/>
+    <dgm:cxn modelId="{CC1F6E89-56BD-481E-A300-90FAAAF3AB07}" type="presOf" srcId="{E9CE404D-B099-47FC-9420-86F7267F1588}" destId="{2AC01722-AA7D-485A-8866-A853BC632BAC}" srcOrd="0" destOrd="0" presId="urn:diagrams.loki3.com/BracketList"/>
+    <dgm:cxn modelId="{A0A4147D-08C2-45A5-A761-2D0A154B2A18}" srcId="{481DD059-24EF-4EFD-A631-347D856782B6}" destId="{410A5818-4180-4CC3-AC21-BE0D02F20C2F}" srcOrd="0" destOrd="0" parTransId="{25FA0ADF-EF88-4993-A4C2-37EBA1533B48}" sibTransId="{30E01269-978F-4FC4-BA75-2789D8A8C5CB}"/>
+    <dgm:cxn modelId="{ED5918BB-0C91-48A0-BEFD-8A81085B2687}" type="presOf" srcId="{8ACC8EE1-4822-412A-96F3-79B1141A9535}" destId="{2AC01722-AA7D-485A-8866-A853BC632BAC}" srcOrd="0" destOrd="1" presId="urn:diagrams.loki3.com/BracketList"/>
+    <dgm:cxn modelId="{D71F4B9D-7A38-4091-ACCB-59EAEBCF3BFB}" type="presOf" srcId="{81EDAD43-6119-4F49-A5B4-C3045A7E6F51}" destId="{5F680636-8480-41FD-9846-F5F149D0E5F0}" srcOrd="0" destOrd="0" presId="urn:diagrams.loki3.com/BracketList"/>
+    <dgm:cxn modelId="{8B39D5BB-2526-4648-987A-3B86E0CF51B8}" type="presOf" srcId="{F055A1C1-F591-4B35-90F0-83E17AF505EE}" destId="{1D443035-A535-49B1-9726-960626182737}" srcOrd="0" destOrd="1" presId="urn:diagrams.loki3.com/BracketList"/>
+    <dgm:cxn modelId="{553C01D7-0F4B-4C79-A780-DD33D9DC6AF9}" type="presOf" srcId="{410A5818-4180-4CC3-AC21-BE0D02F20C2F}" destId="{3708892D-6F80-4055-9694-97DB0F312074}" srcOrd="0" destOrd="0" presId="urn:diagrams.loki3.com/BracketList"/>
+    <dgm:cxn modelId="{3A634BBC-E8BC-4841-8AD2-D5CE6E41801C}" type="presOf" srcId="{3500C572-DD82-4555-ADC2-C4110D6F9389}" destId="{870B1C01-2E98-4DA0-9D60-E3C620B6847E}" srcOrd="0" destOrd="0" presId="urn:diagrams.loki3.com/BracketList"/>
+    <dgm:cxn modelId="{74003FC1-8E34-4AD0-AC00-E17581463D9A}" type="presOf" srcId="{C88FF542-7C95-4901-99D5-1BA014949587}" destId="{5F680636-8480-41FD-9846-F5F149D0E5F0}" srcOrd="0" destOrd="2" presId="urn:diagrams.loki3.com/BracketList"/>
+    <dgm:cxn modelId="{32FB1AF6-84C6-47D8-B6E4-3718A3BBB25F}" type="presOf" srcId="{481DD059-24EF-4EFD-A631-347D856782B6}" destId="{425AC90C-0D8E-4A92-B494-300B64EB8BB8}" srcOrd="0" destOrd="0" presId="urn:diagrams.loki3.com/BracketList"/>
+    <dgm:cxn modelId="{EA2834F1-5189-4336-9692-02E2EAAA2D0F}" srcId="{410A5818-4180-4CC3-AC21-BE0D02F20C2F}" destId="{81EDAD43-6119-4F49-A5B4-C3045A7E6F51}" srcOrd="0" destOrd="0" parTransId="{C78368E8-773C-4FBC-821F-8064910A590F}" sibTransId="{C9B59B6A-C596-4719-B813-04C21CCC1B05}"/>
+    <dgm:cxn modelId="{02D7A7CE-DC1F-4BDA-A682-FC3A2037DEB0}" srcId="{481DD059-24EF-4EFD-A631-347D856782B6}" destId="{F9A02CB7-7A96-40AB-86C7-04C8CF8EEAAD}" srcOrd="2" destOrd="0" parTransId="{467F7C1B-A2DC-4D1D-BCA7-757899BBBDEC}" sibTransId="{D0FCB80B-20D1-4313-A78D-427AEBAB6C2A}"/>
+    <dgm:cxn modelId="{64FDA830-C84E-4417-BEC6-F7A63C77FA63}" srcId="{481DD059-24EF-4EFD-A631-347D856782B6}" destId="{DCE76B8C-5454-45A8-B5E9-423DFD182833}" srcOrd="4" destOrd="0" parTransId="{7AE3AC02-5660-41B0-A1E6-00B34D26718D}" sibTransId="{328EADF8-015B-4971-9525-3D692A2B6419}"/>
+    <dgm:cxn modelId="{93035B24-2630-49C3-BAB5-66F9DC21C81E}" srcId="{A7F76270-4ED8-4413-8607-0E71BD2ECC2A}" destId="{076B833C-B004-4196-AF88-CFBFF0C777F4}" srcOrd="0" destOrd="0" parTransId="{3DAD5F22-920C-49A6-8AE1-4E0382C0BC96}" sibTransId="{9B5A92BF-DF4B-4B61-ADEA-12086AA4BA32}"/>
+    <dgm:cxn modelId="{3371A37B-27F2-43D2-BE02-D26CF466EA6C}" type="presOf" srcId="{A7F76270-4ED8-4413-8607-0E71BD2ECC2A}" destId="{E6C2D637-0766-4A70-B6DA-6023FDA31FA4}" srcOrd="0" destOrd="0" presId="urn:diagrams.loki3.com/BracketList"/>
+    <dgm:cxn modelId="{BAB1D992-B570-4E0F-9449-4507C5440CC9}" srcId="{F9A02CB7-7A96-40AB-86C7-04C8CF8EEAAD}" destId="{F055A1C1-F591-4B35-90F0-83E17AF505EE}" srcOrd="1" destOrd="0" parTransId="{233BCC7B-A835-49D8-B5A0-521C49D524A5}" sibTransId="{059DC4CD-0DE4-4776-87B6-D6CC9432D4A3}"/>
     <dgm:cxn modelId="{44F90F38-61F5-4441-8595-9E95D0A520DA}" type="presOf" srcId="{DCE76B8C-5454-45A8-B5E9-423DFD182833}" destId="{C4EC7EEE-E4F2-411A-A90E-82D177E5DAAD}" srcOrd="0" destOrd="0" presId="urn:diagrams.loki3.com/BracketList"/>
-    <dgm:cxn modelId="{02D7A7CE-DC1F-4BDA-A682-FC3A2037DEB0}" srcId="{481DD059-24EF-4EFD-A631-347D856782B6}" destId="{F9A02CB7-7A96-40AB-86C7-04C8CF8EEAAD}" srcOrd="2" destOrd="0" parTransId="{467F7C1B-A2DC-4D1D-BCA7-757899BBBDEC}" sibTransId="{D0FCB80B-20D1-4313-A78D-427AEBAB6C2A}"/>
-    <dgm:cxn modelId="{74003FC1-8E34-4AD0-AC00-E17581463D9A}" type="presOf" srcId="{C88FF542-7C95-4901-99D5-1BA014949587}" destId="{5F680636-8480-41FD-9846-F5F149D0E5F0}" srcOrd="0" destOrd="2" presId="urn:diagrams.loki3.com/BracketList"/>
-    <dgm:cxn modelId="{CC1F6E89-56BD-481E-A300-90FAAAF3AB07}" type="presOf" srcId="{E9CE404D-B099-47FC-9420-86F7267F1588}" destId="{2AC01722-AA7D-485A-8866-A853BC632BAC}" srcOrd="0" destOrd="0" presId="urn:diagrams.loki3.com/BracketList"/>
-    <dgm:cxn modelId="{1025A1CF-99C2-4AE8-BF6D-BACAE26C31CC}" type="presOf" srcId="{3C7C24DB-8124-4600-8124-82CB97C612DE}" destId="{870B1C01-2E98-4DA0-9D60-E3C620B6847E}" srcOrd="0" destOrd="1" presId="urn:diagrams.loki3.com/BracketList"/>
-    <dgm:cxn modelId="{BAEDBC5E-5082-4F1E-BDE5-5F2C956E46C6}" srcId="{4C481E89-086A-4261-B1F5-09C8E85D0696}" destId="{E9CE404D-B099-47FC-9420-86F7267F1588}" srcOrd="0" destOrd="0" parTransId="{4D701FCA-7E99-403B-8E1E-B434B208549C}" sibTransId="{B3E36B45-F682-4C4C-AAD8-8B9402F9F44E}"/>
-    <dgm:cxn modelId="{C10279A9-079D-4ED2-912B-920DB3ECD3AE}" srcId="{481DD059-24EF-4EFD-A631-347D856782B6}" destId="{4C481E89-086A-4261-B1F5-09C8E85D0696}" srcOrd="3" destOrd="0" parTransId="{08D1C900-8BFD-4B4C-A4D8-DD804518155C}" sibTransId="{70A0D149-3CBF-4C52-8C75-D76D85BF3F2D}"/>
-    <dgm:cxn modelId="{EA2834F1-5189-4336-9692-02E2EAAA2D0F}" srcId="{410A5818-4180-4CC3-AC21-BE0D02F20C2F}" destId="{81EDAD43-6119-4F49-A5B4-C3045A7E6F51}" srcOrd="0" destOrd="0" parTransId="{C78368E8-773C-4FBC-821F-8064910A590F}" sibTransId="{C9B59B6A-C596-4719-B813-04C21CCC1B05}"/>
-    <dgm:cxn modelId="{8B39D5BB-2526-4648-987A-3B86E0CF51B8}" type="presOf" srcId="{F055A1C1-F591-4B35-90F0-83E17AF505EE}" destId="{1D443035-A535-49B1-9726-960626182737}" srcOrd="0" destOrd="1" presId="urn:diagrams.loki3.com/BracketList"/>
-    <dgm:cxn modelId="{32FB1AF6-84C6-47D8-B6E4-3718A3BBB25F}" type="presOf" srcId="{481DD059-24EF-4EFD-A631-347D856782B6}" destId="{425AC90C-0D8E-4A92-B494-300B64EB8BB8}" srcOrd="0" destOrd="0" presId="urn:diagrams.loki3.com/BracketList"/>
-    <dgm:cxn modelId="{3B0CFA4A-E8EE-43CA-AC69-FDA57EA198E8}" type="presOf" srcId="{E2571387-F975-43E2-9DE2-A659C0867851}" destId="{1D443035-A535-49B1-9726-960626182737}" srcOrd="0" destOrd="0" presId="urn:diagrams.loki3.com/BracketList"/>
-    <dgm:cxn modelId="{3A634BBC-E8BC-4841-8AD2-D5CE6E41801C}" type="presOf" srcId="{3500C572-DD82-4555-ADC2-C4110D6F9389}" destId="{870B1C01-2E98-4DA0-9D60-E3C620B6847E}" srcOrd="0" destOrd="0" presId="urn:diagrams.loki3.com/BracketList"/>
-    <dgm:cxn modelId="{A0A4147D-08C2-45A5-A761-2D0A154B2A18}" srcId="{481DD059-24EF-4EFD-A631-347D856782B6}" destId="{410A5818-4180-4CC3-AC21-BE0D02F20C2F}" srcOrd="0" destOrd="0" parTransId="{25FA0ADF-EF88-4993-A4C2-37EBA1533B48}" sibTransId="{30E01269-978F-4FC4-BA75-2789D8A8C5CB}"/>
     <dgm:cxn modelId="{51AC3403-1085-4D1C-B9E6-BA6AC82B83D5}" srcId="{410A5818-4180-4CC3-AC21-BE0D02F20C2F}" destId="{13A66C28-B839-41A7-AC98-407323095BE5}" srcOrd="1" destOrd="0" parTransId="{6DC6EA28-79D1-4777-80A6-D629BAD7F7D8}" sibTransId="{2EED67B7-7E1B-4902-B8AA-A382A6799ABF}"/>
-    <dgm:cxn modelId="{BAB1D992-B570-4E0F-9449-4507C5440CC9}" srcId="{F9A02CB7-7A96-40AB-86C7-04C8CF8EEAAD}" destId="{F055A1C1-F591-4B35-90F0-83E17AF505EE}" srcOrd="1" destOrd="0" parTransId="{233BCC7B-A835-49D8-B5A0-521C49D524A5}" sibTransId="{059DC4CD-0DE4-4776-87B6-D6CC9432D4A3}"/>
-    <dgm:cxn modelId="{CC49C1F6-B80F-4087-911B-96CDE0661CB5}" type="presOf" srcId="{4C481E89-086A-4261-B1F5-09C8E85D0696}" destId="{593322B1-E75B-421B-A055-49C1E6D19777}" srcOrd="0" destOrd="0" presId="urn:diagrams.loki3.com/BracketList"/>
-    <dgm:cxn modelId="{6FF6D501-62E3-40F5-BB3C-38F777FC14B1}" srcId="{DCE76B8C-5454-45A8-B5E9-423DFD182833}" destId="{3500C572-DD82-4555-ADC2-C4110D6F9389}" srcOrd="0" destOrd="0" parTransId="{E25CBC09-1C1F-4D90-B932-C14146B0320B}" sibTransId="{21282713-A18B-4999-93C4-622D0DA067B1}"/>
-    <dgm:cxn modelId="{553C01D7-0F4B-4C79-A780-DD33D9DC6AF9}" type="presOf" srcId="{410A5818-4180-4CC3-AC21-BE0D02F20C2F}" destId="{3708892D-6F80-4055-9694-97DB0F312074}" srcOrd="0" destOrd="0" presId="urn:diagrams.loki3.com/BracketList"/>
-    <dgm:cxn modelId="{9CF2E979-5CDD-46F1-9DA8-1DC6233F0C2C}" srcId="{DCE76B8C-5454-45A8-B5E9-423DFD182833}" destId="{3C7C24DB-8124-4600-8124-82CB97C612DE}" srcOrd="1" destOrd="0" parTransId="{6DE15085-69C1-4A66-A1A2-3636F1F7081B}" sibTransId="{ABA8AB70-87E5-4CB4-A544-82577476AF29}"/>
-    <dgm:cxn modelId="{ABB41559-6349-4AFE-A904-F36D35B5C6FB}" type="presOf" srcId="{13A66C28-B839-41A7-AC98-407323095BE5}" destId="{5F680636-8480-41FD-9846-F5F149D0E5F0}" srcOrd="0" destOrd="1" presId="urn:diagrams.loki3.com/BracketList"/>
-    <dgm:cxn modelId="{ED5918BB-0C91-48A0-BEFD-8A81085B2687}" type="presOf" srcId="{8ACC8EE1-4822-412A-96F3-79B1141A9535}" destId="{2AC01722-AA7D-485A-8866-A853BC632BAC}" srcOrd="0" destOrd="1" presId="urn:diagrams.loki3.com/BracketList"/>
-    <dgm:cxn modelId="{4F6CD4D4-2CEB-4EEF-98BD-BDCF30861741}" srcId="{481DD059-24EF-4EFD-A631-347D856782B6}" destId="{A7F76270-4ED8-4413-8607-0E71BD2ECC2A}" srcOrd="1" destOrd="0" parTransId="{48C019F4-0F29-486F-A310-88815FA75023}" sibTransId="{C8C10789-B529-4864-9D92-7019C0A20B02}"/>
-    <dgm:cxn modelId="{D71F4B9D-7A38-4091-ACCB-59EAEBCF3BFB}" type="presOf" srcId="{81EDAD43-6119-4F49-A5B4-C3045A7E6F51}" destId="{5F680636-8480-41FD-9846-F5F149D0E5F0}" srcOrd="0" destOrd="0" presId="urn:diagrams.loki3.com/BracketList"/>
-    <dgm:cxn modelId="{F1061146-9BE3-493E-BA75-064656325D88}" srcId="{410A5818-4180-4CC3-AC21-BE0D02F20C2F}" destId="{C88FF542-7C95-4901-99D5-1BA014949587}" srcOrd="2" destOrd="0" parTransId="{FD5D5EA4-FDD6-4F2B-AE58-5C84EA7CB630}" sibTransId="{E164D379-477E-4D2F-9EEC-B3C65BB9F40D}"/>
-    <dgm:cxn modelId="{93035B24-2630-49C3-BAB5-66F9DC21C81E}" srcId="{A7F76270-4ED8-4413-8607-0E71BD2ECC2A}" destId="{076B833C-B004-4196-AF88-CFBFF0C777F4}" srcOrd="0" destOrd="0" parTransId="{3DAD5F22-920C-49A6-8AE1-4E0382C0BC96}" sibTransId="{9B5A92BF-DF4B-4B61-ADEA-12086AA4BA32}"/>
-    <dgm:cxn modelId="{402E4C06-C26E-4F51-B9C3-AE683F3B42D9}" type="presOf" srcId="{F9A02CB7-7A96-40AB-86C7-04C8CF8EEAAD}" destId="{A53C0C4F-9D7A-46B1-9C64-1ACCCC9615B2}" srcOrd="0" destOrd="0" presId="urn:diagrams.loki3.com/BracketList"/>
-    <dgm:cxn modelId="{ADFEE7E1-B777-4084-A3FF-6E33305E6ECD}" srcId="{F9A02CB7-7A96-40AB-86C7-04C8CF8EEAAD}" destId="{E2571387-F975-43E2-9DE2-A659C0867851}" srcOrd="0" destOrd="0" parTransId="{3FB9E31A-1A8E-4118-B745-D82295154280}" sibTransId="{6DA5E375-D837-488B-87E0-66A0425E4CFD}"/>
-    <dgm:cxn modelId="{D4E42D5E-C163-4CDE-95CC-9E2B9D9D0650}" type="presOf" srcId="{076B833C-B004-4196-AF88-CFBFF0C777F4}" destId="{39BF825C-954A-4B6A-BC31-26853ADF10B8}" srcOrd="0" destOrd="0" presId="urn:diagrams.loki3.com/BracketList"/>
-    <dgm:cxn modelId="{64FDA830-C84E-4417-BEC6-F7A63C77FA63}" srcId="{481DD059-24EF-4EFD-A631-347D856782B6}" destId="{DCE76B8C-5454-45A8-B5E9-423DFD182833}" srcOrd="4" destOrd="0" parTransId="{7AE3AC02-5660-41B0-A1E6-00B34D26718D}" sibTransId="{328EADF8-015B-4971-9525-3D692A2B6419}"/>
-    <dgm:cxn modelId="{3371A37B-27F2-43D2-BE02-D26CF466EA6C}" type="presOf" srcId="{A7F76270-4ED8-4413-8607-0E71BD2ECC2A}" destId="{E6C2D637-0766-4A70-B6DA-6023FDA31FA4}" srcOrd="0" destOrd="0" presId="urn:diagrams.loki3.com/BracketList"/>
     <dgm:cxn modelId="{94E3828D-7C68-4A23-9EF1-AB310CA09EDE}" type="presParOf" srcId="{425AC90C-0D8E-4A92-B494-300B64EB8BB8}" destId="{2F4AD4DB-2DCC-46B8-95CA-DF8B36208F68}" srcOrd="0" destOrd="0" presId="urn:diagrams.loki3.com/BracketList"/>
     <dgm:cxn modelId="{5B44750A-F35B-4BC2-A599-A47F8F19670C}" type="presParOf" srcId="{2F4AD4DB-2DCC-46B8-95CA-DF8B36208F68}" destId="{3708892D-6F80-4055-9694-97DB0F312074}" srcOrd="0" destOrd="0" presId="urn:diagrams.loki3.com/BracketList"/>
     <dgm:cxn modelId="{231FA3C6-D5D6-40D7-BDD4-399215C833B9}" type="presParOf" srcId="{2F4AD4DB-2DCC-46B8-95CA-DF8B36208F68}" destId="{D5C5E418-8E8C-44CA-8046-C66B80EF4C7D}" srcOrd="1" destOrd="0" presId="urn:diagrams.loki3.com/BracketList"/>
@@ -4904,39 +4904,39 @@
     </dgm:pt>
   </dgm:ptLst>
   <dgm:cxnLst>
-    <dgm:cxn modelId="{58B0588E-6BFA-41C6-AAC3-AD1EE63F1DF7}" srcId="{4D99B075-5B8D-41F0-B463-2391E4DAF5BD}" destId="{1ED607FF-3661-425A-AF4F-60A73BEB2917}" srcOrd="1" destOrd="0" parTransId="{6A97A7A7-2E1B-4B7D-8B28-3C6A62AE2A0F}" sibTransId="{AD29A381-936A-49C0-8401-9FAD2DC7DF61}"/>
-    <dgm:cxn modelId="{BB8F22F7-D8B3-49A0-80DD-37EFEAF14379}" type="presOf" srcId="{B62F930F-0EB8-4AF6-BDBD-A3BB9B2D50F0}" destId="{F4A56BDE-BD38-478E-8D2B-7EA702532799}" srcOrd="0" destOrd="1" presId="urn:microsoft.com/office/officeart/2005/8/layout/hList1"/>
-    <dgm:cxn modelId="{FEC3A669-C5E7-4732-BF61-BF3F1D15BBEA}" srcId="{8E311BFE-FEA8-40AA-94AA-C531718B3C19}" destId="{07E516CC-E9E1-4692-A8CB-F52FBA9C761A}" srcOrd="0" destOrd="0" parTransId="{85D438C4-9C01-419B-8D65-B0114E3438BC}" sibTransId="{45C1FDB9-0E70-4932-848D-C5F2983BCF7A}"/>
-    <dgm:cxn modelId="{C12E7C47-BD92-442A-9FCF-BB2DA309ADE2}" srcId="{8E311BFE-FEA8-40AA-94AA-C531718B3C19}" destId="{9FF610F0-8163-4E50-845C-D03669A1C672}" srcOrd="2" destOrd="0" parTransId="{AB59D3B1-DC7B-4B8F-B38E-5A19B6B9515E}" sibTransId="{EE4766AD-C96B-430C-9E65-FB437C5EBE8A}"/>
-    <dgm:cxn modelId="{BC313005-6D08-4455-BB47-39907BB03881}" srcId="{1CEDE794-719B-4E58-80F7-48946D6F4C39}" destId="{47FB3728-AA32-4818-9AF0-0E3769526CA9}" srcOrd="7" destOrd="0" parTransId="{6AD6215E-47D8-4FFF-A4C2-9E91C60029A0}" sibTransId="{A8CFC310-3273-4CFC-90A8-B6F6DC85158E}"/>
-    <dgm:cxn modelId="{EA008D61-617C-4D4B-860F-B6A3F4136286}" srcId="{1CEDE794-719B-4E58-80F7-48946D6F4C39}" destId="{B04F25B9-E07B-4DB5-8E65-DE78A8B468CE}" srcOrd="1" destOrd="0" parTransId="{27B7B590-88F9-413B-840F-C670DF8F88FD}" sibTransId="{E44F76D6-6930-4A58-8B13-114643E19C2A}"/>
-    <dgm:cxn modelId="{1C3449AC-A28D-4F0D-ADFC-40DA9F8A2E54}" type="presOf" srcId="{7C9FE737-C85F-44D1-95F4-73F1A915E28F}" destId="{EA3CD924-AA8D-4D40-801C-2CE03896AA08}" srcOrd="0" destOrd="2" presId="urn:microsoft.com/office/officeart/2005/8/layout/hList1"/>
-    <dgm:cxn modelId="{8B4B8FEC-3F34-49A7-9B98-21C56333C94B}" srcId="{1CEDE794-719B-4E58-80F7-48946D6F4C39}" destId="{F3EC264E-870D-488D-88C1-CFC5E4C109AE}" srcOrd="6" destOrd="0" parTransId="{DF7564D6-E85F-4611-9CAA-3658A84D7A0F}" sibTransId="{863491DB-1946-42D7-8EF6-2CCB6DFAB983}"/>
+    <dgm:cxn modelId="{3B2A66A0-2D32-4255-8674-A9DD6D831E19}" srcId="{4D99B075-5B8D-41F0-B463-2391E4DAF5BD}" destId="{1CEDE794-719B-4E58-80F7-48946D6F4C39}" srcOrd="0" destOrd="0" parTransId="{E6B2A04F-1FBB-4F0E-8D11-C76E4E967A46}" sibTransId="{714E514D-C7F4-490F-87EC-E3771695FDF5}"/>
+    <dgm:cxn modelId="{0AAA31D9-55CA-4D86-80FA-50427296F34E}" srcId="{1CEDE794-719B-4E58-80F7-48946D6F4C39}" destId="{790DA81C-827F-49F3-B484-93867AA16FBF}" srcOrd="5" destOrd="0" parTransId="{BC59E756-AA71-4521-AE07-8DADE9EDFDB5}" sibTransId="{21717FCD-31BF-4820-9663-2B70FB1808B0}"/>
     <dgm:cxn modelId="{8F3098E5-1678-4DA5-9A9C-78B3D0E0B0F8}" srcId="{1CEDE794-719B-4E58-80F7-48946D6F4C39}" destId="{815CA2D0-9F97-4AE0-B7DC-D7A26339BD12}" srcOrd="3" destOrd="0" parTransId="{5559E3AE-085A-40DF-A72F-64B167C2A21C}" sibTransId="{79D0E9CB-B192-40E8-99A8-5B66A3B55E22}"/>
-    <dgm:cxn modelId="{437A6FC3-D84C-40A2-A019-B9F212B0774B}" srcId="{1CEDE794-719B-4E58-80F7-48946D6F4C39}" destId="{C47E1CBB-7813-44F4-B3D8-17FA20E63B3F}" srcOrd="0" destOrd="0" parTransId="{EA9BB675-0845-4246-A6FC-C09C9340CDB2}" sibTransId="{D825F73A-BC15-4801-B277-CE084C864DD4}"/>
-    <dgm:cxn modelId="{12A91E2E-7633-4DB0-884C-9AC7796A22DE}" srcId="{4D99B075-5B8D-41F0-B463-2391E4DAF5BD}" destId="{8E311BFE-FEA8-40AA-94AA-C531718B3C19}" srcOrd="2" destOrd="0" parTransId="{BEE7A90B-3BA5-489E-B4A6-38893BCD316A}" sibTransId="{5AA8B9C9-042C-4A12-9907-69FA09412143}"/>
-    <dgm:cxn modelId="{987D84AC-1995-46C2-AB6D-70C7D1C6D0E8}" type="presOf" srcId="{4D99B075-5B8D-41F0-B463-2391E4DAF5BD}" destId="{6853CB78-8BDB-4B63-81EA-4F520D881C0F}" srcOrd="0" destOrd="0" presId="urn:microsoft.com/office/officeart/2005/8/layout/hList1"/>
-    <dgm:cxn modelId="{B2EE5084-3141-4094-8FF7-7C550013DA43}" type="presOf" srcId="{F3EC264E-870D-488D-88C1-CFC5E4C109AE}" destId="{EA3CD924-AA8D-4D40-801C-2CE03896AA08}" srcOrd="0" destOrd="6" presId="urn:microsoft.com/office/officeart/2005/8/layout/hList1"/>
-    <dgm:cxn modelId="{B66EE2A1-2E3E-4E05-BF33-59B39762F6B8}" type="presOf" srcId="{9FF610F0-8163-4E50-845C-D03669A1C672}" destId="{F4A56BDE-BD38-478E-8D2B-7EA702532799}" srcOrd="0" destOrd="2" presId="urn:microsoft.com/office/officeart/2005/8/layout/hList1"/>
-    <dgm:cxn modelId="{CC191964-0BBD-4F2E-B393-AA1E82A2AC99}" type="presOf" srcId="{DB766A19-E0AE-49E9-84FD-3C5ACA46A5AD}" destId="{39243CDD-24B6-43FE-91F8-C6FA1DF5F73B}" srcOrd="0" destOrd="1" presId="urn:microsoft.com/office/officeart/2005/8/layout/hList1"/>
-    <dgm:cxn modelId="{486C4677-DBC2-4883-8193-AB2528E35C78}" type="presOf" srcId="{815CA2D0-9F97-4AE0-B7DC-D7A26339BD12}" destId="{EA3CD924-AA8D-4D40-801C-2CE03896AA08}" srcOrd="0" destOrd="3" presId="urn:microsoft.com/office/officeart/2005/8/layout/hList1"/>
-    <dgm:cxn modelId="{4A96B0CE-25AC-4674-A4E3-167B3BAA1E0D}" type="presOf" srcId="{790DA81C-827F-49F3-B484-93867AA16FBF}" destId="{EA3CD924-AA8D-4D40-801C-2CE03896AA08}" srcOrd="0" destOrd="5" presId="urn:microsoft.com/office/officeart/2005/8/layout/hList1"/>
-    <dgm:cxn modelId="{E2D07DED-C8F4-43C4-91B2-CF06C8709043}" srcId="{1ED607FF-3661-425A-AF4F-60A73BEB2917}" destId="{CB9FB6F4-C873-40AE-93FD-447C34F4F608}" srcOrd="0" destOrd="0" parTransId="{A1133099-BA20-41F6-BF63-B27632B83B87}" sibTransId="{DA3A5BAC-2761-4922-A3F8-8071B2C32422}"/>
-    <dgm:cxn modelId="{7EBEEDD6-24B4-425A-A947-B4EA5AA2CB79}" type="presOf" srcId="{47FB3728-AA32-4818-9AF0-0E3769526CA9}" destId="{EA3CD924-AA8D-4D40-801C-2CE03896AA08}" srcOrd="0" destOrd="7" presId="urn:microsoft.com/office/officeart/2005/8/layout/hList1"/>
-    <dgm:cxn modelId="{C311A6C2-6F77-4DD7-AFFA-44A57AA556FE}" srcId="{8E311BFE-FEA8-40AA-94AA-C531718B3C19}" destId="{B62F930F-0EB8-4AF6-BDBD-A3BB9B2D50F0}" srcOrd="1" destOrd="0" parTransId="{9B4C9B65-9AB5-422A-8435-CE4A9D2F329C}" sibTransId="{1DACF60F-8840-40E2-95A2-10739A847260}"/>
-    <dgm:cxn modelId="{99BFCDB6-6749-4F06-8672-60F0BD61F889}" type="presOf" srcId="{6CA302D5-E71C-4B07-A956-A87A48FBE11E}" destId="{EA3CD924-AA8D-4D40-801C-2CE03896AA08}" srcOrd="0" destOrd="4" presId="urn:microsoft.com/office/officeart/2005/8/layout/hList1"/>
-    <dgm:cxn modelId="{6D0E1069-EC92-4D92-998B-B464A2A61462}" type="presOf" srcId="{CB9FB6F4-C873-40AE-93FD-447C34F4F608}" destId="{39243CDD-24B6-43FE-91F8-C6FA1DF5F73B}" srcOrd="0" destOrd="0" presId="urn:microsoft.com/office/officeart/2005/8/layout/hList1"/>
-    <dgm:cxn modelId="{1124A44A-0CC2-41D4-A995-FE5FCFD5D238}" srcId="{1CEDE794-719B-4E58-80F7-48946D6F4C39}" destId="{7C9FE737-C85F-44D1-95F4-73F1A915E28F}" srcOrd="2" destOrd="0" parTransId="{CFCB3D5D-58E7-4444-AB17-ACD046B9494F}" sibTransId="{4902581D-0D57-407A-A2E6-2A5B546BE130}"/>
-    <dgm:cxn modelId="{3B2A66A0-2D32-4255-8674-A9DD6D831E19}" srcId="{4D99B075-5B8D-41F0-B463-2391E4DAF5BD}" destId="{1CEDE794-719B-4E58-80F7-48946D6F4C39}" srcOrd="0" destOrd="0" parTransId="{E6B2A04F-1FBB-4F0E-8D11-C76E4E967A46}" sibTransId="{714E514D-C7F4-490F-87EC-E3771695FDF5}"/>
     <dgm:cxn modelId="{1CAD3395-6965-4892-B5E2-A84760532C60}" srcId="{1ED607FF-3661-425A-AF4F-60A73BEB2917}" destId="{DB766A19-E0AE-49E9-84FD-3C5ACA46A5AD}" srcOrd="1" destOrd="0" parTransId="{E5813D5C-5983-4B83-A28D-6480A253EFD1}" sibTransId="{CAC688FD-8C2E-43F5-8E33-FB2064EE5751}"/>
     <dgm:cxn modelId="{358D56CD-180C-42C0-81C8-EAE9FD7DEFCC}" type="presOf" srcId="{8E311BFE-FEA8-40AA-94AA-C531718B3C19}" destId="{0A2A7896-0AED-4118-8FE5-55798E312CE8}" srcOrd="0" destOrd="0" presId="urn:microsoft.com/office/officeart/2005/8/layout/hList1"/>
+    <dgm:cxn modelId="{CC191964-0BBD-4F2E-B393-AA1E82A2AC99}" type="presOf" srcId="{DB766A19-E0AE-49E9-84FD-3C5ACA46A5AD}" destId="{39243CDD-24B6-43FE-91F8-C6FA1DF5F73B}" srcOrd="0" destOrd="1" presId="urn:microsoft.com/office/officeart/2005/8/layout/hList1"/>
+    <dgm:cxn modelId="{C311A6C2-6F77-4DD7-AFFA-44A57AA556FE}" srcId="{8E311BFE-FEA8-40AA-94AA-C531718B3C19}" destId="{B62F930F-0EB8-4AF6-BDBD-A3BB9B2D50F0}" srcOrd="1" destOrd="0" parTransId="{9B4C9B65-9AB5-422A-8435-CE4A9D2F329C}" sibTransId="{1DACF60F-8840-40E2-95A2-10739A847260}"/>
+    <dgm:cxn modelId="{4A96B0CE-25AC-4674-A4E3-167B3BAA1E0D}" type="presOf" srcId="{790DA81C-827F-49F3-B484-93867AA16FBF}" destId="{EA3CD924-AA8D-4D40-801C-2CE03896AA08}" srcOrd="0" destOrd="5" presId="urn:microsoft.com/office/officeart/2005/8/layout/hList1"/>
     <dgm:cxn modelId="{019A10A4-C311-449E-98E0-6610C9C23FC7}" type="presOf" srcId="{07E516CC-E9E1-4692-A8CB-F52FBA9C761A}" destId="{F4A56BDE-BD38-478E-8D2B-7EA702532799}" srcOrd="0" destOrd="0" presId="urn:microsoft.com/office/officeart/2005/8/layout/hList1"/>
+    <dgm:cxn modelId="{CAEB2122-24C6-4C04-9B66-BE264E9F76F8}" type="presOf" srcId="{B04F25B9-E07B-4DB5-8E65-DE78A8B468CE}" destId="{EA3CD924-AA8D-4D40-801C-2CE03896AA08}" srcOrd="0" destOrd="1" presId="urn:microsoft.com/office/officeart/2005/8/layout/hList1"/>
+    <dgm:cxn modelId="{E2D07DED-C8F4-43C4-91B2-CF06C8709043}" srcId="{1ED607FF-3661-425A-AF4F-60A73BEB2917}" destId="{CB9FB6F4-C873-40AE-93FD-447C34F4F608}" srcOrd="0" destOrd="0" parTransId="{A1133099-BA20-41F6-BF63-B27632B83B87}" sibTransId="{DA3A5BAC-2761-4922-A3F8-8071B2C32422}"/>
+    <dgm:cxn modelId="{486C4677-DBC2-4883-8193-AB2528E35C78}" type="presOf" srcId="{815CA2D0-9F97-4AE0-B7DC-D7A26339BD12}" destId="{EA3CD924-AA8D-4D40-801C-2CE03896AA08}" srcOrd="0" destOrd="3" presId="urn:microsoft.com/office/officeart/2005/8/layout/hList1"/>
+    <dgm:cxn modelId="{B66EE2A1-2E3E-4E05-BF33-59B39762F6B8}" type="presOf" srcId="{9FF610F0-8163-4E50-845C-D03669A1C672}" destId="{F4A56BDE-BD38-478E-8D2B-7EA702532799}" srcOrd="0" destOrd="2" presId="urn:microsoft.com/office/officeart/2005/8/layout/hList1"/>
+    <dgm:cxn modelId="{7EBEEDD6-24B4-425A-A947-B4EA5AA2CB79}" type="presOf" srcId="{47FB3728-AA32-4818-9AF0-0E3769526CA9}" destId="{EA3CD924-AA8D-4D40-801C-2CE03896AA08}" srcOrd="0" destOrd="7" presId="urn:microsoft.com/office/officeart/2005/8/layout/hList1"/>
+    <dgm:cxn modelId="{85A50305-AF3C-4F0D-A180-BC83C6101C0B}" srcId="{1CEDE794-719B-4E58-80F7-48946D6F4C39}" destId="{6CA302D5-E71C-4B07-A956-A87A48FBE11E}" srcOrd="4" destOrd="0" parTransId="{9A06DA32-4724-4F0D-9CD5-32EBD2C1BE74}" sibTransId="{2BC4B70D-FAE0-4743-9365-421574CB135A}"/>
+    <dgm:cxn modelId="{58B0588E-6BFA-41C6-AAC3-AD1EE63F1DF7}" srcId="{4D99B075-5B8D-41F0-B463-2391E4DAF5BD}" destId="{1ED607FF-3661-425A-AF4F-60A73BEB2917}" srcOrd="1" destOrd="0" parTransId="{6A97A7A7-2E1B-4B7D-8B28-3C6A62AE2A0F}" sibTransId="{AD29A381-936A-49C0-8401-9FAD2DC7DF61}"/>
+    <dgm:cxn modelId="{8B4B8FEC-3F34-49A7-9B98-21C56333C94B}" srcId="{1CEDE794-719B-4E58-80F7-48946D6F4C39}" destId="{F3EC264E-870D-488D-88C1-CFC5E4C109AE}" srcOrd="6" destOrd="0" parTransId="{DF7564D6-E85F-4611-9CAA-3658A84D7A0F}" sibTransId="{863491DB-1946-42D7-8EF6-2CCB6DFAB983}"/>
+    <dgm:cxn modelId="{12A91E2E-7633-4DB0-884C-9AC7796A22DE}" srcId="{4D99B075-5B8D-41F0-B463-2391E4DAF5BD}" destId="{8E311BFE-FEA8-40AA-94AA-C531718B3C19}" srcOrd="2" destOrd="0" parTransId="{BEE7A90B-3BA5-489E-B4A6-38893BCD316A}" sibTransId="{5AA8B9C9-042C-4A12-9907-69FA09412143}"/>
+    <dgm:cxn modelId="{E1FC8BD9-C7CD-4DD7-8EC4-14CE65DAA5A5}" type="presOf" srcId="{1ED607FF-3661-425A-AF4F-60A73BEB2917}" destId="{7A18D30B-EFAB-4DDD-BDBA-F0EFFC0400F4}" srcOrd="0" destOrd="0" presId="urn:microsoft.com/office/officeart/2005/8/layout/hList1"/>
+    <dgm:cxn modelId="{1C3449AC-A28D-4F0D-ADFC-40DA9F8A2E54}" type="presOf" srcId="{7C9FE737-C85F-44D1-95F4-73F1A915E28F}" destId="{EA3CD924-AA8D-4D40-801C-2CE03896AA08}" srcOrd="0" destOrd="2" presId="urn:microsoft.com/office/officeart/2005/8/layout/hList1"/>
+    <dgm:cxn modelId="{C12E7C47-BD92-442A-9FCF-BB2DA309ADE2}" srcId="{8E311BFE-FEA8-40AA-94AA-C531718B3C19}" destId="{9FF610F0-8163-4E50-845C-D03669A1C672}" srcOrd="2" destOrd="0" parTransId="{AB59D3B1-DC7B-4B8F-B38E-5A19B6B9515E}" sibTransId="{EE4766AD-C96B-430C-9E65-FB437C5EBE8A}"/>
+    <dgm:cxn modelId="{FEC3A669-C5E7-4732-BF61-BF3F1D15BBEA}" srcId="{8E311BFE-FEA8-40AA-94AA-C531718B3C19}" destId="{07E516CC-E9E1-4692-A8CB-F52FBA9C761A}" srcOrd="0" destOrd="0" parTransId="{85D438C4-9C01-419B-8D65-B0114E3438BC}" sibTransId="{45C1FDB9-0E70-4932-848D-C5F2983BCF7A}"/>
+    <dgm:cxn modelId="{99BFCDB6-6749-4F06-8672-60F0BD61F889}" type="presOf" srcId="{6CA302D5-E71C-4B07-A956-A87A48FBE11E}" destId="{EA3CD924-AA8D-4D40-801C-2CE03896AA08}" srcOrd="0" destOrd="4" presId="urn:microsoft.com/office/officeart/2005/8/layout/hList1"/>
+    <dgm:cxn modelId="{B2EE5084-3141-4094-8FF7-7C550013DA43}" type="presOf" srcId="{F3EC264E-870D-488D-88C1-CFC5E4C109AE}" destId="{EA3CD924-AA8D-4D40-801C-2CE03896AA08}" srcOrd="0" destOrd="6" presId="urn:microsoft.com/office/officeart/2005/8/layout/hList1"/>
+    <dgm:cxn modelId="{1124A44A-0CC2-41D4-A995-FE5FCFD5D238}" srcId="{1CEDE794-719B-4E58-80F7-48946D6F4C39}" destId="{7C9FE737-C85F-44D1-95F4-73F1A915E28F}" srcOrd="2" destOrd="0" parTransId="{CFCB3D5D-58E7-4444-AB17-ACD046B9494F}" sibTransId="{4902581D-0D57-407A-A2E6-2A5B546BE130}"/>
+    <dgm:cxn modelId="{BC313005-6D08-4455-BB47-39907BB03881}" srcId="{1CEDE794-719B-4E58-80F7-48946D6F4C39}" destId="{47FB3728-AA32-4818-9AF0-0E3769526CA9}" srcOrd="7" destOrd="0" parTransId="{6AD6215E-47D8-4FFF-A4C2-9E91C60029A0}" sibTransId="{A8CFC310-3273-4CFC-90A8-B6F6DC85158E}"/>
+    <dgm:cxn modelId="{6D0E1069-EC92-4D92-998B-B464A2A61462}" type="presOf" srcId="{CB9FB6F4-C873-40AE-93FD-447C34F4F608}" destId="{39243CDD-24B6-43FE-91F8-C6FA1DF5F73B}" srcOrd="0" destOrd="0" presId="urn:microsoft.com/office/officeart/2005/8/layout/hList1"/>
+    <dgm:cxn modelId="{987D84AC-1995-46C2-AB6D-70C7D1C6D0E8}" type="presOf" srcId="{4D99B075-5B8D-41F0-B463-2391E4DAF5BD}" destId="{6853CB78-8BDB-4B63-81EA-4F520D881C0F}" srcOrd="0" destOrd="0" presId="urn:microsoft.com/office/officeart/2005/8/layout/hList1"/>
+    <dgm:cxn modelId="{5ABD5F7F-01B3-4789-9C85-980185F4605C}" type="presOf" srcId="{1CEDE794-719B-4E58-80F7-48946D6F4C39}" destId="{179A36A7-8940-4968-A15E-8BA9BFD2EADA}" srcOrd="0" destOrd="0" presId="urn:microsoft.com/office/officeart/2005/8/layout/hList1"/>
+    <dgm:cxn modelId="{437A6FC3-D84C-40A2-A019-B9F212B0774B}" srcId="{1CEDE794-719B-4E58-80F7-48946D6F4C39}" destId="{C47E1CBB-7813-44F4-B3D8-17FA20E63B3F}" srcOrd="0" destOrd="0" parTransId="{EA9BB675-0845-4246-A6FC-C09C9340CDB2}" sibTransId="{D825F73A-BC15-4801-B277-CE084C864DD4}"/>
+    <dgm:cxn modelId="{BB8F22F7-D8B3-49A0-80DD-37EFEAF14379}" type="presOf" srcId="{B62F930F-0EB8-4AF6-BDBD-A3BB9B2D50F0}" destId="{F4A56BDE-BD38-478E-8D2B-7EA702532799}" srcOrd="0" destOrd="1" presId="urn:microsoft.com/office/officeart/2005/8/layout/hList1"/>
     <dgm:cxn modelId="{B68B5B9F-BE4F-4C4F-AA7F-E64EE2901F6E}" type="presOf" srcId="{C47E1CBB-7813-44F4-B3D8-17FA20E63B3F}" destId="{EA3CD924-AA8D-4D40-801C-2CE03896AA08}" srcOrd="0" destOrd="0" presId="urn:microsoft.com/office/officeart/2005/8/layout/hList1"/>
-    <dgm:cxn modelId="{CAEB2122-24C6-4C04-9B66-BE264E9F76F8}" type="presOf" srcId="{B04F25B9-E07B-4DB5-8E65-DE78A8B468CE}" destId="{EA3CD924-AA8D-4D40-801C-2CE03896AA08}" srcOrd="0" destOrd="1" presId="urn:microsoft.com/office/officeart/2005/8/layout/hList1"/>
-    <dgm:cxn modelId="{5ABD5F7F-01B3-4789-9C85-980185F4605C}" type="presOf" srcId="{1CEDE794-719B-4E58-80F7-48946D6F4C39}" destId="{179A36A7-8940-4968-A15E-8BA9BFD2EADA}" srcOrd="0" destOrd="0" presId="urn:microsoft.com/office/officeart/2005/8/layout/hList1"/>
-    <dgm:cxn modelId="{0AAA31D9-55CA-4D86-80FA-50427296F34E}" srcId="{1CEDE794-719B-4E58-80F7-48946D6F4C39}" destId="{790DA81C-827F-49F3-B484-93867AA16FBF}" srcOrd="5" destOrd="0" parTransId="{BC59E756-AA71-4521-AE07-8DADE9EDFDB5}" sibTransId="{21717FCD-31BF-4820-9663-2B70FB1808B0}"/>
-    <dgm:cxn modelId="{85A50305-AF3C-4F0D-A180-BC83C6101C0B}" srcId="{1CEDE794-719B-4E58-80F7-48946D6F4C39}" destId="{6CA302D5-E71C-4B07-A956-A87A48FBE11E}" srcOrd="4" destOrd="0" parTransId="{9A06DA32-4724-4F0D-9CD5-32EBD2C1BE74}" sibTransId="{2BC4B70D-FAE0-4743-9365-421574CB135A}"/>
-    <dgm:cxn modelId="{E1FC8BD9-C7CD-4DD7-8EC4-14CE65DAA5A5}" type="presOf" srcId="{1ED607FF-3661-425A-AF4F-60A73BEB2917}" destId="{7A18D30B-EFAB-4DDD-BDBA-F0EFFC0400F4}" srcOrd="0" destOrd="0" presId="urn:microsoft.com/office/officeart/2005/8/layout/hList1"/>
+    <dgm:cxn modelId="{EA008D61-617C-4D4B-860F-B6A3F4136286}" srcId="{1CEDE794-719B-4E58-80F7-48946D6F4C39}" destId="{B04F25B9-E07B-4DB5-8E65-DE78A8B468CE}" srcOrd="1" destOrd="0" parTransId="{27B7B590-88F9-413B-840F-C670DF8F88FD}" sibTransId="{E44F76D6-6930-4A58-8B13-114643E19C2A}"/>
     <dgm:cxn modelId="{BBEA0F7F-B49A-4752-A2FD-358ADCD95328}" type="presParOf" srcId="{6853CB78-8BDB-4B63-81EA-4F520D881C0F}" destId="{30A9E795-98B0-44B0-919A-C881F858632B}" srcOrd="0" destOrd="0" presId="urn:microsoft.com/office/officeart/2005/8/layout/hList1"/>
     <dgm:cxn modelId="{132F3788-31F2-43E0-8D56-BD5D38667E58}" type="presParOf" srcId="{30A9E795-98B0-44B0-919A-C881F858632B}" destId="{179A36A7-8940-4968-A15E-8BA9BFD2EADA}" srcOrd="0" destOrd="0" presId="urn:microsoft.com/office/officeart/2005/8/layout/hList1"/>
     <dgm:cxn modelId="{4DBBFE47-2C6D-412A-8599-0DC8D4868E62}" type="presParOf" srcId="{30A9E795-98B0-44B0-919A-C881F858632B}" destId="{EA3CD924-AA8D-4D40-801C-2CE03896AA08}" srcOrd="1" destOrd="0" presId="urn:microsoft.com/office/officeart/2005/8/layout/hList1"/>
@@ -8179,7 +8179,7 @@
       </dsp:nvSpPr>
       <dsp:spPr>
         <a:xfrm>
-          <a:off x="4339" y="207993"/>
+          <a:off x="4339" y="195126"/>
           <a:ext cx="2609509" cy="972971"/>
         </a:xfrm>
         <a:prstGeom prst="rect">
@@ -8245,7 +8245,7 @@
         </a:p>
       </dsp:txBody>
       <dsp:txXfrm>
-        <a:off x="4339" y="207993"/>
+        <a:off x="4339" y="195126"/>
         <a:ext cx="2609509" cy="972971"/>
       </dsp:txXfrm>
     </dsp:sp>
@@ -8256,8 +8256,8 @@
       </dsp:nvSpPr>
       <dsp:spPr>
         <a:xfrm>
-          <a:off x="4339" y="1180965"/>
-          <a:ext cx="2609509" cy="3062390"/>
+          <a:off x="4339" y="1168098"/>
+          <a:ext cx="2609509" cy="3088125"/>
         </a:xfrm>
         <a:prstGeom prst="rect">
           <a:avLst/>
@@ -8342,8 +8342,8 @@
         </a:p>
       </dsp:txBody>
       <dsp:txXfrm>
-        <a:off x="4339" y="1180965"/>
-        <a:ext cx="2609509" cy="3062390"/>
+        <a:off x="4339" y="1168098"/>
+        <a:ext cx="2609509" cy="3088125"/>
       </dsp:txXfrm>
     </dsp:sp>
     <dsp:sp modelId="{55DD950F-2008-46FB-B449-5E4AB4122A8B}">
@@ -8353,7 +8353,7 @@
       </dsp:nvSpPr>
       <dsp:spPr>
         <a:xfrm>
-          <a:off x="2979180" y="207993"/>
+          <a:off x="2979180" y="195126"/>
           <a:ext cx="2609509" cy="972971"/>
         </a:xfrm>
         <a:prstGeom prst="rect">
@@ -8419,7 +8419,7 @@
         </a:p>
       </dsp:txBody>
       <dsp:txXfrm>
-        <a:off x="2979180" y="207993"/>
+        <a:off x="2979180" y="195126"/>
         <a:ext cx="2609509" cy="972971"/>
       </dsp:txXfrm>
     </dsp:sp>
@@ -8430,8 +8430,8 @@
       </dsp:nvSpPr>
       <dsp:spPr>
         <a:xfrm>
-          <a:off x="2979180" y="1180965"/>
-          <a:ext cx="2609509" cy="3062390"/>
+          <a:off x="2979180" y="1168098"/>
+          <a:ext cx="2609509" cy="3088125"/>
         </a:xfrm>
         <a:prstGeom prst="rect">
           <a:avLst/>
@@ -8516,8 +8516,8 @@
         </a:p>
       </dsp:txBody>
       <dsp:txXfrm>
-        <a:off x="2979180" y="1180965"/>
-        <a:ext cx="2609509" cy="3062390"/>
+        <a:off x="2979180" y="1168098"/>
+        <a:ext cx="2609509" cy="3088125"/>
       </dsp:txXfrm>
     </dsp:sp>
     <dsp:sp modelId="{037E9C2D-C09B-419B-91E8-263F695D54B4}">
@@ -8527,7 +8527,7 @@
       </dsp:nvSpPr>
       <dsp:spPr>
         <a:xfrm>
-          <a:off x="5954021" y="207993"/>
+          <a:off x="5954021" y="195126"/>
           <a:ext cx="2609509" cy="972971"/>
         </a:xfrm>
         <a:prstGeom prst="rect">
@@ -8593,7 +8593,7 @@
         </a:p>
       </dsp:txBody>
       <dsp:txXfrm>
-        <a:off x="5954021" y="207993"/>
+        <a:off x="5954021" y="195126"/>
         <a:ext cx="2609509" cy="972971"/>
       </dsp:txXfrm>
     </dsp:sp>
@@ -8604,8 +8604,8 @@
       </dsp:nvSpPr>
       <dsp:spPr>
         <a:xfrm>
-          <a:off x="5954021" y="1180965"/>
-          <a:ext cx="2609509" cy="3062390"/>
+          <a:off x="5954021" y="1168098"/>
+          <a:ext cx="2609509" cy="3088125"/>
         </a:xfrm>
         <a:prstGeom prst="rect">
           <a:avLst/>
@@ -8690,8 +8690,8 @@
         </a:p>
       </dsp:txBody>
       <dsp:txXfrm>
-        <a:off x="5954021" y="1180965"/>
-        <a:ext cx="2609509" cy="3062390"/>
+        <a:off x="5954021" y="1168098"/>
+        <a:ext cx="2609509" cy="3088125"/>
       </dsp:txXfrm>
     </dsp:sp>
     <dsp:sp modelId="{513E6431-36D0-4E32-A6AE-AADACA012307}">
@@ -8701,7 +8701,7 @@
       </dsp:nvSpPr>
       <dsp:spPr>
         <a:xfrm>
-          <a:off x="8928862" y="207993"/>
+          <a:off x="8928862" y="195126"/>
           <a:ext cx="2609509" cy="972971"/>
         </a:xfrm>
         <a:prstGeom prst="rect">
@@ -8767,7 +8767,7 @@
         </a:p>
       </dsp:txBody>
       <dsp:txXfrm>
-        <a:off x="8928862" y="207993"/>
+        <a:off x="8928862" y="195126"/>
         <a:ext cx="2609509" cy="972971"/>
       </dsp:txXfrm>
     </dsp:sp>
@@ -8778,8 +8778,8 @@
       </dsp:nvSpPr>
       <dsp:spPr>
         <a:xfrm>
-          <a:off x="8928862" y="1180965"/>
-          <a:ext cx="2609509" cy="3062390"/>
+          <a:off x="8928862" y="1168098"/>
+          <a:ext cx="2609509" cy="3088125"/>
         </a:xfrm>
         <a:prstGeom prst="rect">
           <a:avLst/>
@@ -8864,8 +8864,8 @@
         </a:p>
       </dsp:txBody>
       <dsp:txXfrm>
-        <a:off x="8928862" y="1180965"/>
-        <a:ext cx="2609509" cy="3062390"/>
+        <a:off x="8928862" y="1168098"/>
+        <a:ext cx="2609509" cy="3088125"/>
       </dsp:txXfrm>
     </dsp:sp>
   </dsp:spTree>
@@ -14696,7 +14696,7 @@
           <a:p>
             <a:fld id="{08785AD7-566F-4C71-A877-61487786B932}" type="datetimeFigureOut">
               <a:rPr lang="en-US" smtClean="0"/>
-              <a:t>6/3/2016</a:t>
+              <a:t>06/07/2016</a:t>
             </a:fld>
             <a:endParaRPr lang="en-US"/>
           </a:p>
@@ -14861,7 +14861,7 @@
           <a:p>
             <a:fld id="{3AC152BB-29D3-4366-9432-ADC86E136C03}" type="datetimeFigureOut">
               <a:rPr lang="en-US" smtClean="0"/>
-              <a:t>6/3/2016</a:t>
+              <a:t>06/07/2016</a:t>
             </a:fld>
             <a:endParaRPr lang="en-US"/>
           </a:p>
@@ -15682,7 +15682,7 @@
           <a:p>
             <a:fld id="{38EEC551-8CDA-4EB6-89BB-2A86C9F091C8}" type="datetime8">
               <a:rPr lang="en-US" smtClean="0"/>
-              <a:t>6/3/2016 5:06 PM</a:t>
+              <a:t>06/07/2016 11:11</a:t>
             </a:fld>
             <a:endParaRPr lang="en-US" dirty="0"/>
           </a:p>
@@ -16503,7 +16503,7 @@
           <a:p>
             <a:fld id="{38EEC551-8CDA-4EB6-89BB-2A86C9F091C8}" type="datetime8">
               <a:rPr lang="en-US" smtClean="0"/>
-              <a:t>6/3/2016 11:05 AM</a:t>
+              <a:t>06/07/2016 11:11</a:t>
             </a:fld>
             <a:endParaRPr lang="en-US" dirty="0"/>
           </a:p>
@@ -16688,7 +16688,7 @@
           <a:p>
             <a:fld id="{38EEC551-8CDA-4EB6-89BB-2A86C9F091C8}" type="datetime8">
               <a:rPr lang="en-US" smtClean="0"/>
-              <a:t>6/3/2016 11:05 AM</a:t>
+              <a:t>06/07/2016 11:11</a:t>
             </a:fld>
             <a:endParaRPr lang="en-US" dirty="0"/>
           </a:p>
@@ -16876,7 +16876,7 @@
             <a:fld id="{D51B1278-D92B-4AF3-A9C1-71DD298190CE}" type="datetimeFigureOut">
               <a:rPr lang="en-US" smtClean="0"/>
               <a:pPr/>
-              <a:t>6/3/2016</a:t>
+              <a:t>06/07/2016</a:t>
             </a:fld>
             <a:endParaRPr lang="en-US" dirty="0"/>
           </a:p>
@@ -17075,7 +17075,7 @@
             <a:fld id="{D51B1278-D92B-4AF3-A9C1-71DD298190CE}" type="datetimeFigureOut">
               <a:rPr lang="en-US" smtClean="0"/>
               <a:pPr/>
-              <a:t>6/3/2016</a:t>
+              <a:t>06/07/2016</a:t>
             </a:fld>
             <a:endParaRPr lang="en-US" dirty="0"/>
           </a:p>
@@ -17360,7 +17360,7 @@
           <a:p>
             <a:fld id="{7D10C09F-FCA1-48C8-B40D-42E1045D109E}" type="datetime8">
               <a:rPr lang="en-US" smtClean="0"/>
-              <a:t>6/3/2016 11:05 AM</a:t>
+              <a:t>06/07/2016 11:11</a:t>
             </a:fld>
             <a:endParaRPr lang="en-US" dirty="0"/>
           </a:p>
@@ -17541,7 +17541,7 @@
           <a:p>
             <a:fld id="{38EEC551-8CDA-4EB6-89BB-2A86C9F091C8}" type="datetime8">
               <a:rPr lang="en-US" smtClean="0"/>
-              <a:t>6/3/2016 11:05 AM</a:t>
+              <a:t>06/07/2016 11:11</a:t>
             </a:fld>
             <a:endParaRPr lang="en-US" dirty="0"/>
           </a:p>
@@ -17729,7 +17729,7 @@
             <a:fld id="{D51B1278-D92B-4AF3-A9C1-71DD298190CE}" type="datetimeFigureOut">
               <a:rPr lang="en-US" smtClean="0"/>
               <a:pPr/>
-              <a:t>6/3/2016</a:t>
+              <a:t>06/07/2016</a:t>
             </a:fld>
             <a:endParaRPr lang="en-US" dirty="0"/>
           </a:p>
@@ -17942,7 +17942,7 @@
           <a:p>
             <a:fld id="{38EEC551-8CDA-4EB6-89BB-2A86C9F091C8}" type="datetime8">
               <a:rPr lang="en-US" smtClean="0"/>
-              <a:t>6/3/2016 11:05 AM</a:t>
+              <a:t>06/07/2016 11:11</a:t>
             </a:fld>
             <a:endParaRPr lang="en-US" dirty="0"/>
           </a:p>
@@ -18123,7 +18123,7 @@
           <a:p>
             <a:fld id="{38EEC551-8CDA-4EB6-89BB-2A86C9F091C8}" type="datetime8">
               <a:rPr lang="en-US" smtClean="0"/>
-              <a:t>6/3/2016 11:05 AM</a:t>
+              <a:t>06/07/2016 11:11</a:t>
             </a:fld>
             <a:endParaRPr lang="en-US" dirty="0"/>
           </a:p>
@@ -18356,7 +18356,7 @@
           <a:p>
             <a:fld id="{38EEC551-8CDA-4EB6-89BB-2A86C9F091C8}" type="datetime8">
               <a:rPr lang="en-US" smtClean="0"/>
-              <a:t>6/3/2016 11:05 AM</a:t>
+              <a:t>06/07/2016 11:11</a:t>
             </a:fld>
             <a:endParaRPr lang="en-US" dirty="0"/>
           </a:p>
@@ -18564,7 +18564,7 @@
           <a:p>
             <a:fld id="{38EEC551-8CDA-4EB6-89BB-2A86C9F091C8}" type="datetime8">
               <a:rPr lang="en-US" smtClean="0"/>
-              <a:t>6/3/2016 11:05 AM</a:t>
+              <a:t>06/07/2016 11:11</a:t>
             </a:fld>
             <a:endParaRPr lang="en-US" dirty="0"/>
           </a:p>
@@ -18784,7 +18784,7 @@
           <a:p>
             <a:fld id="{38EEC551-8CDA-4EB6-89BB-2A86C9F091C8}" type="datetime8">
               <a:rPr lang="en-US" smtClean="0"/>
-              <a:t>6/3/2016 11:05 AM</a:t>
+              <a:t>06/07/2016 11:11</a:t>
             </a:fld>
             <a:endParaRPr lang="en-US" dirty="0"/>
           </a:p>
@@ -18995,7 +18995,7 @@
           <a:p>
             <a:fld id="{38EEC551-8CDA-4EB6-89BB-2A86C9F091C8}" type="datetime8">
               <a:rPr lang="en-US" smtClean="0"/>
-              <a:t>6/3/2016 11:05 AM</a:t>
+              <a:t>06/07/2016 11:11</a:t>
             </a:fld>
             <a:endParaRPr lang="en-US" dirty="0"/>
           </a:p>
@@ -19209,7 +19209,7 @@
           <a:p>
             <a:fld id="{38EEC551-8CDA-4EB6-89BB-2A86C9F091C8}" type="datetime8">
               <a:rPr lang="en-US" smtClean="0"/>
-              <a:t>6/3/2016 11:05 AM</a:t>
+              <a:t>06/07/2016 11:11</a:t>
             </a:fld>
             <a:endParaRPr lang="en-US" dirty="0"/>
           </a:p>
@@ -19723,7 +19723,7 @@
           <a:p>
             <a:fld id="{38EEC551-8CDA-4EB6-89BB-2A86C9F091C8}" type="datetime8">
               <a:rPr lang="en-US" smtClean="0"/>
-              <a:t>6/3/2016 5:10 PM</a:t>
+              <a:t>06/07/2016 11:11</a:t>
             </a:fld>
             <a:endParaRPr lang="en-US" dirty="0"/>
           </a:p>
@@ -19936,7 +19936,7 @@
           <a:p>
             <a:fld id="{38EEC551-8CDA-4EB6-89BB-2A86C9F091C8}" type="datetime8">
               <a:rPr lang="en-US" smtClean="0"/>
-              <a:t>6/3/2016 11:05 AM</a:t>
+              <a:t>06/07/2016 11:11</a:t>
             </a:fld>
             <a:endParaRPr lang="en-US" dirty="0"/>
           </a:p>
@@ -20144,7 +20144,7 @@
           <a:p>
             <a:fld id="{38EEC551-8CDA-4EB6-89BB-2A86C9F091C8}" type="datetime8">
               <a:rPr lang="en-US" smtClean="0"/>
-              <a:t>6/3/2016 11:05 AM</a:t>
+              <a:t>06/07/2016 11:11</a:t>
             </a:fld>
             <a:endParaRPr lang="en-US" dirty="0"/>
           </a:p>
@@ -20336,7 +20336,7 @@
           <a:p>
             <a:fld id="{38EEC551-8CDA-4EB6-89BB-2A86C9F091C8}" type="datetime8">
               <a:rPr lang="en-US" smtClean="0"/>
-              <a:t>6/3/2016 5:16 PM</a:t>
+              <a:t>06/07/2016 11:11</a:t>
             </a:fld>
             <a:endParaRPr lang="en-US" dirty="0"/>
           </a:p>
@@ -20544,7 +20544,7 @@
           <a:p>
             <a:fld id="{38EEC551-8CDA-4EB6-89BB-2A86C9F091C8}" type="datetime8">
               <a:rPr lang="en-US" smtClean="0"/>
-              <a:t>6/3/2016 11:05 AM</a:t>
+              <a:t>06/07/2016 11:11</a:t>
             </a:fld>
             <a:endParaRPr lang="en-US" dirty="0"/>
           </a:p>
@@ -20761,7 +20761,7 @@
           <a:p>
             <a:fld id="{38EEC551-8CDA-4EB6-89BB-2A86C9F091C8}" type="datetime8">
               <a:rPr lang="en-US" smtClean="0"/>
-              <a:t>6/3/2016 11:05 AM</a:t>
+              <a:t>06/07/2016 11:11</a:t>
             </a:fld>
             <a:endParaRPr lang="en-US" dirty="0"/>
           </a:p>
@@ -20988,7 +20988,7 @@
           <a:p>
             <a:fld id="{38EEC551-8CDA-4EB6-89BB-2A86C9F091C8}" type="datetime8">
               <a:rPr lang="en-US" smtClean="0"/>
-              <a:t>6/3/2016 11:05 AM</a:t>
+              <a:t>06/07/2016 11:11</a:t>
             </a:fld>
             <a:endParaRPr lang="en-US" dirty="0"/>
           </a:p>
@@ -21196,7 +21196,7 @@
           <a:p>
             <a:fld id="{38EEC551-8CDA-4EB6-89BB-2A86C9F091C8}" type="datetime8">
               <a:rPr lang="en-US" smtClean="0"/>
-              <a:t>6/3/2016 11:05 AM</a:t>
+              <a:t>06/07/2016 11:11</a:t>
             </a:fld>
             <a:endParaRPr lang="en-US" dirty="0"/>
           </a:p>
@@ -21422,7 +21422,7 @@
           <a:p>
             <a:fld id="{38EEC551-8CDA-4EB6-89BB-2A86C9F091C8}" type="datetime8">
               <a:rPr lang="en-US" smtClean="0"/>
-              <a:t>6/3/2016 5:19 PM</a:t>
+              <a:t>06/07/2016 11:11</a:t>
             </a:fld>
             <a:endParaRPr lang="en-US" dirty="0"/>
           </a:p>
@@ -21630,7 +21630,7 @@
           <a:p>
             <a:fld id="{38EEC551-8CDA-4EB6-89BB-2A86C9F091C8}" type="datetime8">
               <a:rPr lang="en-US" smtClean="0"/>
-              <a:t>6/3/2016 11:05 AM</a:t>
+              <a:t>06/07/2016 11:11</a:t>
             </a:fld>
             <a:endParaRPr lang="en-US" dirty="0"/>
           </a:p>
@@ -22089,7 +22089,7 @@
           <a:p>
             <a:fld id="{38EEC551-8CDA-4EB6-89BB-2A86C9F091C8}" type="datetime8">
               <a:rPr lang="en-US" smtClean="0"/>
-              <a:t>6/3/2016 11:05 AM</a:t>
+              <a:t>06/07/2016 11:11</a:t>
             </a:fld>
             <a:endParaRPr lang="en-US" dirty="0"/>
           </a:p>
@@ -22273,7 +22273,7 @@
           <a:p>
             <a:fld id="{38EEC551-8CDA-4EB6-89BB-2A86C9F091C8}" type="datetime8">
               <a:rPr lang="en-US" smtClean="0"/>
-              <a:t>6/3/2016 11:05 AM</a:t>
+              <a:t>06/07/2016 11:11</a:t>
             </a:fld>
             <a:endParaRPr lang="en-US" dirty="0"/>
           </a:p>
@@ -22481,7 +22481,7 @@
           <a:p>
             <a:fld id="{38EEC551-8CDA-4EB6-89BB-2A86C9F091C8}" type="datetime8">
               <a:rPr lang="en-US" smtClean="0"/>
-              <a:t>6/3/2016 11:05 AM</a:t>
+              <a:t>06/07/2016 11:11</a:t>
             </a:fld>
             <a:endParaRPr lang="en-US" dirty="0"/>
           </a:p>
@@ -22689,7 +22689,7 @@
           <a:p>
             <a:fld id="{38EEC551-8CDA-4EB6-89BB-2A86C9F091C8}" type="datetime8">
               <a:rPr lang="en-US" smtClean="0"/>
-              <a:t>6/3/2016 11:05 AM</a:t>
+              <a:t>06/07/2016 11:11</a:t>
             </a:fld>
             <a:endParaRPr lang="en-US" dirty="0"/>
           </a:p>
@@ -22897,7 +22897,7 @@
           <a:p>
             <a:fld id="{38EEC551-8CDA-4EB6-89BB-2A86C9F091C8}" type="datetime8">
               <a:rPr lang="en-US" smtClean="0"/>
-              <a:t>6/3/2016 11:05 AM</a:t>
+              <a:t>06/07/2016 11:11</a:t>
             </a:fld>
             <a:endParaRPr lang="en-US" dirty="0"/>
           </a:p>
@@ -23158,7 +23158,7 @@
           <a:p>
             <a:fld id="{38EEC551-8CDA-4EB6-89BB-2A86C9F091C8}" type="datetime8">
               <a:rPr lang="en-US" smtClean="0"/>
-              <a:t>6/3/2016 11:05 AM</a:t>
+              <a:t>06/07/2016 11:11</a:t>
             </a:fld>
             <a:endParaRPr lang="en-US" dirty="0"/>
           </a:p>
@@ -23392,7 +23392,7 @@
           <a:p>
             <a:fld id="{38EEC551-8CDA-4EB6-89BB-2A86C9F091C8}" type="datetime8">
               <a:rPr lang="en-US" smtClean="0"/>
-              <a:t>6/3/2016 11:05 AM</a:t>
+              <a:t>06/07/2016 11:11</a:t>
             </a:fld>
             <a:endParaRPr lang="en-US" dirty="0"/>
           </a:p>
@@ -23504,6 +23504,19 @@
             <a:r>
               <a:rPr lang="en-US" baseline="0" dirty="0"/>
               <a:t>Format is Default/Maximum so 20/200 = 20 default, 200 maximum</a:t>
+            </a:r>
+          </a:p>
+          <a:p>
+            <a:endParaRPr lang="en-US" baseline="0" dirty="0"/>
+          </a:p>
+          <a:p>
+            <a:r>
+              <a:rPr lang="en-US" baseline="0" dirty="0"/>
+              <a:t>aka.ms/</a:t>
+            </a:r>
+            <a:r>
+              <a:rPr lang="en-US" baseline="0" dirty="0" err="1"/>
+              <a:t>azurelimits</a:t>
             </a:r>
             <a:endParaRPr lang="en-US" dirty="0"/>
           </a:p>
@@ -26101,7 +26114,7 @@
           <a:p>
             <a:fld id="{B37ECBE2-3150-4A8C-9BA8-324E60C97071}" type="datetimeFigureOut">
               <a:rPr lang="en-US"/>
-              <a:t>6/3/2016</a:t>
+              <a:t>06/07/2016</a:t>
             </a:fld>
             <a:endParaRPr lang="en-US"/>
           </a:p>
@@ -49414,7 +49427,7 @@
           <p:nvPr>
             <p:extLst>
               <p:ext uri="{D42A27DB-BD31-4B8C-83A1-F6EECF244321}">
-                <p14:modId xmlns:p14="http://schemas.microsoft.com/office/powerpoint/2010/main" val="1569682190"/>
+                <p14:modId xmlns:p14="http://schemas.microsoft.com/office/powerpoint/2010/main" val="1405612446"/>
               </p:ext>
             </p:extLst>
           </p:nvPr>
@@ -49711,12 +49724,12 @@
                     <a:p>
                       <a:pPr algn="ctr" fontAlgn="b"/>
                       <a:r>
-                        <a:rPr lang="en-US" sz="1600" u="none" strike="noStrike">
+                        <a:rPr lang="en-US" sz="1600" u="none" strike="noStrike" dirty="0">
                           <a:effectLst/>
                         </a:rPr>
-                        <a:t>100/100 (200 by contacting support)</a:t>
+                        <a:t>100/100 (250 by contacting support)</a:t>
                       </a:r>
-                      <a:endParaRPr lang="en-US" sz="1600" b="0" i="0" u="none" strike="noStrike">
+                      <a:endParaRPr lang="en-US" sz="1600" b="0" i="0" u="none" strike="noStrike" dirty="0">
                         <a:solidFill>
                           <a:srgbClr val="000000"/>
                         </a:solidFill>
@@ -49737,7 +49750,7 @@
                         <a:rPr lang="en-US" sz="1600" u="none" strike="noStrike" dirty="0">
                           <a:effectLst/>
                         </a:rPr>
-                        <a:t>100/100 (200 by contacting support)</a:t>
+                        <a:t>100/150 (250 by contacting support)</a:t>
                       </a:r>
                       <a:endParaRPr lang="en-US" sz="1600" b="0" i="0" u="none" strike="noStrike" dirty="0">
                         <a:solidFill>
@@ -53129,12 +53142,6 @@
 </file>
 
 <file path=customXml/item1.xml><?xml version="1.0" encoding="utf-8"?>
-<p:properties xmlns:p="http://schemas.microsoft.com/office/2006/metadata/properties" xmlns:xsi="http://www.w3.org/2001/XMLSchema-instance" xmlns:pc="http://schemas.microsoft.com/office/infopath/2007/PartnerControls">
-  <documentManagement/>
-</p:properties>
-</file>
-
-<file path=customXml/item2.xml><?xml version="1.0" encoding="utf-8"?>
 <?mso-contentType ?>
 <FormTemplates xmlns="http://schemas.microsoft.com/sharepoint/v3/contenttype/forms">
   <Display>DocumentLibraryForm</Display>
@@ -53143,7 +53150,7 @@
 </FormTemplates>
 </file>
 
-<file path=customXml/item3.xml><?xml version="1.0" encoding="utf-8"?>
+<file path=customXml/item2.xml><?xml version="1.0" encoding="utf-8"?>
 <ct:contentTypeSchema xmlns:ct="http://schemas.microsoft.com/office/2006/metadata/contentType" xmlns:ma="http://schemas.microsoft.com/office/2006/metadata/properties/metaAttributes" ct:_="" ma:_="" ma:contentTypeName="Document" ma:contentTypeID="0x010100C08F381963C77D44A6A91469D5845EE5" ma:contentTypeVersion="2" ma:contentTypeDescription="Create a new document." ma:contentTypeScope="" ma:versionID="66290b1f7725e443aa19cdb7b89371b7">
   <xsd:schema xmlns:xsd="http://www.w3.org/2001/XMLSchema" xmlns:xs="http://www.w3.org/2001/XMLSchema" xmlns:p="http://schemas.microsoft.com/office/2006/metadata/properties" xmlns:ns2="c58f79d2-8dd2-43f0-9a03-e1b9f874d667" targetNamespace="http://schemas.microsoft.com/office/2006/metadata/properties" ma:root="true" ma:fieldsID="27a8e9c299bda407fa38b12f0db042eb" ns2:_="">
     <xsd:import namespace="c58f79d2-8dd2-43f0-9a03-e1b9f874d667"/>
@@ -53291,23 +53298,13 @@
 </ct:contentTypeSchema>
 </file>
 
-<file path=customXml/itemProps1.xml><?xml version="1.0" encoding="utf-8"?>
-<ds:datastoreItem xmlns:ds="http://schemas.openxmlformats.org/officeDocument/2006/customXml" ds:itemID="{89254BEE-C2AB-4E68-AA3E-3E2702671367}">
-  <ds:schemaRefs>
-    <ds:schemaRef ds:uri="http://purl.org/dc/terms/"/>
-    <ds:schemaRef ds:uri="http://schemas.openxmlformats.org/package/2006/metadata/core-properties"/>
-    <ds:schemaRef ds:uri="http://schemas.microsoft.com/office/2006/documentManagement/types"/>
-    <ds:schemaRef ds:uri="c58f79d2-8dd2-43f0-9a03-e1b9f874d667"/>
-    <ds:schemaRef ds:uri="http://purl.org/dc/elements/1.1/"/>
-    <ds:schemaRef ds:uri="http://schemas.microsoft.com/office/2006/metadata/properties"/>
-    <ds:schemaRef ds:uri="http://schemas.microsoft.com/office/infopath/2007/PartnerControls"/>
-    <ds:schemaRef ds:uri="http://www.w3.org/XML/1998/namespace"/>
-    <ds:schemaRef ds:uri="http://purl.org/dc/dcmitype/"/>
-  </ds:schemaRefs>
-</ds:datastoreItem>
+<file path=customXml/item3.xml><?xml version="1.0" encoding="utf-8"?>
+<p:properties xmlns:p="http://schemas.microsoft.com/office/2006/metadata/properties" xmlns:xsi="http://www.w3.org/2001/XMLSchema-instance" xmlns:pc="http://schemas.microsoft.com/office/infopath/2007/PartnerControls">
+  <documentManagement/>
+</p:properties>
 </file>
 
-<file path=customXml/itemProps2.xml><?xml version="1.0" encoding="utf-8"?>
+<file path=customXml/itemProps1.xml><?xml version="1.0" encoding="utf-8"?>
 <ds:datastoreItem xmlns:ds="http://schemas.openxmlformats.org/officeDocument/2006/customXml" ds:itemID="{D98B8685-CAA3-4A1A-8397-DF9971695697}">
   <ds:schemaRefs>
     <ds:schemaRef ds:uri="http://schemas.microsoft.com/sharepoint/v3/contenttype/forms"/>
@@ -53315,7 +53312,7 @@
 </ds:datastoreItem>
 </file>
 
-<file path=customXml/itemProps3.xml><?xml version="1.0" encoding="utf-8"?>
+<file path=customXml/itemProps2.xml><?xml version="1.0" encoding="utf-8"?>
 <ds:datastoreItem xmlns:ds="http://schemas.openxmlformats.org/officeDocument/2006/customXml" ds:itemID="{AE30008B-22D1-4C3E-A0BE-5BCAFBE11F82}">
   <ds:schemaRefs>
     <ds:schemaRef ds:uri="http://schemas.microsoft.com/office/2006/metadata/contentType"/>
@@ -53331,4 +53328,20 @@
     <ds:schemaRef ds:uri="http://schemas.microsoft.com/internal/obd"/>
   </ds:schemaRefs>
 </ds:datastoreItem>
+</file>
+
+<file path=customXml/itemProps3.xml><?xml version="1.0" encoding="utf-8"?>
+<ds:datastoreItem xmlns:ds="http://schemas.openxmlformats.org/officeDocument/2006/customXml" ds:itemID="{89254BEE-C2AB-4E68-AA3E-3E2702671367}">
+  <ds:schemaRefs>
+    <ds:schemaRef ds:uri="http://purl.org/dc/terms/"/>
+    <ds:schemaRef ds:uri="http://schemas.openxmlformats.org/package/2006/metadata/core-properties"/>
+    <ds:schemaRef ds:uri="http://schemas.microsoft.com/office/2006/documentManagement/types"/>
+    <ds:schemaRef ds:uri="c58f79d2-8dd2-43f0-9a03-e1b9f874d667"/>
+    <ds:schemaRef ds:uri="http://purl.org/dc/elements/1.1/"/>
+    <ds:schemaRef ds:uri="http://schemas.microsoft.com/office/2006/metadata/properties"/>
+    <ds:schemaRef ds:uri="http://schemas.microsoft.com/office/infopath/2007/PartnerControls"/>
+    <ds:schemaRef ds:uri="http://www.w3.org/XML/1998/namespace"/>
+    <ds:schemaRef ds:uri="http://purl.org/dc/dcmitype/"/>
+  </ds:schemaRefs>
+</ds:datastoreItem>
 </file>
</xml_diff>